<commit_message>
some text in there
</commit_message>
<xml_diff>
--- a/NetFutures/mami-poster.pptx
+++ b/NetFutures/mami-poster.pptx
@@ -596,53 +596,7 @@
                 <a:cs typeface="+mn-cs"/>
                 <a:sym typeface="Helvetica Neue"/>
               </a:rPr>
-              <a:t> under </a:t>
-            </a:r>
-            <a:r>
-              <a:rPr kumimoji="0" lang="en-US" sz="2400" b="0" i="1" u="none" strike="noStrike" cap="none" spc="0" normalizeH="0" baseline="0" dirty="0" smtClean="0">
-                <a:ln>
-                  <a:noFill/>
-                </a:ln>
-                <a:solidFill>
-                  <a:schemeClr val="bg2">
-                    <a:lumMod val="50000"/>
-                  </a:schemeClr>
-                </a:solidFill>
-                <a:effectLst/>
-                <a:uFill>
-                  <a:solidFill>
-                    <a:srgbClr val="000000"/>
-                  </a:solidFill>
-                </a:uFill>
-                <a:latin typeface="+mn-lt"/>
-                <a:ea typeface="+mn-ea"/>
-                <a:cs typeface="+mn-cs"/>
-                <a:sym typeface="Helvetica Neue"/>
-              </a:rPr>
-              <a:t>grant agreement </a:t>
-            </a:r>
-            <a:r>
-              <a:rPr kumimoji="0" lang="en-US" sz="2400" b="0" i="1" u="none" strike="noStrike" cap="none" spc="0" normalizeH="0" baseline="0" dirty="0" smtClean="0">
-                <a:ln>
-                  <a:noFill/>
-                </a:ln>
-                <a:solidFill>
-                  <a:schemeClr val="bg2">
-                    <a:lumMod val="50000"/>
-                  </a:schemeClr>
-                </a:solidFill>
-                <a:effectLst/>
-                <a:uFill>
-                  <a:solidFill>
-                    <a:srgbClr val="000000"/>
-                  </a:solidFill>
-                </a:uFill>
-                <a:latin typeface="+mn-lt"/>
-                <a:ea typeface="+mn-ea"/>
-                <a:cs typeface="+mn-cs"/>
-                <a:sym typeface="Helvetica Neue"/>
-              </a:rPr>
-              <a:t>No</a:t>
+              <a:t> under grant agreement No</a:t>
             </a:r>
             <a:r>
               <a:rPr kumimoji="0" lang="en-US" sz="2400" b="0" i="1" u="none" strike="noStrike" cap="none" spc="0" normalizeH="0" dirty="0" smtClean="0">
@@ -731,10 +685,10 @@
                 <a:cs typeface="+mn-cs"/>
                 <a:sym typeface="Helvetica Neue"/>
               </a:rPr>
-              <a:t>The </a:t>
-            </a:r>
-            <a:r>
-              <a:rPr kumimoji="0" lang="en-US" sz="2400" b="0" i="1" u="none" strike="noStrike" cap="none" spc="0" normalizeH="0" baseline="0" dirty="0" smtClean="0">
+              <a:t>The opinions expressed and arguments employed reflect only the authors' </a:t>
+            </a:r>
+            <a:r>
+              <a:rPr kumimoji="0" lang="en-US" sz="2400" b="0" i="1" u="none" strike="noStrike" cap="none" spc="0" normalizeH="0" dirty="0" smtClean="0">
                 <a:ln>
                   <a:noFill/>
                 </a:ln>
@@ -754,10 +708,10 @@
                 <a:cs typeface="+mn-cs"/>
                 <a:sym typeface="Helvetica Neue"/>
               </a:rPr>
-              <a:t>opinions expressed and arguments employed reflect only the authors' </a:t>
-            </a:r>
-            <a:r>
-              <a:rPr kumimoji="0" lang="en-US" sz="2400" b="0" i="1" u="none" strike="noStrike" cap="none" spc="0" normalizeH="0" dirty="0" smtClean="0">
+              <a:t> </a:t>
+            </a:r>
+            <a:r>
+              <a:rPr kumimoji="0" lang="en-US" sz="2400" b="0" i="1" u="none" strike="noStrike" cap="none" spc="0" normalizeH="0" baseline="0" dirty="0" smtClean="0">
                 <a:ln>
                   <a:noFill/>
                 </a:ln>
@@ -777,53 +731,7 @@
                 <a:cs typeface="+mn-cs"/>
                 <a:sym typeface="Helvetica Neue"/>
               </a:rPr>
-              <a:t> </a:t>
-            </a:r>
-            <a:r>
-              <a:rPr kumimoji="0" lang="en-US" sz="2400" b="0" i="1" u="none" strike="noStrike" cap="none" spc="0" normalizeH="0" baseline="0" dirty="0" smtClean="0">
-                <a:ln>
-                  <a:noFill/>
-                </a:ln>
-                <a:solidFill>
-                  <a:schemeClr val="bg2">
-                    <a:lumMod val="50000"/>
-                  </a:schemeClr>
-                </a:solidFill>
-                <a:effectLst/>
-                <a:uFill>
-                  <a:solidFill>
-                    <a:srgbClr val="000000"/>
-                  </a:solidFill>
-                </a:uFill>
-                <a:latin typeface="+mn-lt"/>
-                <a:ea typeface="+mn-ea"/>
-                <a:cs typeface="+mn-cs"/>
-                <a:sym typeface="Helvetica Neue"/>
-              </a:rPr>
-              <a:t>view</a:t>
-            </a:r>
-            <a:r>
-              <a:rPr kumimoji="0" lang="en-US" sz="2400" b="0" i="1" u="none" strike="noStrike" cap="none" spc="0" normalizeH="0" baseline="0" dirty="0" smtClean="0">
-                <a:ln>
-                  <a:noFill/>
-                </a:ln>
-                <a:solidFill>
-                  <a:schemeClr val="bg2">
-                    <a:lumMod val="50000"/>
-                  </a:schemeClr>
-                </a:solidFill>
-                <a:effectLst/>
-                <a:uFill>
-                  <a:solidFill>
-                    <a:srgbClr val="000000"/>
-                  </a:solidFill>
-                </a:uFill>
-                <a:latin typeface="+mn-lt"/>
-                <a:ea typeface="+mn-ea"/>
-                <a:cs typeface="+mn-cs"/>
-                <a:sym typeface="Helvetica Neue"/>
-              </a:rPr>
-              <a:t>. The European Commission is not responsible for any use that may be made of that information.</a:t>
+              <a:t>view. The European Commission is not responsible for any use that may be made of that information.</a:t>
             </a:r>
             <a:endParaRPr kumimoji="0" lang="en-US" sz="2400" b="0" i="1" u="none" strike="noStrike" cap="none" spc="0" normalizeH="0" baseline="0" dirty="0">
               <a:ln>
@@ -910,26 +818,6 @@
               </a:rPr>
               <a:t>Supported by the Swiss State Secretariat for Education, Research and Innovation under contract number 15.0268. </a:t>
             </a:r>
-            <a:endParaRPr kumimoji="0" lang="en-US" sz="2400" b="0" i="1" u="none" strike="noStrike" cap="none" spc="0" normalizeH="0" baseline="0" dirty="0" smtClean="0">
-              <a:ln>
-                <a:noFill/>
-              </a:ln>
-              <a:solidFill>
-                <a:schemeClr val="bg2">
-                  <a:lumMod val="50000"/>
-                </a:schemeClr>
-              </a:solidFill>
-              <a:effectLst/>
-              <a:uFill>
-                <a:solidFill>
-                  <a:srgbClr val="000000"/>
-                </a:solidFill>
-              </a:uFill>
-              <a:latin typeface="+mn-lt"/>
-              <a:ea typeface="+mn-ea"/>
-              <a:cs typeface="+mn-cs"/>
-              <a:sym typeface="Helvetica Neue"/>
-            </a:endParaRPr>
           </a:p>
           <a:p>
             <a:pPr marL="0" marR="0" indent="0" algn="ctr" defTabSz="1295400" rtl="0" fontAlgn="auto" latinLnBrk="1" hangingPunct="0">
@@ -1026,6 +914,92 @@
           </a:prstGeom>
         </p:spPr>
       </p:pic>
+      <p:sp>
+        <p:nvSpPr>
+          <p:cNvPr id="17" name="Textfeld 16"/>
+          <p:cNvSpPr txBox="1"/>
+          <p:nvPr userDrawn="1"/>
+        </p:nvSpPr>
+        <p:spPr>
+          <a:xfrm>
+            <a:off x="25685560" y="6134803"/>
+            <a:ext cx="3749744" cy="646331"/>
+          </a:xfrm>
+          <a:prstGeom prst="rect">
+            <a:avLst/>
+          </a:prstGeom>
+          <a:noFill/>
+        </p:spPr>
+        <p:txBody>
+          <a:bodyPr wrap="none" rtlCol="0">
+            <a:spAutoFit/>
+          </a:bodyPr>
+          <a:lstStyle/>
+          <a:p>
+            <a:r>
+              <a:rPr lang="de-DE" sz="3600" b="1" dirty="0">
+                <a:latin typeface="Arial" panose="020B0604020202020204" pitchFamily="34" charset="0"/>
+                <a:cs typeface="Arial" panose="020B0604020202020204" pitchFamily="34" charset="0"/>
+              </a:rPr>
+              <a:t>m</a:t>
+            </a:r>
+            <a:r>
+              <a:rPr lang="de-DE" sz="3600" b="1" dirty="0" smtClean="0">
+                <a:latin typeface="Arial" panose="020B0604020202020204" pitchFamily="34" charset="0"/>
+                <a:cs typeface="Arial" panose="020B0604020202020204" pitchFamily="34" charset="0"/>
+              </a:rPr>
+              <a:t>ami-project.eu</a:t>
+            </a:r>
+            <a:endParaRPr lang="en-US" sz="3600" b="1" dirty="0">
+              <a:latin typeface="Arial" panose="020B0604020202020204" pitchFamily="34" charset="0"/>
+              <a:cs typeface="Arial" panose="020B0604020202020204" pitchFamily="34" charset="0"/>
+            </a:endParaRPr>
+          </a:p>
+        </p:txBody>
+      </p:sp>
+      <p:sp>
+        <p:nvSpPr>
+          <p:cNvPr id="18" name="Textfeld 17"/>
+          <p:cNvSpPr txBox="1"/>
+          <p:nvPr userDrawn="1"/>
+        </p:nvSpPr>
+        <p:spPr>
+          <a:xfrm>
+            <a:off x="26055853" y="5488472"/>
+            <a:ext cx="3379451" cy="646331"/>
+          </a:xfrm>
+          <a:prstGeom prst="rect">
+            <a:avLst/>
+          </a:prstGeom>
+          <a:noFill/>
+        </p:spPr>
+        <p:txBody>
+          <a:bodyPr wrap="none" rtlCol="0">
+            <a:spAutoFit/>
+          </a:bodyPr>
+          <a:lstStyle/>
+          <a:p>
+            <a:r>
+              <a:rPr lang="de-DE" sz="3600" b="1" dirty="0" smtClean="0">
+                <a:latin typeface="Arial" panose="020B0604020202020204" pitchFamily="34" charset="0"/>
+                <a:cs typeface="Arial" panose="020B0604020202020204" pitchFamily="34" charset="0"/>
+              </a:rPr>
+              <a:t>@</a:t>
+            </a:r>
+            <a:r>
+              <a:rPr lang="de-DE" sz="3600" b="1" dirty="0" err="1" smtClean="0">
+                <a:latin typeface="Arial" panose="020B0604020202020204" pitchFamily="34" charset="0"/>
+                <a:cs typeface="Arial" panose="020B0604020202020204" pitchFamily="34" charset="0"/>
+              </a:rPr>
+              <a:t>mamiproject</a:t>
+            </a:r>
+            <a:endParaRPr lang="en-US" sz="3600" b="1" dirty="0">
+              <a:latin typeface="Arial" panose="020B0604020202020204" pitchFamily="34" charset="0"/>
+              <a:cs typeface="Arial" panose="020B0604020202020204" pitchFamily="34" charset="0"/>
+            </a:endParaRPr>
+          </a:p>
+        </p:txBody>
+      </p:sp>
     </p:spTree>
     <p:extLst>
       <p:ext uri="{BB962C8B-B14F-4D97-AF65-F5344CB8AC3E}">
@@ -1356,7 +1330,7 @@
           </a:ln>
           <a:extLst>
             <a:ext uri="{C572A759-6A51-4108-AA02-DFA0A04FC94B}">
-              <ma14:wrappingTextBoxFlag xmlns:ma14="http://schemas.microsoft.com/office/mac/drawingml/2011/main" xmlns="" val="1"/>
+              <ma14:wrappingTextBoxFlag xmlns="" xmlns:ma14="http://schemas.microsoft.com/office/mac/drawingml/2011/main" val="1"/>
             </a:ext>
           </a:extLst>
         </p:spPr>
@@ -1407,7 +1381,7 @@
           </a:ln>
           <a:extLst>
             <a:ext uri="{C572A759-6A51-4108-AA02-DFA0A04FC94B}">
-              <ma14:wrappingTextBoxFlag xmlns:ma14="http://schemas.microsoft.com/office/mac/drawingml/2011/main" xmlns="" val="1"/>
+              <ma14:wrappingTextBoxFlag xmlns="" xmlns:ma14="http://schemas.microsoft.com/office/mac/drawingml/2011/main" val="1"/>
             </a:ext>
           </a:extLst>
         </p:spPr>
@@ -1461,7 +1435,7 @@
           </a:ln>
           <a:extLst>
             <a:ext uri="{C572A759-6A51-4108-AA02-DFA0A04FC94B}">
-              <ma14:wrappingTextBoxFlag xmlns:ma14="http://schemas.microsoft.com/office/mac/drawingml/2011/main" xmlns="" val="1"/>
+              <ma14:wrappingTextBoxFlag xmlns="" xmlns:ma14="http://schemas.microsoft.com/office/mac/drawingml/2011/main" val="1"/>
             </a:ext>
           </a:extLst>
         </p:spPr>
@@ -1500,49 +1474,6 @@
               <a:t>deployability</a:t>
             </a:r>
             <a:endParaRPr sz="4800" dirty="0">
-              <a:latin typeface="Arial" panose="020B0604020202020204" pitchFamily="34" charset="0"/>
-              <a:cs typeface="Arial" panose="020B0604020202020204" pitchFamily="34" charset="0"/>
-            </a:endParaRPr>
-          </a:p>
-        </p:txBody>
-      </p:sp>
-      <p:sp>
-        <p:nvSpPr>
-          <p:cNvPr id="34" name="Textfeld 33"/>
-          <p:cNvSpPr txBox="1"/>
-          <p:nvPr/>
-        </p:nvSpPr>
-        <p:spPr>
-          <a:xfrm>
-            <a:off x="24650838" y="5942299"/>
-            <a:ext cx="4943982" cy="830997"/>
-          </a:xfrm>
-          <a:prstGeom prst="rect">
-            <a:avLst/>
-          </a:prstGeom>
-          <a:noFill/>
-        </p:spPr>
-        <p:txBody>
-          <a:bodyPr wrap="none" rtlCol="0">
-            <a:spAutoFit/>
-          </a:bodyPr>
-          <a:lstStyle/>
-          <a:p>
-            <a:r>
-              <a:rPr lang="de-DE" sz="4800" b="1" dirty="0">
-                <a:latin typeface="Arial" panose="020B0604020202020204" pitchFamily="34" charset="0"/>
-                <a:cs typeface="Arial" panose="020B0604020202020204" pitchFamily="34" charset="0"/>
-              </a:rPr>
-              <a:t>m</a:t>
-            </a:r>
-            <a:r>
-              <a:rPr lang="de-DE" sz="4800" b="1" dirty="0" smtClean="0">
-                <a:latin typeface="Arial" panose="020B0604020202020204" pitchFamily="34" charset="0"/>
-                <a:cs typeface="Arial" panose="020B0604020202020204" pitchFamily="34" charset="0"/>
-              </a:rPr>
-              <a:t>ami-project.eu</a:t>
-            </a:r>
-            <a:endParaRPr lang="en-US" sz="4800" b="1" dirty="0">
               <a:latin typeface="Arial" panose="020B0604020202020204" pitchFamily="34" charset="0"/>
               <a:cs typeface="Arial" panose="020B0604020202020204" pitchFamily="34" charset="0"/>
             </a:endParaRPr>
@@ -1568,7 +1499,7 @@
           </a:ln>
           <a:extLst>
             <a:ext uri="{C572A759-6A51-4108-AA02-DFA0A04FC94B}">
-              <ma14:wrappingTextBoxFlag xmlns:ma14="http://schemas.microsoft.com/office/mac/drawingml/2011/main" xmlns="" val="1"/>
+              <ma14:wrappingTextBoxFlag xmlns="" xmlns:ma14="http://schemas.microsoft.com/office/mac/drawingml/2011/main" val="1"/>
             </a:ext>
           </a:extLst>
         </p:spPr>
@@ -1647,7 +1578,7 @@
           </a:ln>
           <a:extLst>
             <a:ext uri="{C572A759-6A51-4108-AA02-DFA0A04FC94B}">
-              <ma14:wrappingTextBoxFlag xmlns:ma14="http://schemas.microsoft.com/office/mac/drawingml/2011/main" xmlns="" val="1"/>
+              <ma14:wrappingTextBoxFlag xmlns="" xmlns:ma14="http://schemas.microsoft.com/office/mac/drawingml/2011/main" val="1"/>
             </a:ext>
           </a:extLst>
         </p:spPr>
@@ -1725,7 +1656,7 @@
           </a:ln>
           <a:extLst>
             <a:ext uri="{C572A759-6A51-4108-AA02-DFA0A04FC94B}">
-              <ma14:wrappingTextBoxFlag xmlns:ma14="http://schemas.microsoft.com/office/mac/drawingml/2011/main" xmlns="" val="1"/>
+              <ma14:wrappingTextBoxFlag xmlns="" xmlns:ma14="http://schemas.microsoft.com/office/mac/drawingml/2011/main" val="1"/>
             </a:ext>
           </a:extLst>
         </p:spPr>
@@ -2054,6 +1985,2434 @@
           </p:spPr>
         </p:pic>
       </p:grpSp>
+      <p:sp>
+        <p:nvSpPr>
+          <p:cNvPr id="21" name="Shape 173"/>
+          <p:cNvSpPr txBox="1">
+            <a:spLocks/>
+          </p:cNvSpPr>
+          <p:nvPr/>
+        </p:nvSpPr>
+        <p:spPr>
+          <a:xfrm>
+            <a:off x="1520311" y="16726571"/>
+            <a:ext cx="13523107" cy="8061157"/>
+          </a:xfrm>
+          <a:prstGeom prst="rect">
+            <a:avLst/>
+          </a:prstGeom>
+        </p:spPr>
+        <p:txBody>
+          <a:bodyPr/>
+          <a:lstStyle>
+            <a:lvl1pPr marL="756872" indent="-756872" algn="l" defTabSz="3027487" rtl="0" eaLnBrk="1" latinLnBrk="0" hangingPunct="1">
+              <a:lnSpc>
+                <a:spcPct val="90000"/>
+              </a:lnSpc>
+              <a:spcBef>
+                <a:spcPts val="3311"/>
+              </a:spcBef>
+              <a:buFont typeface="Arial" panose="020B0604020202020204" pitchFamily="34" charset="0"/>
+              <a:buChar char="•"/>
+              <a:defRPr sz="9271" kern="1200">
+                <a:solidFill>
+                  <a:schemeClr val="tx1"/>
+                </a:solidFill>
+                <a:latin typeface="+mn-lt"/>
+                <a:ea typeface="+mn-ea"/>
+                <a:cs typeface="+mn-cs"/>
+              </a:defRPr>
+            </a:lvl1pPr>
+            <a:lvl2pPr marL="2270615" indent="-756872" algn="l" defTabSz="3027487" rtl="0" eaLnBrk="1" latinLnBrk="0" hangingPunct="1">
+              <a:lnSpc>
+                <a:spcPct val="90000"/>
+              </a:lnSpc>
+              <a:spcBef>
+                <a:spcPts val="1655"/>
+              </a:spcBef>
+              <a:buFont typeface="Arial" panose="020B0604020202020204" pitchFamily="34" charset="0"/>
+              <a:buChar char="•"/>
+              <a:defRPr sz="7946" kern="1200">
+                <a:solidFill>
+                  <a:schemeClr val="tx1"/>
+                </a:solidFill>
+                <a:latin typeface="+mn-lt"/>
+                <a:ea typeface="+mn-ea"/>
+                <a:cs typeface="+mn-cs"/>
+              </a:defRPr>
+            </a:lvl2pPr>
+            <a:lvl3pPr marL="3784359" indent="-756872" algn="l" defTabSz="3027487" rtl="0" eaLnBrk="1" latinLnBrk="0" hangingPunct="1">
+              <a:lnSpc>
+                <a:spcPct val="90000"/>
+              </a:lnSpc>
+              <a:spcBef>
+                <a:spcPts val="1655"/>
+              </a:spcBef>
+              <a:buFont typeface="Arial" panose="020B0604020202020204" pitchFamily="34" charset="0"/>
+              <a:buChar char="•"/>
+              <a:defRPr sz="6622" kern="1200">
+                <a:solidFill>
+                  <a:schemeClr val="tx1"/>
+                </a:solidFill>
+                <a:latin typeface="+mn-lt"/>
+                <a:ea typeface="+mn-ea"/>
+                <a:cs typeface="+mn-cs"/>
+              </a:defRPr>
+            </a:lvl3pPr>
+            <a:lvl4pPr marL="5298102" indent="-756872" algn="l" defTabSz="3027487" rtl="0" eaLnBrk="1" latinLnBrk="0" hangingPunct="1">
+              <a:lnSpc>
+                <a:spcPct val="90000"/>
+              </a:lnSpc>
+              <a:spcBef>
+                <a:spcPts val="1655"/>
+              </a:spcBef>
+              <a:buFont typeface="Arial" panose="020B0604020202020204" pitchFamily="34" charset="0"/>
+              <a:buChar char="•"/>
+              <a:defRPr sz="5960" kern="1200">
+                <a:solidFill>
+                  <a:schemeClr val="tx1"/>
+                </a:solidFill>
+                <a:latin typeface="+mn-lt"/>
+                <a:ea typeface="+mn-ea"/>
+                <a:cs typeface="+mn-cs"/>
+              </a:defRPr>
+            </a:lvl4pPr>
+            <a:lvl5pPr marL="6811846" indent="-756872" algn="l" defTabSz="3027487" rtl="0" eaLnBrk="1" latinLnBrk="0" hangingPunct="1">
+              <a:lnSpc>
+                <a:spcPct val="90000"/>
+              </a:lnSpc>
+              <a:spcBef>
+                <a:spcPts val="1655"/>
+              </a:spcBef>
+              <a:buFont typeface="Arial" panose="020B0604020202020204" pitchFamily="34" charset="0"/>
+              <a:buChar char="•"/>
+              <a:defRPr sz="5960" kern="1200">
+                <a:solidFill>
+                  <a:schemeClr val="tx1"/>
+                </a:solidFill>
+                <a:latin typeface="+mn-lt"/>
+                <a:ea typeface="+mn-ea"/>
+                <a:cs typeface="+mn-cs"/>
+              </a:defRPr>
+            </a:lvl5pPr>
+            <a:lvl6pPr marL="8325589" indent="-756872" algn="l" defTabSz="3027487" rtl="0" eaLnBrk="1" latinLnBrk="0" hangingPunct="1">
+              <a:lnSpc>
+                <a:spcPct val="90000"/>
+              </a:lnSpc>
+              <a:spcBef>
+                <a:spcPts val="1655"/>
+              </a:spcBef>
+              <a:buFont typeface="Arial" panose="020B0604020202020204" pitchFamily="34" charset="0"/>
+              <a:buChar char="•"/>
+              <a:defRPr sz="5960" kern="1200">
+                <a:solidFill>
+                  <a:schemeClr val="tx1"/>
+                </a:solidFill>
+                <a:latin typeface="+mn-lt"/>
+                <a:ea typeface="+mn-ea"/>
+                <a:cs typeface="+mn-cs"/>
+              </a:defRPr>
+            </a:lvl6pPr>
+            <a:lvl7pPr marL="9839333" indent="-756872" algn="l" defTabSz="3027487" rtl="0" eaLnBrk="1" latinLnBrk="0" hangingPunct="1">
+              <a:lnSpc>
+                <a:spcPct val="90000"/>
+              </a:lnSpc>
+              <a:spcBef>
+                <a:spcPts val="1655"/>
+              </a:spcBef>
+              <a:buFont typeface="Arial" panose="020B0604020202020204" pitchFamily="34" charset="0"/>
+              <a:buChar char="•"/>
+              <a:defRPr sz="5960" kern="1200">
+                <a:solidFill>
+                  <a:schemeClr val="tx1"/>
+                </a:solidFill>
+                <a:latin typeface="+mn-lt"/>
+                <a:ea typeface="+mn-ea"/>
+                <a:cs typeface="+mn-cs"/>
+              </a:defRPr>
+            </a:lvl7pPr>
+            <a:lvl8pPr marL="11353076" indent="-756872" algn="l" defTabSz="3027487" rtl="0" eaLnBrk="1" latinLnBrk="0" hangingPunct="1">
+              <a:lnSpc>
+                <a:spcPct val="90000"/>
+              </a:lnSpc>
+              <a:spcBef>
+                <a:spcPts val="1655"/>
+              </a:spcBef>
+              <a:buFont typeface="Arial" panose="020B0604020202020204" pitchFamily="34" charset="0"/>
+              <a:buChar char="•"/>
+              <a:defRPr sz="5960" kern="1200">
+                <a:solidFill>
+                  <a:schemeClr val="tx1"/>
+                </a:solidFill>
+                <a:latin typeface="+mn-lt"/>
+                <a:ea typeface="+mn-ea"/>
+                <a:cs typeface="+mn-cs"/>
+              </a:defRPr>
+            </a:lvl8pPr>
+            <a:lvl9pPr marL="12866820" indent="-756872" algn="l" defTabSz="3027487" rtl="0" eaLnBrk="1" latinLnBrk="0" hangingPunct="1">
+              <a:lnSpc>
+                <a:spcPct val="90000"/>
+              </a:lnSpc>
+              <a:spcBef>
+                <a:spcPts val="1655"/>
+              </a:spcBef>
+              <a:buFont typeface="Arial" panose="020B0604020202020204" pitchFamily="34" charset="0"/>
+              <a:buChar char="•"/>
+              <a:defRPr sz="5960" kern="1200">
+                <a:solidFill>
+                  <a:schemeClr val="tx1"/>
+                </a:solidFill>
+                <a:latin typeface="+mn-lt"/>
+                <a:ea typeface="+mn-ea"/>
+                <a:cs typeface="+mn-cs"/>
+              </a:defRPr>
+            </a:lvl9pPr>
+          </a:lstStyle>
+          <a:p>
+            <a:pPr marL="441325" indent="-441325" defTabSz="971550">
+              <a:spcBef>
+                <a:spcPts val="500"/>
+              </a:spcBef>
+              <a:buSzPct val="100000"/>
+              <a:buFont typeface="Arial" panose="020B0604020202020204" pitchFamily="34" charset="0"/>
+              <a:buAutoNum type="arabicPeriod"/>
+              <a:defRPr sz="2550" b="1"/>
+            </a:pPr>
+            <a:r>
+              <a:rPr lang="en-US" sz="3600" b="1" dirty="0" smtClean="0">
+                <a:latin typeface="Helvetica Neue"/>
+                <a:cs typeface="Helvetica" panose="020B0604020202020204" pitchFamily="34" charset="0"/>
+              </a:rPr>
+              <a:t>Large-scale measurements of path impairments</a:t>
+            </a:r>
+          </a:p>
+          <a:p>
+            <a:pPr marL="652462" lvl="1" indent="-381000" defTabSz="971550">
+              <a:spcBef>
+                <a:spcPts val="500"/>
+              </a:spcBef>
+              <a:defRPr sz="2550"/>
+            </a:pPr>
+            <a:r>
+              <a:rPr lang="en-US" sz="3200" dirty="0" smtClean="0">
+                <a:latin typeface="Helvetica Neue"/>
+                <a:cs typeface="Helvetica" panose="020B0604020202020204" pitchFamily="34" charset="0"/>
+              </a:rPr>
+              <a:t>using FIRE MONROE as well as RIPE Atlas, CAIDA Ark…</a:t>
+            </a:r>
+          </a:p>
+          <a:p>
+            <a:pPr marL="652462" lvl="1" indent="-381000" defTabSz="971550">
+              <a:spcBef>
+                <a:spcPts val="500"/>
+              </a:spcBef>
+              <a:defRPr sz="2550"/>
+            </a:pPr>
+            <a:r>
+              <a:rPr lang="en-US" sz="3200" dirty="0" smtClean="0">
+                <a:latin typeface="Helvetica Neue"/>
+                <a:cs typeface="Helvetica" panose="020B0604020202020204" pitchFamily="34" charset="0"/>
+              </a:rPr>
+              <a:t>UDP/TCP/SCTP connectivity, TCP options </a:t>
+            </a:r>
+            <a:br>
+              <a:rPr lang="en-US" sz="3200" dirty="0" smtClean="0">
+                <a:latin typeface="Helvetica Neue"/>
+                <a:cs typeface="Helvetica" panose="020B0604020202020204" pitchFamily="34" charset="0"/>
+              </a:rPr>
+            </a:br>
+            <a:r>
+              <a:rPr lang="en-US" sz="3200" dirty="0" smtClean="0">
+                <a:latin typeface="Helvetica Neue"/>
+                <a:cs typeface="Helvetica" panose="020B0604020202020204" pitchFamily="34" charset="0"/>
+              </a:rPr>
+              <a:t>(e.g. TFO, MPTCP), and other protocol (ICMP, DNS, …)</a:t>
+            </a:r>
+          </a:p>
+          <a:p>
+            <a:pPr marL="652462" lvl="1" indent="-381000" defTabSz="971550">
+              <a:spcBef>
+                <a:spcPts val="500"/>
+              </a:spcBef>
+              <a:defRPr sz="2550"/>
+            </a:pPr>
+            <a:endParaRPr lang="en-US" sz="1200" dirty="0" smtClean="0">
+              <a:latin typeface="Helvetica Neue"/>
+              <a:cs typeface="Helvetica" panose="020B0604020202020204" pitchFamily="34" charset="0"/>
+            </a:endParaRPr>
+          </a:p>
+          <a:p>
+            <a:pPr marL="441325" indent="-441325" defTabSz="971550">
+              <a:spcBef>
+                <a:spcPts val="500"/>
+              </a:spcBef>
+              <a:buSzPct val="100000"/>
+              <a:buFont typeface="Arial" panose="020B0604020202020204" pitchFamily="34" charset="0"/>
+              <a:buAutoNum type="arabicPeriod"/>
+              <a:defRPr sz="2550"/>
+            </a:pPr>
+            <a:r>
+              <a:rPr lang="en-US" sz="3600" b="1" dirty="0" smtClean="0">
+                <a:latin typeface="Helvetica Neue"/>
+                <a:cs typeface="Helvetica" panose="020B0604020202020204" pitchFamily="34" charset="0"/>
+              </a:rPr>
+              <a:t>Development of new measurements tools:</a:t>
+            </a:r>
+            <a:r>
+              <a:rPr lang="en-US" sz="3600" dirty="0" smtClean="0">
+                <a:latin typeface="Helvetica Neue"/>
+                <a:cs typeface="Helvetica" panose="020B0604020202020204" pitchFamily="34" charset="0"/>
+              </a:rPr>
+              <a:t> </a:t>
+            </a:r>
+            <a:r>
+              <a:rPr lang="en-US" sz="3200" u="sng" dirty="0" smtClean="0">
+                <a:solidFill>
+                  <a:srgbClr val="0000FF"/>
+                </a:solidFill>
+                <a:uFill>
+                  <a:solidFill>
+                    <a:srgbClr val="0000FF"/>
+                  </a:solidFill>
+                </a:uFill>
+                <a:latin typeface="Helvetica Neue"/>
+                <a:cs typeface="Helvetica" panose="020B0604020202020204" pitchFamily="34" charset="0"/>
+                <a:hlinkClick r:id="rId5"/>
+              </a:rPr>
+              <a:t>https://github.com/mami-project/</a:t>
+            </a:r>
+          </a:p>
+          <a:p>
+            <a:pPr marL="652462" lvl="1" indent="-381000" defTabSz="971550">
+              <a:spcBef>
+                <a:spcPts val="500"/>
+              </a:spcBef>
+              <a:defRPr sz="2550"/>
+            </a:pPr>
+            <a:r>
+              <a:rPr lang="en-US" sz="3200" dirty="0" err="1" smtClean="0">
+                <a:latin typeface="Helvetica Neue"/>
+                <a:cs typeface="Helvetica" panose="020B0604020202020204" pitchFamily="34" charset="0"/>
+              </a:rPr>
+              <a:t>Tracebox</a:t>
+            </a:r>
+            <a:r>
+              <a:rPr lang="en-US" sz="3200" dirty="0" smtClean="0">
+                <a:latin typeface="Helvetica Neue"/>
+                <a:cs typeface="Helvetica" panose="020B0604020202020204" pitchFamily="34" charset="0"/>
+              </a:rPr>
+              <a:t>: tracing + impairment analysis</a:t>
+            </a:r>
+          </a:p>
+          <a:p>
+            <a:pPr marL="652462" lvl="1" indent="-381000" defTabSz="971550">
+              <a:spcBef>
+                <a:spcPts val="500"/>
+              </a:spcBef>
+              <a:defRPr sz="2550"/>
+            </a:pPr>
+            <a:r>
+              <a:rPr lang="en-US" sz="3200" dirty="0" err="1" smtClean="0">
+                <a:latin typeface="Helvetica Neue"/>
+                <a:cs typeface="Helvetica" panose="020B0604020202020204" pitchFamily="34" charset="0"/>
+              </a:rPr>
+              <a:t>PathSpider</a:t>
+            </a:r>
+            <a:r>
+              <a:rPr lang="en-US" sz="3200" dirty="0" smtClean="0">
+                <a:latin typeface="Helvetica Neue"/>
+                <a:cs typeface="Helvetica" panose="020B0604020202020204" pitchFamily="34" charset="0"/>
+              </a:rPr>
+              <a:t>: A/B testing (currently on ECN support)</a:t>
+            </a:r>
+          </a:p>
+          <a:p>
+            <a:pPr marL="652462" lvl="1" indent="-381000" defTabSz="971550">
+              <a:spcBef>
+                <a:spcPts val="500"/>
+              </a:spcBef>
+              <a:defRPr sz="2550"/>
+            </a:pPr>
+            <a:endParaRPr lang="en-US" sz="1200" dirty="0" smtClean="0">
+              <a:latin typeface="Helvetica Neue"/>
+              <a:cs typeface="Helvetica" panose="020B0604020202020204" pitchFamily="34" charset="0"/>
+            </a:endParaRPr>
+          </a:p>
+          <a:p>
+            <a:pPr marL="441325" indent="-441325" defTabSz="971550">
+              <a:spcBef>
+                <a:spcPts val="500"/>
+              </a:spcBef>
+              <a:buSzPct val="100000"/>
+              <a:buFont typeface="Arial" panose="020B0604020202020204" pitchFamily="34" charset="0"/>
+              <a:buAutoNum type="arabicPeriod"/>
+              <a:defRPr sz="2550"/>
+            </a:pPr>
+            <a:r>
+              <a:rPr lang="en-US" sz="3600" b="1" dirty="0" smtClean="0">
+                <a:latin typeface="Helvetica Neue"/>
+                <a:cs typeface="Helvetica" panose="020B0604020202020204" pitchFamily="34" charset="0"/>
+              </a:rPr>
+              <a:t>Path Transparency Observatory</a:t>
+            </a:r>
+          </a:p>
+          <a:p>
+            <a:pPr marL="652462" lvl="1" indent="-381000" defTabSz="971550">
+              <a:spcBef>
+                <a:spcPts val="500"/>
+              </a:spcBef>
+              <a:defRPr sz="2550"/>
+            </a:pPr>
+            <a:r>
+              <a:rPr lang="en-US" sz="3200" dirty="0" smtClean="0">
+                <a:latin typeface="Helvetica Neue"/>
+                <a:cs typeface="Helvetica" panose="020B0604020202020204" pitchFamily="34" charset="0"/>
+              </a:rPr>
+              <a:t>Active measurements by the project + external measurements</a:t>
+            </a:r>
+          </a:p>
+          <a:p>
+            <a:pPr marL="652462" lvl="1" indent="-381000" defTabSz="971550">
+              <a:spcBef>
+                <a:spcPts val="500"/>
+              </a:spcBef>
+              <a:defRPr sz="2550"/>
+            </a:pPr>
+            <a:r>
+              <a:rPr lang="en-US" sz="3200" dirty="0" smtClean="0">
+                <a:latin typeface="Helvetica Neue"/>
+                <a:cs typeface="Helvetica" panose="020B0604020202020204" pitchFamily="34" charset="0"/>
+              </a:rPr>
+              <a:t>Query interface to access observations on path impairments:</a:t>
+            </a:r>
+          </a:p>
+          <a:p>
+            <a:pPr marL="851296" lvl="2" indent="-381000" defTabSz="971550">
+              <a:spcBef>
+                <a:spcPts val="500"/>
+              </a:spcBef>
+              <a:defRPr sz="2550"/>
+            </a:pPr>
+            <a:r>
+              <a:rPr lang="en-US" sz="3200" i="1" dirty="0" smtClean="0">
+                <a:latin typeface="Helvetica Neue"/>
+                <a:cs typeface="Helvetica" panose="020B0604020202020204" pitchFamily="34" charset="0"/>
+              </a:rPr>
+              <a:t>What is the likelihood that a certain path impairment impacts my traffic</a:t>
+            </a:r>
+            <a:r>
+              <a:rPr lang="en-US" sz="3200" dirty="0" smtClean="0">
+                <a:latin typeface="Helvetica Neue"/>
+                <a:cs typeface="Helvetica" panose="020B0604020202020204" pitchFamily="34" charset="0"/>
+              </a:rPr>
+              <a:t> (modifications/stripping/dropping/blocking)?</a:t>
+            </a:r>
+            <a:endParaRPr lang="en-US" sz="3200" dirty="0">
+              <a:latin typeface="Helvetica Neue"/>
+              <a:cs typeface="Helvetica" panose="020B0604020202020204" pitchFamily="34" charset="0"/>
+            </a:endParaRPr>
+          </a:p>
+        </p:txBody>
+      </p:sp>
+      <p:sp>
+        <p:nvSpPr>
+          <p:cNvPr id="2" name="Rechteck 1"/>
+          <p:cNvSpPr/>
+          <p:nvPr/>
+        </p:nvSpPr>
+        <p:spPr>
+          <a:xfrm>
+            <a:off x="16451031" y="16726571"/>
+            <a:ext cx="13004021" cy="6063198"/>
+          </a:xfrm>
+          <a:prstGeom prst="rect">
+            <a:avLst/>
+          </a:prstGeom>
+        </p:spPr>
+        <p:txBody>
+          <a:bodyPr wrap="square">
+            <a:spAutoFit/>
+          </a:bodyPr>
+          <a:lstStyle/>
+          <a:p>
+            <a:pPr marL="454526" indent="-454526">
+              <a:buClrTx/>
+              <a:buSzPct val="100000"/>
+              <a:buAutoNum type="arabicPeriod"/>
+              <a:defRPr b="1"/>
+            </a:pPr>
+            <a:r>
+              <a:rPr lang="en-US" sz="3600" dirty="0">
+                <a:latin typeface="Helvetica" panose="020B0604020202020204" pitchFamily="34" charset="0"/>
+                <a:cs typeface="Helvetica" panose="020B0604020202020204" pitchFamily="34" charset="0"/>
+              </a:rPr>
+              <a:t>Shim for </a:t>
+            </a:r>
+            <a:r>
+              <a:rPr lang="en-US" sz="3600" dirty="0" err="1">
+                <a:latin typeface="Helvetica" panose="020B0604020202020204" pitchFamily="34" charset="0"/>
+                <a:cs typeface="Helvetica" panose="020B0604020202020204" pitchFamily="34" charset="0"/>
+              </a:rPr>
+              <a:t>Middlebox</a:t>
+            </a:r>
+            <a:r>
+              <a:rPr lang="en-US" sz="3600" dirty="0">
+                <a:latin typeface="Helvetica" panose="020B0604020202020204" pitchFamily="34" charset="0"/>
+                <a:cs typeface="Helvetica" panose="020B0604020202020204" pitchFamily="34" charset="0"/>
+              </a:rPr>
+              <a:t> Cooperation Protocol (MCP)</a:t>
+            </a:r>
+          </a:p>
+          <a:p>
+            <a:pPr marL="722313" lvl="1" indent="-360363">
+              <a:buFont typeface="Arial" panose="020B0604020202020204" pitchFamily="34" charset="0"/>
+              <a:buChar char="•"/>
+            </a:pPr>
+            <a:r>
+              <a:rPr lang="en-US" sz="3200" dirty="0">
+                <a:latin typeface="Helvetica" panose="020B0604020202020204" pitchFamily="34" charset="0"/>
+                <a:cs typeface="Helvetica" panose="020B0604020202020204" pitchFamily="34" charset="0"/>
+              </a:rPr>
+              <a:t>Transport and applications can selectively expose semantic information to </a:t>
+            </a:r>
+            <a:r>
+              <a:rPr lang="en-US" sz="3200" dirty="0" err="1">
+                <a:latin typeface="Helvetica" panose="020B0604020202020204" pitchFamily="34" charset="0"/>
+                <a:cs typeface="Helvetica" panose="020B0604020202020204" pitchFamily="34" charset="0"/>
+              </a:rPr>
+              <a:t>middlebox</a:t>
+            </a:r>
+            <a:endParaRPr lang="en-US" sz="3200" dirty="0">
+              <a:latin typeface="Helvetica" panose="020B0604020202020204" pitchFamily="34" charset="0"/>
+              <a:cs typeface="Helvetica" panose="020B0604020202020204" pitchFamily="34" charset="0"/>
+            </a:endParaRPr>
+          </a:p>
+          <a:p>
+            <a:pPr marL="722313" lvl="1" indent="-360363">
+              <a:buFont typeface="Arial" panose="020B0604020202020204" pitchFamily="34" charset="0"/>
+              <a:buChar char="•"/>
+            </a:pPr>
+            <a:r>
+              <a:rPr lang="en-US" sz="3200" dirty="0">
+                <a:latin typeface="Helvetica" panose="020B0604020202020204" pitchFamily="34" charset="0"/>
+                <a:cs typeface="Helvetica" panose="020B0604020202020204" pitchFamily="34" charset="0"/>
+              </a:rPr>
+              <a:t>Higher layers can fully be </a:t>
+            </a:r>
+            <a:r>
+              <a:rPr lang="en-US" sz="3200" dirty="0" smtClean="0">
+                <a:latin typeface="Helvetica" panose="020B0604020202020204" pitchFamily="34" charset="0"/>
+                <a:cs typeface="Helvetica" panose="020B0604020202020204" pitchFamily="34" charset="0"/>
+              </a:rPr>
+              <a:t>encrypted</a:t>
+            </a:r>
+            <a:r>
+              <a:rPr lang="en-US" sz="3600" dirty="0" smtClean="0">
+                <a:latin typeface="Helvetica" panose="020B0604020202020204" pitchFamily="34" charset="0"/>
+                <a:cs typeface="Helvetica" panose="020B0604020202020204" pitchFamily="34" charset="0"/>
+              </a:rPr>
+              <a:t>!</a:t>
+            </a:r>
+            <a:endParaRPr lang="de-DE" sz="3600" dirty="0" smtClean="0">
+              <a:latin typeface="Helvetica" panose="020B0604020202020204" pitchFamily="34" charset="0"/>
+              <a:cs typeface="Helvetica" panose="020B0604020202020204" pitchFamily="34" charset="0"/>
+            </a:endParaRPr>
+          </a:p>
+          <a:p>
+            <a:pPr marL="361950" lvl="1"/>
+            <a:endParaRPr lang="en-US" sz="1200" dirty="0" smtClean="0">
+              <a:latin typeface="Helvetica" panose="020B0604020202020204" pitchFamily="34" charset="0"/>
+              <a:cs typeface="Helvetica" panose="020B0604020202020204" pitchFamily="34" charset="0"/>
+            </a:endParaRPr>
+          </a:p>
+          <a:p>
+            <a:pPr marL="722313" lvl="1" indent="-360363"/>
+            <a:endParaRPr lang="en-US" sz="1200" dirty="0">
+              <a:latin typeface="Helvetica" panose="020B0604020202020204" pitchFamily="34" charset="0"/>
+              <a:cs typeface="Helvetica" panose="020B0604020202020204" pitchFamily="34" charset="0"/>
+            </a:endParaRPr>
+          </a:p>
+          <a:p>
+            <a:pPr marL="536575" indent="-536575">
+              <a:buClrTx/>
+              <a:buSzPct val="100000"/>
+              <a:buAutoNum type="arabicPeriod"/>
+              <a:defRPr b="1"/>
+            </a:pPr>
+            <a:r>
+              <a:rPr lang="en-US" sz="3600" dirty="0">
+                <a:latin typeface="Helvetica" panose="020B0604020202020204" pitchFamily="34" charset="0"/>
+                <a:cs typeface="Helvetica" panose="020B0604020202020204" pitchFamily="34" charset="0"/>
+              </a:rPr>
+              <a:t>Flexible Transport Layer (FTL)</a:t>
+            </a:r>
+          </a:p>
+          <a:p>
+            <a:pPr marL="722313" lvl="1" indent="-360363">
+              <a:buFont typeface="Arial" panose="020B0604020202020204" pitchFamily="34" charset="0"/>
+              <a:buChar char="•"/>
+            </a:pPr>
+            <a:r>
+              <a:rPr lang="en-US" sz="3200" dirty="0">
+                <a:latin typeface="Helvetica" panose="020B0604020202020204" pitchFamily="34" charset="0"/>
+                <a:cs typeface="Helvetica" panose="020B0604020202020204" pitchFamily="34" charset="0"/>
+              </a:rPr>
+              <a:t>Maintain connectivity </a:t>
+            </a:r>
+            <a:r>
+              <a:rPr lang="en-US" sz="3200" dirty="0" smtClean="0">
+                <a:latin typeface="Helvetica" panose="020B0604020202020204" pitchFamily="34" charset="0"/>
+                <a:cs typeface="Helvetica" panose="020B0604020202020204" pitchFamily="34" charset="0"/>
+              </a:rPr>
+              <a:t/>
+            </a:r>
+            <a:br>
+              <a:rPr lang="en-US" sz="3200" dirty="0" smtClean="0">
+                <a:latin typeface="Helvetica" panose="020B0604020202020204" pitchFamily="34" charset="0"/>
+                <a:cs typeface="Helvetica" panose="020B0604020202020204" pitchFamily="34" charset="0"/>
+              </a:rPr>
+            </a:br>
+            <a:r>
+              <a:rPr lang="en-US" sz="3200" dirty="0" smtClean="0">
+                <a:latin typeface="Helvetica" panose="020B0604020202020204" pitchFamily="34" charset="0"/>
+                <a:cs typeface="Helvetica" panose="020B0604020202020204" pitchFamily="34" charset="0"/>
+              </a:rPr>
+              <a:t>(</a:t>
+            </a:r>
+            <a:r>
+              <a:rPr lang="en-US" sz="3200" dirty="0">
+                <a:latin typeface="Helvetica" panose="020B0604020202020204" pitchFamily="34" charset="0"/>
+                <a:cs typeface="Helvetica" panose="020B0604020202020204" pitchFamily="34" charset="0"/>
+              </a:rPr>
+              <a:t>even if </a:t>
+            </a:r>
+            <a:r>
+              <a:rPr lang="en-US" sz="3200" dirty="0" smtClean="0">
+                <a:latin typeface="Helvetica" panose="020B0604020202020204" pitchFamily="34" charset="0"/>
+                <a:cs typeface="Helvetica" panose="020B0604020202020204" pitchFamily="34" charset="0"/>
+              </a:rPr>
+              <a:t>the </a:t>
+            </a:r>
+            <a:r>
+              <a:rPr lang="en-US" sz="3200" dirty="0">
+                <a:latin typeface="Helvetica" panose="020B0604020202020204" pitchFamily="34" charset="0"/>
+                <a:cs typeface="Helvetica" panose="020B0604020202020204" pitchFamily="34" charset="0"/>
+              </a:rPr>
+              <a:t>MCP is not supported)</a:t>
+            </a:r>
+            <a:br>
+              <a:rPr lang="en-US" sz="3200" dirty="0">
+                <a:latin typeface="Helvetica" panose="020B0604020202020204" pitchFamily="34" charset="0"/>
+                <a:cs typeface="Helvetica" panose="020B0604020202020204" pitchFamily="34" charset="0"/>
+              </a:rPr>
+            </a:br>
+            <a:r>
+              <a:rPr lang="en-US" sz="3200" dirty="0">
+                <a:latin typeface="Helvetica" panose="020B0604020202020204" pitchFamily="34" charset="0"/>
+                <a:cs typeface="Helvetica" panose="020B0604020202020204" pitchFamily="34" charset="0"/>
+              </a:rPr>
+              <a:t>e.g. fallback or happy-eyeball </a:t>
+            </a:r>
+            <a:r>
+              <a:rPr lang="en-US" sz="3200" dirty="0" smtClean="0">
+                <a:latin typeface="Helvetica" panose="020B0604020202020204" pitchFamily="34" charset="0"/>
+                <a:cs typeface="Helvetica" panose="020B0604020202020204" pitchFamily="34" charset="0"/>
+              </a:rPr>
+              <a:t/>
+            </a:r>
+            <a:br>
+              <a:rPr lang="en-US" sz="3200" dirty="0" smtClean="0">
+                <a:latin typeface="Helvetica" panose="020B0604020202020204" pitchFamily="34" charset="0"/>
+                <a:cs typeface="Helvetica" panose="020B0604020202020204" pitchFamily="34" charset="0"/>
+              </a:rPr>
+            </a:br>
+            <a:r>
+              <a:rPr lang="en-US" sz="3200" dirty="0" smtClean="0">
+                <a:latin typeface="Helvetica" panose="020B0604020202020204" pitchFamily="34" charset="0"/>
+                <a:cs typeface="Helvetica" panose="020B0604020202020204" pitchFamily="34" charset="0"/>
+              </a:rPr>
+              <a:t>mechanisms</a:t>
+            </a:r>
+            <a:endParaRPr lang="en-US" sz="3200" dirty="0">
+              <a:latin typeface="Helvetica" panose="020B0604020202020204" pitchFamily="34" charset="0"/>
+              <a:cs typeface="Helvetica" panose="020B0604020202020204" pitchFamily="34" charset="0"/>
+            </a:endParaRPr>
+          </a:p>
+          <a:p>
+            <a:pPr marL="722313" lvl="1" indent="-360363">
+              <a:buFont typeface="Arial" panose="020B0604020202020204" pitchFamily="34" charset="0"/>
+              <a:buChar char="•"/>
+            </a:pPr>
+            <a:r>
+              <a:rPr lang="en-US" sz="3200" dirty="0">
+                <a:latin typeface="Helvetica" panose="020B0604020202020204" pitchFamily="34" charset="0"/>
+                <a:cs typeface="Helvetica" panose="020B0604020202020204" pitchFamily="34" charset="0"/>
+              </a:rPr>
+              <a:t>Provision of encryption context </a:t>
+            </a:r>
+            <a:r>
+              <a:rPr lang="en-US" sz="3200" dirty="0" smtClean="0">
+                <a:latin typeface="Helvetica" panose="020B0604020202020204" pitchFamily="34" charset="0"/>
+                <a:cs typeface="Helvetica" panose="020B0604020202020204" pitchFamily="34" charset="0"/>
+              </a:rPr>
+              <a:t/>
+            </a:r>
+            <a:br>
+              <a:rPr lang="en-US" sz="3200" dirty="0" smtClean="0">
+                <a:latin typeface="Helvetica" panose="020B0604020202020204" pitchFamily="34" charset="0"/>
+                <a:cs typeface="Helvetica" panose="020B0604020202020204" pitchFamily="34" charset="0"/>
+              </a:rPr>
+            </a:br>
+            <a:r>
+              <a:rPr lang="en-US" sz="3200" dirty="0" smtClean="0">
+                <a:latin typeface="Helvetica" panose="020B0604020202020204" pitchFamily="34" charset="0"/>
+                <a:cs typeface="Helvetica" panose="020B0604020202020204" pitchFamily="34" charset="0"/>
+              </a:rPr>
+              <a:t>for </a:t>
+            </a:r>
+            <a:r>
+              <a:rPr lang="en-US" sz="3200" dirty="0">
+                <a:latin typeface="Helvetica" panose="020B0604020202020204" pitchFamily="34" charset="0"/>
+                <a:cs typeface="Helvetica" panose="020B0604020202020204" pitchFamily="34" charset="0"/>
+              </a:rPr>
+              <a:t>different layers/protocols </a:t>
+            </a:r>
+            <a:endParaRPr lang="en-US" sz="3200" dirty="0">
+              <a:latin typeface="Helvetica" panose="020B0604020202020204" pitchFamily="34" charset="0"/>
+              <a:cs typeface="Helvetica" panose="020B0604020202020204" pitchFamily="34" charset="0"/>
+            </a:endParaRPr>
+          </a:p>
+        </p:txBody>
+      </p:sp>
+      <p:grpSp>
+        <p:nvGrpSpPr>
+          <p:cNvPr id="3" name="Gruppieren 2"/>
+          <p:cNvGrpSpPr/>
+          <p:nvPr/>
+        </p:nvGrpSpPr>
+        <p:grpSpPr>
+          <a:xfrm>
+            <a:off x="23962081" y="18096500"/>
+            <a:ext cx="4445001" cy="4495801"/>
+            <a:chOff x="24032062" y="17402662"/>
+            <a:chExt cx="4445001" cy="4495801"/>
+          </a:xfrm>
+        </p:grpSpPr>
+        <p:pic>
+          <p:nvPicPr>
+            <p:cNvPr id="23" name="pasted-image.pdf"/>
+            <p:cNvPicPr>
+              <a:picLocks noChangeAspect="1"/>
+            </p:cNvPicPr>
+            <p:nvPr/>
+          </p:nvPicPr>
+          <p:blipFill>
+            <a:blip r:embed="rId6">
+              <a:extLst/>
+            </a:blip>
+            <a:stretch>
+              <a:fillRect/>
+            </a:stretch>
+          </p:blipFill>
+          <p:spPr>
+            <a:xfrm>
+              <a:off x="24711251" y="17402662"/>
+              <a:ext cx="3022601" cy="927101"/>
+            </a:xfrm>
+            <a:prstGeom prst="rect">
+              <a:avLst/>
+            </a:prstGeom>
+            <a:ln w="12700">
+              <a:miter lim="400000"/>
+            </a:ln>
+          </p:spPr>
+        </p:pic>
+        <p:pic>
+          <p:nvPicPr>
+            <p:cNvPr id="24" name="pasted-image.pdf"/>
+            <p:cNvPicPr>
+              <a:picLocks noChangeAspect="1"/>
+            </p:cNvPicPr>
+            <p:nvPr/>
+          </p:nvPicPr>
+          <p:blipFill>
+            <a:blip r:embed="rId7">
+              <a:extLst/>
+            </a:blip>
+            <a:stretch>
+              <a:fillRect/>
+            </a:stretch>
+          </p:blipFill>
+          <p:spPr>
+            <a:xfrm>
+              <a:off x="24705162" y="18494862"/>
+              <a:ext cx="3378201" cy="927101"/>
+            </a:xfrm>
+            <a:prstGeom prst="rect">
+              <a:avLst/>
+            </a:prstGeom>
+            <a:ln w="12700">
+              <a:miter lim="400000"/>
+            </a:ln>
+          </p:spPr>
+        </p:pic>
+        <p:pic>
+          <p:nvPicPr>
+            <p:cNvPr id="25" name="pasted-image.pdf"/>
+            <p:cNvPicPr>
+              <a:picLocks noChangeAspect="1"/>
+            </p:cNvPicPr>
+            <p:nvPr/>
+          </p:nvPicPr>
+          <p:blipFill>
+            <a:blip r:embed="rId8">
+              <a:extLst/>
+            </a:blip>
+            <a:stretch>
+              <a:fillRect/>
+            </a:stretch>
+          </p:blipFill>
+          <p:spPr>
+            <a:xfrm>
+              <a:off x="24705162" y="19599762"/>
+              <a:ext cx="3276601" cy="927101"/>
+            </a:xfrm>
+            <a:prstGeom prst="rect">
+              <a:avLst/>
+            </a:prstGeom>
+            <a:ln w="12700">
+              <a:miter lim="400000"/>
+            </a:ln>
+          </p:spPr>
+        </p:pic>
+        <p:pic>
+          <p:nvPicPr>
+            <p:cNvPr id="26" name="pasted-image.pdf"/>
+            <p:cNvPicPr>
+              <a:picLocks noChangeAspect="1"/>
+            </p:cNvPicPr>
+            <p:nvPr/>
+          </p:nvPicPr>
+          <p:blipFill>
+            <a:blip r:embed="rId9">
+              <a:extLst/>
+            </a:blip>
+            <a:stretch>
+              <a:fillRect/>
+            </a:stretch>
+          </p:blipFill>
+          <p:spPr>
+            <a:xfrm>
+              <a:off x="24711512" y="20704662"/>
+              <a:ext cx="3467101" cy="1193801"/>
+            </a:xfrm>
+            <a:prstGeom prst="rect">
+              <a:avLst/>
+            </a:prstGeom>
+            <a:ln w="12700">
+              <a:miter lim="400000"/>
+            </a:ln>
+          </p:spPr>
+        </p:pic>
+        <p:pic>
+          <p:nvPicPr>
+            <p:cNvPr id="27" name="pasted-image.pdf"/>
+            <p:cNvPicPr>
+              <a:picLocks noChangeAspect="1"/>
+            </p:cNvPicPr>
+            <p:nvPr/>
+          </p:nvPicPr>
+          <p:blipFill>
+            <a:blip r:embed="rId10">
+              <a:extLst/>
+            </a:blip>
+            <a:stretch>
+              <a:fillRect/>
+            </a:stretch>
+          </p:blipFill>
+          <p:spPr>
+            <a:xfrm>
+              <a:off x="24032062" y="19250512"/>
+              <a:ext cx="4445001" cy="533401"/>
+            </a:xfrm>
+            <a:prstGeom prst="rect">
+              <a:avLst/>
+            </a:prstGeom>
+            <a:ln w="12700">
+              <a:miter lim="400000"/>
+            </a:ln>
+          </p:spPr>
+        </p:pic>
+      </p:grpSp>
+      <p:sp>
+        <p:nvSpPr>
+          <p:cNvPr id="30" name="Shape 220"/>
+          <p:cNvSpPr/>
+          <p:nvPr/>
+        </p:nvSpPr>
+        <p:spPr>
+          <a:xfrm rot="20869430">
+            <a:off x="23810500" y="22185333"/>
+            <a:ext cx="5129161" cy="1395254"/>
+          </a:xfrm>
+          <a:prstGeom prst="rect">
+            <a:avLst/>
+          </a:prstGeom>
+          <a:solidFill>
+            <a:srgbClr val="FFFFFF"/>
+          </a:solidFill>
+          <a:ln>
+            <a:solidFill>
+              <a:srgbClr val="FF8080"/>
+            </a:solidFill>
+          </a:ln>
+          <a:effectLst>
+            <a:softEdge rad="12700"/>
+          </a:effectLst>
+          <a:extLst>
+            <a:ext uri="{C572A759-6A51-4108-AA02-DFA0A04FC94B}">
+              <ma14:wrappingTextBoxFlag xmlns:ma14="http://schemas.microsoft.com/office/mac/drawingml/2011/main" xmlns="" val="1"/>
+            </a:ext>
+          </a:extLst>
+        </p:spPr>
+        <p:txBody>
+          <a:bodyPr wrap="none" lIns="50800" tIns="50800" rIns="50800" bIns="50800" numCol="1" anchor="ctr">
+            <a:spAutoFit/>
+          </a:bodyPr>
+          <a:lstStyle/>
+          <a:p>
+            <a:pPr>
+              <a:defRPr sz="4200" b="1">
+                <a:solidFill>
+                  <a:schemeClr val="accent5">
+                    <a:lumOff val="-8078"/>
+                  </a:schemeClr>
+                </a:solidFill>
+              </a:defRPr>
+            </a:pPr>
+            <a:r>
+              <a:rPr sz="2800" dirty="0">
+                <a:solidFill>
+                  <a:srgbClr val="FF0000"/>
+                </a:solidFill>
+                <a:latin typeface="Arial" panose="020B0604020202020204" pitchFamily="34" charset="0"/>
+                <a:cs typeface="Arial" panose="020B0604020202020204" pitchFamily="34" charset="0"/>
+              </a:rPr>
+              <a:t>Missing:</a:t>
+            </a:r>
+          </a:p>
+          <a:p>
+            <a:pPr algn="ctr">
+              <a:defRPr sz="3200" b="1">
+                <a:solidFill>
+                  <a:schemeClr val="accent5">
+                    <a:lumOff val="-8078"/>
+                  </a:schemeClr>
+                </a:solidFill>
+              </a:defRPr>
+            </a:pPr>
+            <a:r>
+              <a:rPr sz="2800" dirty="0">
+                <a:solidFill>
+                  <a:srgbClr val="FF0000"/>
+                </a:solidFill>
+                <a:latin typeface="Arial" panose="020B0604020202020204" pitchFamily="34" charset="0"/>
+                <a:cs typeface="Arial" panose="020B0604020202020204" pitchFamily="34" charset="0"/>
+              </a:rPr>
+              <a:t>Per-flow information for </a:t>
+            </a:r>
+          </a:p>
+          <a:p>
+            <a:pPr algn="ctr">
+              <a:defRPr sz="3200" b="1">
+                <a:solidFill>
+                  <a:schemeClr val="accent5">
+                    <a:lumOff val="-8078"/>
+                  </a:schemeClr>
+                </a:solidFill>
+              </a:defRPr>
+            </a:pPr>
+            <a:r>
+              <a:rPr sz="2800" dirty="0" err="1">
+                <a:solidFill>
+                  <a:srgbClr val="FF0000"/>
+                </a:solidFill>
+                <a:latin typeface="Arial" panose="020B0604020202020204" pitchFamily="34" charset="0"/>
+                <a:cs typeface="Arial" panose="020B0604020202020204" pitchFamily="34" charset="0"/>
+              </a:rPr>
+              <a:t>stateful</a:t>
+            </a:r>
+            <a:r>
+              <a:rPr sz="2800" dirty="0">
+                <a:solidFill>
+                  <a:srgbClr val="FF0000"/>
+                </a:solidFill>
+                <a:latin typeface="Arial" panose="020B0604020202020204" pitchFamily="34" charset="0"/>
+                <a:cs typeface="Arial" panose="020B0604020202020204" pitchFamily="34" charset="0"/>
+              </a:rPr>
+              <a:t> in-network functions</a:t>
+            </a:r>
+          </a:p>
+        </p:txBody>
+      </p:sp>
+      <p:sp>
+        <p:nvSpPr>
+          <p:cNvPr id="4" name="Textfeld 3"/>
+          <p:cNvSpPr txBox="1"/>
+          <p:nvPr/>
+        </p:nvSpPr>
+        <p:spPr>
+          <a:xfrm>
+            <a:off x="1520311" y="27028866"/>
+            <a:ext cx="12770489" cy="3046988"/>
+          </a:xfrm>
+          <a:prstGeom prst="rect">
+            <a:avLst/>
+          </a:prstGeom>
+          <a:noFill/>
+        </p:spPr>
+        <p:txBody>
+          <a:bodyPr wrap="square" rtlCol="0">
+            <a:spAutoFit/>
+          </a:bodyPr>
+          <a:lstStyle/>
+          <a:p>
+            <a:pPr marL="441325" indent="-441325">
+              <a:buFont typeface="+mj-lt"/>
+              <a:buAutoNum type="arabicPeriod"/>
+            </a:pPr>
+            <a:r>
+              <a:rPr lang="en-US" sz="3600" b="1" dirty="0">
+                <a:latin typeface="Helvetica" panose="020B0604020202020204" pitchFamily="34" charset="0"/>
+                <a:cs typeface="Helvetica" panose="020B0604020202020204" pitchFamily="34" charset="0"/>
+              </a:rPr>
+              <a:t>Testing the host </a:t>
+            </a:r>
+            <a:r>
+              <a:rPr lang="en-US" sz="3600" b="1" dirty="0" smtClean="0">
+                <a:latin typeface="Helvetica" panose="020B0604020202020204" pitchFamily="34" charset="0"/>
+                <a:cs typeface="Helvetica" panose="020B0604020202020204" pitchFamily="34" charset="0"/>
+              </a:rPr>
+              <a:t>implementation</a:t>
+            </a:r>
+          </a:p>
+          <a:p>
+            <a:pPr marL="630238" lvl="1" indent="-346075">
+              <a:buFont typeface="Arial" panose="020B0604020202020204" pitchFamily="34" charset="0"/>
+              <a:buChar char="•"/>
+            </a:pPr>
+            <a:r>
+              <a:rPr lang="en-US" sz="3600" dirty="0" smtClean="0">
+                <a:latin typeface="Helvetica" panose="020B0604020202020204" pitchFamily="34" charset="0"/>
+                <a:cs typeface="Helvetica" panose="020B0604020202020204" pitchFamily="34" charset="0"/>
+              </a:rPr>
+              <a:t>Testing applicability </a:t>
+            </a:r>
+            <a:r>
+              <a:rPr lang="en-US" sz="3600" dirty="0">
+                <a:latin typeface="Helvetica" panose="020B0604020202020204" pitchFamily="34" charset="0"/>
+                <a:cs typeface="Helvetica" panose="020B0604020202020204" pitchFamily="34" charset="0"/>
+              </a:rPr>
+              <a:t>of MCP in the </a:t>
+            </a:r>
+            <a:r>
+              <a:rPr lang="en-US" sz="3600" dirty="0" smtClean="0">
+                <a:latin typeface="Helvetica" panose="020B0604020202020204" pitchFamily="34" charset="0"/>
+                <a:cs typeface="Helvetica" panose="020B0604020202020204" pitchFamily="34" charset="0"/>
+              </a:rPr>
+              <a:t>Internet</a:t>
+            </a:r>
+          </a:p>
+          <a:p>
+            <a:pPr marL="630238" lvl="1" indent="-346075">
+              <a:buFont typeface="Arial" panose="020B0604020202020204" pitchFamily="34" charset="0"/>
+              <a:buChar char="•"/>
+            </a:pPr>
+            <a:endParaRPr lang="en-US" sz="1200" dirty="0">
+              <a:latin typeface="Helvetica" panose="020B0604020202020204" pitchFamily="34" charset="0"/>
+              <a:cs typeface="Helvetica" panose="020B0604020202020204" pitchFamily="34" charset="0"/>
+            </a:endParaRPr>
+          </a:p>
+          <a:p>
+            <a:pPr marL="441325" indent="-441325">
+              <a:buFont typeface="+mj-lt"/>
+              <a:buAutoNum type="arabicPeriod"/>
+            </a:pPr>
+            <a:r>
+              <a:rPr lang="en-US" sz="3600" b="1" dirty="0">
+                <a:latin typeface="Helvetica" panose="020B0604020202020204" pitchFamily="34" charset="0"/>
+                <a:cs typeface="Helvetica" panose="020B0604020202020204" pitchFamily="34" charset="0"/>
+              </a:rPr>
+              <a:t>Functional testing of </a:t>
+            </a:r>
+            <a:r>
+              <a:rPr lang="en-US" sz="3600" b="1" dirty="0" err="1">
+                <a:latin typeface="Helvetica" panose="020B0604020202020204" pitchFamily="34" charset="0"/>
+                <a:cs typeface="Helvetica" panose="020B0604020202020204" pitchFamily="34" charset="0"/>
+              </a:rPr>
+              <a:t>middlebox</a:t>
+            </a:r>
+            <a:r>
+              <a:rPr lang="en-US" sz="3600" b="1" dirty="0">
+                <a:latin typeface="Helvetica" panose="020B0604020202020204" pitchFamily="34" charset="0"/>
+                <a:cs typeface="Helvetica" panose="020B0604020202020204" pitchFamily="34" charset="0"/>
+              </a:rPr>
+              <a:t> </a:t>
+            </a:r>
+            <a:r>
+              <a:rPr lang="en-US" sz="3600" b="1" dirty="0" smtClean="0">
+                <a:latin typeface="Helvetica" panose="020B0604020202020204" pitchFamily="34" charset="0"/>
+                <a:cs typeface="Helvetica" panose="020B0604020202020204" pitchFamily="34" charset="0"/>
+              </a:rPr>
+              <a:t>implementation</a:t>
+            </a:r>
+          </a:p>
+          <a:p>
+            <a:pPr marL="630238" lvl="1" indent="-346075">
+              <a:buFont typeface="Arial" panose="020B0604020202020204" pitchFamily="34" charset="0"/>
+              <a:buChar char="•"/>
+            </a:pPr>
+            <a:r>
+              <a:rPr lang="en-US" sz="3600" dirty="0" smtClean="0">
+                <a:latin typeface="Helvetica" panose="020B0604020202020204" pitchFamily="34" charset="0"/>
+                <a:cs typeface="Helvetica" panose="020B0604020202020204" pitchFamily="34" charset="0"/>
+              </a:rPr>
+              <a:t>e.g</a:t>
+            </a:r>
+            <a:r>
+              <a:rPr lang="en-US" sz="3600" dirty="0">
+                <a:latin typeface="Helvetica" panose="020B0604020202020204" pitchFamily="34" charset="0"/>
+                <a:cs typeface="Helvetica" panose="020B0604020202020204" pitchFamily="34" charset="0"/>
+              </a:rPr>
+              <a:t>., Can </a:t>
+            </a:r>
+            <a:r>
+              <a:rPr lang="en-US" sz="3600" dirty="0" smtClean="0">
+                <a:latin typeface="Helvetica" panose="020B0604020202020204" pitchFamily="34" charset="0"/>
+                <a:cs typeface="Helvetica" panose="020B0604020202020204" pitchFamily="34" charset="0"/>
+              </a:rPr>
+              <a:t>desired </a:t>
+            </a:r>
+            <a:r>
+              <a:rPr lang="en-US" sz="3600" dirty="0">
+                <a:latin typeface="Helvetica" panose="020B0604020202020204" pitchFamily="34" charset="0"/>
+                <a:cs typeface="Helvetica" panose="020B0604020202020204" pitchFamily="34" charset="0"/>
+              </a:rPr>
+              <a:t>functionality be implemented in a NFV- based network?</a:t>
+            </a:r>
+          </a:p>
+        </p:txBody>
+      </p:sp>
+      <p:sp>
+        <p:nvSpPr>
+          <p:cNvPr id="68" name="Shape 177"/>
+          <p:cNvSpPr txBox="1">
+            <a:spLocks/>
+          </p:cNvSpPr>
+          <p:nvPr/>
+        </p:nvSpPr>
+        <p:spPr>
+          <a:xfrm>
+            <a:off x="16451031" y="27525840"/>
+            <a:ext cx="12022137" cy="6313456"/>
+          </a:xfrm>
+          <a:prstGeom prst="rect">
+            <a:avLst/>
+          </a:prstGeom>
+        </p:spPr>
+        <p:txBody>
+          <a:bodyPr/>
+          <a:lstStyle>
+            <a:lvl1pPr marL="756872" indent="-756872" algn="l" defTabSz="3027487" rtl="0" eaLnBrk="1" latinLnBrk="0" hangingPunct="1">
+              <a:lnSpc>
+                <a:spcPct val="90000"/>
+              </a:lnSpc>
+              <a:spcBef>
+                <a:spcPts val="3311"/>
+              </a:spcBef>
+              <a:buFont typeface="Arial" panose="020B0604020202020204" pitchFamily="34" charset="0"/>
+              <a:buChar char="•"/>
+              <a:defRPr sz="9271" kern="1200">
+                <a:solidFill>
+                  <a:schemeClr val="tx1"/>
+                </a:solidFill>
+                <a:latin typeface="+mn-lt"/>
+                <a:ea typeface="+mn-ea"/>
+                <a:cs typeface="+mn-cs"/>
+              </a:defRPr>
+            </a:lvl1pPr>
+            <a:lvl2pPr marL="2270615" indent="-756872" algn="l" defTabSz="3027487" rtl="0" eaLnBrk="1" latinLnBrk="0" hangingPunct="1">
+              <a:lnSpc>
+                <a:spcPct val="90000"/>
+              </a:lnSpc>
+              <a:spcBef>
+                <a:spcPts val="1655"/>
+              </a:spcBef>
+              <a:buFont typeface="Arial" panose="020B0604020202020204" pitchFamily="34" charset="0"/>
+              <a:buChar char="•"/>
+              <a:defRPr sz="7946" kern="1200">
+                <a:solidFill>
+                  <a:schemeClr val="tx1"/>
+                </a:solidFill>
+                <a:latin typeface="+mn-lt"/>
+                <a:ea typeface="+mn-ea"/>
+                <a:cs typeface="+mn-cs"/>
+              </a:defRPr>
+            </a:lvl2pPr>
+            <a:lvl3pPr marL="3784359" indent="-756872" algn="l" defTabSz="3027487" rtl="0" eaLnBrk="1" latinLnBrk="0" hangingPunct="1">
+              <a:lnSpc>
+                <a:spcPct val="90000"/>
+              </a:lnSpc>
+              <a:spcBef>
+                <a:spcPts val="1655"/>
+              </a:spcBef>
+              <a:buFont typeface="Arial" panose="020B0604020202020204" pitchFamily="34" charset="0"/>
+              <a:buChar char="•"/>
+              <a:defRPr sz="6622" kern="1200">
+                <a:solidFill>
+                  <a:schemeClr val="tx1"/>
+                </a:solidFill>
+                <a:latin typeface="+mn-lt"/>
+                <a:ea typeface="+mn-ea"/>
+                <a:cs typeface="+mn-cs"/>
+              </a:defRPr>
+            </a:lvl3pPr>
+            <a:lvl4pPr marL="5298102" indent="-756872" algn="l" defTabSz="3027487" rtl="0" eaLnBrk="1" latinLnBrk="0" hangingPunct="1">
+              <a:lnSpc>
+                <a:spcPct val="90000"/>
+              </a:lnSpc>
+              <a:spcBef>
+                <a:spcPts val="1655"/>
+              </a:spcBef>
+              <a:buFont typeface="Arial" panose="020B0604020202020204" pitchFamily="34" charset="0"/>
+              <a:buChar char="•"/>
+              <a:defRPr sz="5960" kern="1200">
+                <a:solidFill>
+                  <a:schemeClr val="tx1"/>
+                </a:solidFill>
+                <a:latin typeface="+mn-lt"/>
+                <a:ea typeface="+mn-ea"/>
+                <a:cs typeface="+mn-cs"/>
+              </a:defRPr>
+            </a:lvl4pPr>
+            <a:lvl5pPr marL="6811846" indent="-756872" algn="l" defTabSz="3027487" rtl="0" eaLnBrk="1" latinLnBrk="0" hangingPunct="1">
+              <a:lnSpc>
+                <a:spcPct val="90000"/>
+              </a:lnSpc>
+              <a:spcBef>
+                <a:spcPts val="1655"/>
+              </a:spcBef>
+              <a:buFont typeface="Arial" panose="020B0604020202020204" pitchFamily="34" charset="0"/>
+              <a:buChar char="•"/>
+              <a:defRPr sz="5960" kern="1200">
+                <a:solidFill>
+                  <a:schemeClr val="tx1"/>
+                </a:solidFill>
+                <a:latin typeface="+mn-lt"/>
+                <a:ea typeface="+mn-ea"/>
+                <a:cs typeface="+mn-cs"/>
+              </a:defRPr>
+            </a:lvl5pPr>
+            <a:lvl6pPr marL="8325589" indent="-756872" algn="l" defTabSz="3027487" rtl="0" eaLnBrk="1" latinLnBrk="0" hangingPunct="1">
+              <a:lnSpc>
+                <a:spcPct val="90000"/>
+              </a:lnSpc>
+              <a:spcBef>
+                <a:spcPts val="1655"/>
+              </a:spcBef>
+              <a:buFont typeface="Arial" panose="020B0604020202020204" pitchFamily="34" charset="0"/>
+              <a:buChar char="•"/>
+              <a:defRPr sz="5960" kern="1200">
+                <a:solidFill>
+                  <a:schemeClr val="tx1"/>
+                </a:solidFill>
+                <a:latin typeface="+mn-lt"/>
+                <a:ea typeface="+mn-ea"/>
+                <a:cs typeface="+mn-cs"/>
+              </a:defRPr>
+            </a:lvl6pPr>
+            <a:lvl7pPr marL="9839333" indent="-756872" algn="l" defTabSz="3027487" rtl="0" eaLnBrk="1" latinLnBrk="0" hangingPunct="1">
+              <a:lnSpc>
+                <a:spcPct val="90000"/>
+              </a:lnSpc>
+              <a:spcBef>
+                <a:spcPts val="1655"/>
+              </a:spcBef>
+              <a:buFont typeface="Arial" panose="020B0604020202020204" pitchFamily="34" charset="0"/>
+              <a:buChar char="•"/>
+              <a:defRPr sz="5960" kern="1200">
+                <a:solidFill>
+                  <a:schemeClr val="tx1"/>
+                </a:solidFill>
+                <a:latin typeface="+mn-lt"/>
+                <a:ea typeface="+mn-ea"/>
+                <a:cs typeface="+mn-cs"/>
+              </a:defRPr>
+            </a:lvl7pPr>
+            <a:lvl8pPr marL="11353076" indent="-756872" algn="l" defTabSz="3027487" rtl="0" eaLnBrk="1" latinLnBrk="0" hangingPunct="1">
+              <a:lnSpc>
+                <a:spcPct val="90000"/>
+              </a:lnSpc>
+              <a:spcBef>
+                <a:spcPts val="1655"/>
+              </a:spcBef>
+              <a:buFont typeface="Arial" panose="020B0604020202020204" pitchFamily="34" charset="0"/>
+              <a:buChar char="•"/>
+              <a:defRPr sz="5960" kern="1200">
+                <a:solidFill>
+                  <a:schemeClr val="tx1"/>
+                </a:solidFill>
+                <a:latin typeface="+mn-lt"/>
+                <a:ea typeface="+mn-ea"/>
+                <a:cs typeface="+mn-cs"/>
+              </a:defRPr>
+            </a:lvl8pPr>
+            <a:lvl9pPr marL="12866820" indent="-756872" algn="l" defTabSz="3027487" rtl="0" eaLnBrk="1" latinLnBrk="0" hangingPunct="1">
+              <a:lnSpc>
+                <a:spcPct val="90000"/>
+              </a:lnSpc>
+              <a:spcBef>
+                <a:spcPts val="1655"/>
+              </a:spcBef>
+              <a:buFont typeface="Arial" panose="020B0604020202020204" pitchFamily="34" charset="0"/>
+              <a:buChar char="•"/>
+              <a:defRPr sz="5960" kern="1200">
+                <a:solidFill>
+                  <a:schemeClr val="tx1"/>
+                </a:solidFill>
+                <a:latin typeface="+mn-lt"/>
+                <a:ea typeface="+mn-ea"/>
+                <a:cs typeface="+mn-cs"/>
+              </a:defRPr>
+            </a:lvl9pPr>
+          </a:lstStyle>
+          <a:p>
+            <a:pPr marL="482600" indent="-482600" defTabSz="1230630">
+              <a:spcBef>
+                <a:spcPts val="600"/>
+              </a:spcBef>
+              <a:defRPr sz="3230"/>
+            </a:pPr>
+            <a:r>
+              <a:rPr lang="en-US" sz="3230" smtClean="0"/>
+              <a:t>Observatory (public release end 2016) to derive common </a:t>
+            </a:r>
+            <a:r>
+              <a:rPr lang="en-US" sz="3230" b="1" i="1" smtClean="0">
+                <a:solidFill>
+                  <a:schemeClr val="accent5">
+                    <a:satOff val="-30358"/>
+                    <a:lumOff val="14901"/>
+                  </a:schemeClr>
+                </a:solidFill>
+              </a:rPr>
+              <a:t>observations</a:t>
+            </a:r>
+            <a:r>
+              <a:rPr lang="en-US" sz="3230" smtClean="0"/>
+              <a:t> about </a:t>
+            </a:r>
+            <a:r>
+              <a:rPr lang="en-US" sz="3230" i="1" smtClean="0">
+                <a:solidFill>
+                  <a:schemeClr val="accent5">
+                    <a:satOff val="-30358"/>
+                    <a:lumOff val="14901"/>
+                  </a:schemeClr>
+                </a:solidFill>
+              </a:rPr>
+              <a:t>conditions</a:t>
+            </a:r>
+            <a:r>
+              <a:rPr lang="en-US" sz="3230" smtClean="0"/>
+              <a:t> on a given </a:t>
+            </a:r>
+            <a:r>
+              <a:rPr lang="en-US" sz="3230" i="1" smtClean="0">
+                <a:solidFill>
+                  <a:schemeClr val="accent5">
+                    <a:satOff val="-30358"/>
+                    <a:lumOff val="14901"/>
+                  </a:schemeClr>
+                </a:solidFill>
+              </a:rPr>
+              <a:t>path</a:t>
+            </a:r>
+            <a:r>
+              <a:rPr lang="en-US" sz="3230" smtClean="0"/>
+              <a:t> at a given </a:t>
+            </a:r>
+            <a:r>
+              <a:rPr lang="en-US" sz="3230" i="1" smtClean="0">
+                <a:solidFill>
+                  <a:schemeClr val="accent5">
+                    <a:satOff val="-30358"/>
+                    <a:lumOff val="14901"/>
+                  </a:schemeClr>
+                </a:solidFill>
+              </a:rPr>
+              <a:t>time</a:t>
+            </a:r>
+          </a:p>
+          <a:p>
+            <a:pPr marL="482600" indent="-482600" defTabSz="1230630">
+              <a:spcBef>
+                <a:spcPts val="600"/>
+              </a:spcBef>
+              <a:defRPr sz="3230"/>
+            </a:pPr>
+            <a:r>
+              <a:rPr lang="en-US" sz="3230" smtClean="0"/>
+              <a:t>Combining disparate measurements leads to better insight</a:t>
+            </a:r>
+          </a:p>
+          <a:p>
+            <a:pPr marL="826452" lvl="1" indent="-482600" defTabSz="1230630">
+              <a:spcBef>
+                <a:spcPts val="600"/>
+              </a:spcBef>
+              <a:defRPr sz="3230"/>
+            </a:pPr>
+            <a:r>
+              <a:rPr lang="en-US" sz="3230" smtClean="0"/>
+              <a:t>e.g. own measurement data, traceroutes, BGP, traces</a:t>
+            </a:r>
+          </a:p>
+          <a:p>
+            <a:pPr marL="482600" indent="-482600" defTabSz="1230630">
+              <a:spcBef>
+                <a:spcPts val="600"/>
+              </a:spcBef>
+              <a:defRPr sz="3230"/>
+            </a:pPr>
+            <a:endParaRPr lang="en-US" sz="3230" smtClean="0"/>
+          </a:p>
+          <a:p>
+            <a:pPr marL="482600" indent="-482600" defTabSz="1230630">
+              <a:spcBef>
+                <a:spcPts val="600"/>
+              </a:spcBef>
+              <a:defRPr sz="3230"/>
+            </a:pPr>
+            <a:endParaRPr lang="en-US" sz="3230" smtClean="0"/>
+          </a:p>
+          <a:p>
+            <a:pPr marL="482600" indent="-482600" defTabSz="1230630">
+              <a:spcBef>
+                <a:spcPts val="600"/>
+              </a:spcBef>
+              <a:defRPr sz="3230"/>
+            </a:pPr>
+            <a:endParaRPr lang="en-US" sz="3230" smtClean="0"/>
+          </a:p>
+          <a:p>
+            <a:pPr marL="482600" indent="-482600" defTabSz="1230630">
+              <a:spcBef>
+                <a:spcPts val="600"/>
+              </a:spcBef>
+              <a:defRPr sz="4845"/>
+            </a:pPr>
+            <a:endParaRPr lang="en-US" sz="4845" smtClean="0"/>
+          </a:p>
+          <a:p>
+            <a:pPr marL="0" indent="0" defTabSz="1230630">
+              <a:spcBef>
+                <a:spcPts val="600"/>
+              </a:spcBef>
+              <a:buFont typeface="Arial" panose="020B0604020202020204" pitchFamily="34" charset="0"/>
+              <a:buNone/>
+              <a:defRPr sz="3230"/>
+            </a:pPr>
+            <a:r>
+              <a:rPr lang="en-US" sz="3230" smtClean="0"/>
+              <a:t>Follow </a:t>
+            </a:r>
+            <a:r>
+              <a:rPr lang="en-US" sz="3230" u="sng" smtClean="0">
+                <a:solidFill>
+                  <a:srgbClr val="0000FF"/>
+                </a:solidFill>
+                <a:uFill>
+                  <a:solidFill>
+                    <a:srgbClr val="0000FF"/>
+                  </a:solidFill>
+                </a:uFill>
+                <a:hlinkClick r:id="rId11"/>
+              </a:rPr>
+              <a:t>http://mami-project.eu</a:t>
+            </a:r>
+            <a:r>
+              <a:rPr lang="en-US" sz="3230" smtClean="0"/>
+              <a:t> for availability!</a:t>
+            </a:r>
+            <a:endParaRPr lang="en-US" sz="3230"/>
+          </a:p>
+        </p:txBody>
+      </p:sp>
+      <p:grpSp>
+        <p:nvGrpSpPr>
+          <p:cNvPr id="69" name="Group 194"/>
+          <p:cNvGrpSpPr/>
+          <p:nvPr/>
+        </p:nvGrpSpPr>
+        <p:grpSpPr>
+          <a:xfrm>
+            <a:off x="17512098" y="30293843"/>
+            <a:ext cx="9900002" cy="2462598"/>
+            <a:chOff x="0" y="0"/>
+            <a:chExt cx="9900000" cy="2462597"/>
+          </a:xfrm>
+        </p:grpSpPr>
+        <p:sp>
+          <p:nvSpPr>
+            <p:cNvPr id="70" name="Shape 179"/>
+            <p:cNvSpPr/>
+            <p:nvPr/>
+          </p:nvSpPr>
+          <p:spPr>
+            <a:xfrm>
+              <a:off x="0" y="0"/>
+              <a:ext cx="2328269" cy="1083517"/>
+            </a:xfrm>
+            <a:prstGeom prst="roundRect">
+              <a:avLst>
+                <a:gd name="adj" fmla="val 50000"/>
+              </a:avLst>
+            </a:prstGeom>
+            <a:gradFill flip="none" rotWithShape="1">
+              <a:gsLst>
+                <a:gs pos="0">
+                  <a:schemeClr val="accent4">
+                    <a:hueOff val="-782216"/>
+                    <a:satOff val="13445"/>
+                    <a:lumOff val="36756"/>
+                  </a:schemeClr>
+                </a:gs>
+                <a:gs pos="35000">
+                  <a:srgbClr val="FFD0C3"/>
+                </a:gs>
+                <a:gs pos="100000">
+                  <a:schemeClr val="accent4">
+                    <a:hueOff val="-854692"/>
+                    <a:satOff val="13445"/>
+                    <a:lumOff val="48875"/>
+                  </a:schemeClr>
+                </a:gs>
+              </a:gsLst>
+              <a:lin ang="16200000" scaled="0"/>
+            </a:gradFill>
+            <a:ln w="12700" cap="flat">
+              <a:solidFill>
+                <a:srgbClr val="C82101"/>
+              </a:solidFill>
+              <a:prstDash val="solid"/>
+              <a:round/>
+            </a:ln>
+            <a:effectLst>
+              <a:outerShdw blurRad="50800" dist="12700" rotWithShape="0">
+                <a:srgbClr val="000000">
+                  <a:alpha val="50000"/>
+                </a:srgbClr>
+              </a:outerShdw>
+            </a:effectLst>
+            <a:extLst>
+              <a:ext uri="{C572A759-6A51-4108-AA02-DFA0A04FC94B}">
+                <ma14:wrappingTextBoxFlag xmlns:ma14="http://schemas.microsoft.com/office/mac/drawingml/2011/main" xmlns="" val="1"/>
+              </a:ext>
+            </a:extLst>
+          </p:spPr>
+          <p:txBody>
+            <a:bodyPr wrap="square" lIns="38100" tIns="38100" rIns="38100" bIns="38100" numCol="1" anchor="ctr">
+              <a:noAutofit/>
+            </a:bodyPr>
+            <a:lstStyle/>
+            <a:p>
+              <a:pPr algn="ctr">
+                <a:defRPr sz="1800"/>
+              </a:pPr>
+              <a:r>
+                <a:t>active A/B test</a:t>
+              </a:r>
+            </a:p>
+            <a:p>
+              <a:pPr algn="ctr">
+                <a:defRPr sz="1800"/>
+              </a:pPr>
+              <a:r>
+                <a:t>(PathSpider)</a:t>
+              </a:r>
+            </a:p>
+          </p:txBody>
+        </p:sp>
+        <p:sp>
+          <p:nvSpPr>
+            <p:cNvPr id="71" name="Shape 180"/>
+            <p:cNvSpPr/>
+            <p:nvPr/>
+          </p:nvSpPr>
+          <p:spPr>
+            <a:xfrm>
+              <a:off x="7808523" y="263435"/>
+              <a:ext cx="2091478" cy="516860"/>
+            </a:xfrm>
+            <a:prstGeom prst="roundRect">
+              <a:avLst>
+                <a:gd name="adj" fmla="val 50000"/>
+              </a:avLst>
+            </a:prstGeom>
+            <a:gradFill flip="none" rotWithShape="1">
+              <a:gsLst>
+                <a:gs pos="0">
+                  <a:schemeClr val="accent4">
+                    <a:hueOff val="-782216"/>
+                    <a:satOff val="13445"/>
+                    <a:lumOff val="36756"/>
+                  </a:schemeClr>
+                </a:gs>
+                <a:gs pos="35000">
+                  <a:srgbClr val="FFD0C3"/>
+                </a:gs>
+                <a:gs pos="100000">
+                  <a:schemeClr val="accent4">
+                    <a:hueOff val="-854692"/>
+                    <a:satOff val="13445"/>
+                    <a:lumOff val="48875"/>
+                  </a:schemeClr>
+                </a:gs>
+              </a:gsLst>
+              <a:lin ang="16200000" scaled="0"/>
+            </a:gradFill>
+            <a:ln w="12700" cap="flat">
+              <a:solidFill>
+                <a:srgbClr val="C82101"/>
+              </a:solidFill>
+              <a:prstDash val="solid"/>
+              <a:round/>
+            </a:ln>
+            <a:effectLst>
+              <a:outerShdw blurRad="50800" dist="12700" rotWithShape="0">
+                <a:srgbClr val="000000">
+                  <a:alpha val="50000"/>
+                </a:srgbClr>
+              </a:outerShdw>
+            </a:effectLst>
+            <a:extLst>
+              <a:ext uri="{C572A759-6A51-4108-AA02-DFA0A04FC94B}">
+                <ma14:wrappingTextBoxFlag xmlns:ma14="http://schemas.microsoft.com/office/mac/drawingml/2011/main" xmlns="" val="1"/>
+              </a:ext>
+            </a:extLst>
+          </p:spPr>
+          <p:txBody>
+            <a:bodyPr wrap="square" lIns="38100" tIns="38100" rIns="38100" bIns="38100" numCol="1" anchor="ctr">
+              <a:noAutofit/>
+            </a:bodyPr>
+            <a:lstStyle>
+              <a:lvl1pPr algn="ctr">
+                <a:defRPr sz="1800"/>
+              </a:lvl1pPr>
+            </a:lstStyle>
+            <a:p>
+              <a:r>
+                <a:t>traceroute</a:t>
+              </a:r>
+            </a:p>
+          </p:txBody>
+        </p:sp>
+        <p:sp>
+          <p:nvSpPr>
+            <p:cNvPr id="72" name="Shape 181"/>
+            <p:cNvSpPr/>
+            <p:nvPr/>
+          </p:nvSpPr>
+          <p:spPr>
+            <a:xfrm>
+              <a:off x="0" y="1379080"/>
+              <a:ext cx="2328269" cy="1083518"/>
+            </a:xfrm>
+            <a:prstGeom prst="roundRect">
+              <a:avLst>
+                <a:gd name="adj" fmla="val 50000"/>
+              </a:avLst>
+            </a:prstGeom>
+            <a:gradFill flip="none" rotWithShape="1">
+              <a:gsLst>
+                <a:gs pos="0">
+                  <a:schemeClr val="accent4">
+                    <a:hueOff val="-782216"/>
+                    <a:satOff val="13445"/>
+                    <a:lumOff val="36756"/>
+                  </a:schemeClr>
+                </a:gs>
+                <a:gs pos="35000">
+                  <a:srgbClr val="FFD0C3"/>
+                </a:gs>
+                <a:gs pos="100000">
+                  <a:schemeClr val="accent4">
+                    <a:hueOff val="-854692"/>
+                    <a:satOff val="13445"/>
+                    <a:lumOff val="48875"/>
+                  </a:schemeClr>
+                </a:gs>
+              </a:gsLst>
+              <a:lin ang="16200000" scaled="0"/>
+            </a:gradFill>
+            <a:ln w="12700" cap="flat">
+              <a:solidFill>
+                <a:srgbClr val="C82101"/>
+              </a:solidFill>
+              <a:prstDash val="solid"/>
+              <a:round/>
+            </a:ln>
+            <a:effectLst>
+              <a:outerShdw blurRad="50800" dist="12700" rotWithShape="0">
+                <a:srgbClr val="000000">
+                  <a:alpha val="50000"/>
+                </a:srgbClr>
+              </a:outerShdw>
+            </a:effectLst>
+            <a:extLst>
+              <a:ext uri="{C572A759-6A51-4108-AA02-DFA0A04FC94B}">
+                <ma14:wrappingTextBoxFlag xmlns:ma14="http://schemas.microsoft.com/office/mac/drawingml/2011/main" xmlns="" val="1"/>
+              </a:ext>
+            </a:extLst>
+          </p:spPr>
+          <p:txBody>
+            <a:bodyPr wrap="square" lIns="38100" tIns="38100" rIns="38100" bIns="38100" numCol="1" anchor="ctr">
+              <a:noAutofit/>
+            </a:bodyPr>
+            <a:lstStyle/>
+            <a:p>
+              <a:pPr algn="ctr">
+                <a:defRPr sz="2000"/>
+              </a:pPr>
+              <a:r>
+                <a:t>mod trace</a:t>
+              </a:r>
+            </a:p>
+            <a:p>
+              <a:pPr algn="ctr">
+                <a:defRPr sz="2000"/>
+              </a:pPr>
+              <a:r>
+                <a:t>(tracebox)</a:t>
+              </a:r>
+            </a:p>
+          </p:txBody>
+        </p:sp>
+        <p:sp>
+          <p:nvSpPr>
+            <p:cNvPr id="73" name="Shape 182"/>
+            <p:cNvSpPr/>
+            <p:nvPr/>
+          </p:nvSpPr>
+          <p:spPr>
+            <a:xfrm>
+              <a:off x="7808523" y="1014115"/>
+              <a:ext cx="2091478" cy="516861"/>
+            </a:xfrm>
+            <a:prstGeom prst="roundRect">
+              <a:avLst>
+                <a:gd name="adj" fmla="val 50000"/>
+              </a:avLst>
+            </a:prstGeom>
+            <a:gradFill flip="none" rotWithShape="1">
+              <a:gsLst>
+                <a:gs pos="0">
+                  <a:schemeClr val="accent4">
+                    <a:hueOff val="-782216"/>
+                    <a:satOff val="13445"/>
+                    <a:lumOff val="36756"/>
+                  </a:schemeClr>
+                </a:gs>
+                <a:gs pos="35000">
+                  <a:srgbClr val="FFD0C3"/>
+                </a:gs>
+                <a:gs pos="100000">
+                  <a:schemeClr val="accent4">
+                    <a:hueOff val="-854692"/>
+                    <a:satOff val="13445"/>
+                    <a:lumOff val="48875"/>
+                  </a:schemeClr>
+                </a:gs>
+              </a:gsLst>
+              <a:lin ang="16200000" scaled="0"/>
+            </a:gradFill>
+            <a:ln w="12700" cap="flat">
+              <a:solidFill>
+                <a:srgbClr val="C82101"/>
+              </a:solidFill>
+              <a:prstDash val="solid"/>
+              <a:round/>
+            </a:ln>
+            <a:effectLst>
+              <a:outerShdw blurRad="50800" dist="12700" rotWithShape="0">
+                <a:srgbClr val="000000">
+                  <a:alpha val="50000"/>
+                </a:srgbClr>
+              </a:outerShdw>
+            </a:effectLst>
+            <a:extLst>
+              <a:ext uri="{C572A759-6A51-4108-AA02-DFA0A04FC94B}">
+                <ma14:wrappingTextBoxFlag xmlns:ma14="http://schemas.microsoft.com/office/mac/drawingml/2011/main" xmlns="" val="1"/>
+              </a:ext>
+            </a:extLst>
+          </p:spPr>
+          <p:txBody>
+            <a:bodyPr wrap="square" lIns="38100" tIns="38100" rIns="38100" bIns="38100" numCol="1" anchor="ctr">
+              <a:noAutofit/>
+            </a:bodyPr>
+            <a:lstStyle>
+              <a:lvl1pPr algn="ctr">
+                <a:defRPr sz="1800"/>
+              </a:lvl1pPr>
+            </a:lstStyle>
+            <a:p>
+              <a:r>
+                <a:t>looking glass</a:t>
+              </a:r>
+            </a:p>
+          </p:txBody>
+        </p:sp>
+        <p:sp>
+          <p:nvSpPr>
+            <p:cNvPr id="74" name="Shape 183"/>
+            <p:cNvSpPr/>
+            <p:nvPr/>
+          </p:nvSpPr>
+          <p:spPr>
+            <a:xfrm>
+              <a:off x="7808523" y="1759966"/>
+              <a:ext cx="2091478" cy="516861"/>
+            </a:xfrm>
+            <a:prstGeom prst="roundRect">
+              <a:avLst>
+                <a:gd name="adj" fmla="val 50000"/>
+              </a:avLst>
+            </a:prstGeom>
+            <a:gradFill flip="none" rotWithShape="1">
+              <a:gsLst>
+                <a:gs pos="0">
+                  <a:schemeClr val="accent4">
+                    <a:hueOff val="-782216"/>
+                    <a:satOff val="13445"/>
+                    <a:lumOff val="36756"/>
+                  </a:schemeClr>
+                </a:gs>
+                <a:gs pos="35000">
+                  <a:srgbClr val="FFD0C3"/>
+                </a:gs>
+                <a:gs pos="100000">
+                  <a:schemeClr val="accent4">
+                    <a:hueOff val="-854692"/>
+                    <a:satOff val="13445"/>
+                    <a:lumOff val="48875"/>
+                  </a:schemeClr>
+                </a:gs>
+              </a:gsLst>
+              <a:lin ang="16200000" scaled="0"/>
+            </a:gradFill>
+            <a:ln w="12700" cap="flat">
+              <a:solidFill>
+                <a:srgbClr val="C82101"/>
+              </a:solidFill>
+              <a:prstDash val="solid"/>
+              <a:round/>
+            </a:ln>
+            <a:effectLst>
+              <a:outerShdw blurRad="50800" dist="12700" rotWithShape="0">
+                <a:srgbClr val="000000">
+                  <a:alpha val="50000"/>
+                </a:srgbClr>
+              </a:outerShdw>
+            </a:effectLst>
+            <a:extLst>
+              <a:ext uri="{C572A759-6A51-4108-AA02-DFA0A04FC94B}">
+                <ma14:wrappingTextBoxFlag xmlns:ma14="http://schemas.microsoft.com/office/mac/drawingml/2011/main" xmlns="" val="1"/>
+              </a:ext>
+            </a:extLst>
+          </p:spPr>
+          <p:txBody>
+            <a:bodyPr wrap="square" lIns="38100" tIns="38100" rIns="38100" bIns="38100" numCol="1" anchor="ctr">
+              <a:noAutofit/>
+            </a:bodyPr>
+            <a:lstStyle>
+              <a:lvl1pPr algn="ctr">
+                <a:defRPr sz="1800"/>
+              </a:lvl1pPr>
+            </a:lstStyle>
+            <a:p>
+              <a:r>
+                <a:t>etc.</a:t>
+              </a:r>
+            </a:p>
+          </p:txBody>
+        </p:sp>
+        <p:sp>
+          <p:nvSpPr>
+            <p:cNvPr id="75" name="Shape 184"/>
+            <p:cNvSpPr/>
+            <p:nvPr/>
+          </p:nvSpPr>
+          <p:spPr>
+            <a:xfrm>
+              <a:off x="4128066" y="251084"/>
+              <a:ext cx="2126932" cy="2126932"/>
+            </a:xfrm>
+            <a:prstGeom prst="ellipse">
+              <a:avLst/>
+            </a:prstGeom>
+            <a:gradFill flip="none" rotWithShape="1">
+              <a:gsLst>
+                <a:gs pos="0">
+                  <a:srgbClr val="CE2100"/>
+                </a:gs>
+                <a:gs pos="100000">
+                  <a:schemeClr val="accent5">
+                    <a:hueOff val="-477027"/>
+                    <a:satOff val="5825"/>
+                    <a:lumOff val="41095"/>
+                  </a:schemeClr>
+                </a:gs>
+              </a:gsLst>
+              <a:lin ang="16200000" scaled="0"/>
+            </a:gradFill>
+            <a:ln w="9525" cap="flat">
+              <a:solidFill>
+                <a:srgbClr val="C82101"/>
+              </a:solidFill>
+              <a:prstDash val="solid"/>
+              <a:round/>
+            </a:ln>
+            <a:effectLst>
+              <a:outerShdw blurRad="50800" dist="12700" rotWithShape="0">
+                <a:srgbClr val="000000">
+                  <a:alpha val="50000"/>
+                </a:srgbClr>
+              </a:outerShdw>
+            </a:effectLst>
+            <a:extLst>
+              <a:ext uri="{C572A759-6A51-4108-AA02-DFA0A04FC94B}">
+                <ma14:wrappingTextBoxFlag xmlns:ma14="http://schemas.microsoft.com/office/mac/drawingml/2011/main" xmlns="" val="1"/>
+              </a:ext>
+            </a:extLst>
+          </p:spPr>
+          <p:txBody>
+            <a:bodyPr wrap="square" lIns="38100" tIns="38100" rIns="38100" bIns="38100" numCol="1" anchor="ctr">
+              <a:noAutofit/>
+            </a:bodyPr>
+            <a:lstStyle/>
+            <a:p>
+              <a:pPr algn="ctr">
+                <a:defRPr sz="2000">
+                  <a:solidFill>
+                    <a:srgbClr val="FFFFFF"/>
+                  </a:solidFill>
+                </a:defRPr>
+              </a:pPr>
+              <a:r>
+                <a:t>observations</a:t>
+              </a:r>
+            </a:p>
+            <a:p>
+              <a:pPr algn="ctr">
+                <a:defRPr sz="2000">
+                  <a:solidFill>
+                    <a:srgbClr val="FFFFFF"/>
+                  </a:solidFill>
+                </a:defRPr>
+              </a:pPr>
+              <a:r>
+                <a:t>{t,p,c,v}</a:t>
+              </a:r>
+            </a:p>
+          </p:txBody>
+        </p:sp>
+        <p:sp>
+          <p:nvSpPr>
+            <p:cNvPr id="76" name="Shape 185"/>
+            <p:cNvSpPr/>
+            <p:nvPr/>
+          </p:nvSpPr>
+          <p:spPr>
+            <a:xfrm>
+              <a:off x="3400728" y="614483"/>
+              <a:ext cx="924800" cy="1400134"/>
+            </a:xfrm>
+            <a:prstGeom prst="rightArrow">
+              <a:avLst>
+                <a:gd name="adj1" fmla="val 32000"/>
+                <a:gd name="adj2" fmla="val 48649"/>
+              </a:avLst>
+            </a:prstGeom>
+            <a:gradFill flip="none" rotWithShape="1">
+              <a:gsLst>
+                <a:gs pos="0">
+                  <a:srgbClr val="CE2100"/>
+                </a:gs>
+                <a:gs pos="100000">
+                  <a:schemeClr val="accent5">
+                    <a:hueOff val="-477027"/>
+                    <a:satOff val="5825"/>
+                    <a:lumOff val="41095"/>
+                  </a:schemeClr>
+                </a:gs>
+              </a:gsLst>
+              <a:lin ang="16200000" scaled="0"/>
+            </a:gradFill>
+            <a:ln w="9525" cap="flat">
+              <a:solidFill>
+                <a:srgbClr val="C82101"/>
+              </a:solidFill>
+              <a:prstDash val="solid"/>
+              <a:round/>
+            </a:ln>
+            <a:effectLst>
+              <a:outerShdw blurRad="50800" dist="12700" rotWithShape="0">
+                <a:srgbClr val="000000">
+                  <a:alpha val="50000"/>
+                </a:srgbClr>
+              </a:outerShdw>
+            </a:effectLst>
+          </p:spPr>
+          <p:txBody>
+            <a:bodyPr wrap="square" lIns="38100" tIns="38100" rIns="38100" bIns="38100" numCol="1" anchor="ctr">
+              <a:noAutofit/>
+            </a:bodyPr>
+            <a:lstStyle/>
+            <a:p>
+              <a:pPr>
+                <a:defRPr>
+                  <a:solidFill>
+                    <a:srgbClr val="FFFFFF"/>
+                  </a:solidFill>
+                </a:defRPr>
+              </a:pPr>
+              <a:endParaRPr/>
+            </a:p>
+          </p:txBody>
+        </p:sp>
+        <p:sp>
+          <p:nvSpPr>
+            <p:cNvPr id="77" name="Shape 186"/>
+            <p:cNvSpPr/>
+            <p:nvPr/>
+          </p:nvSpPr>
+          <p:spPr>
+            <a:xfrm rot="16200000">
+              <a:off x="2162909" y="1013794"/>
+              <a:ext cx="2091478" cy="601511"/>
+            </a:xfrm>
+            <a:prstGeom prst="roundRect">
+              <a:avLst>
+                <a:gd name="adj" fmla="val 50000"/>
+              </a:avLst>
+            </a:prstGeom>
+            <a:gradFill flip="none" rotWithShape="1">
+              <a:gsLst>
+                <a:gs pos="0">
+                  <a:srgbClr val="CE2100"/>
+                </a:gs>
+                <a:gs pos="100000">
+                  <a:schemeClr val="accent5">
+                    <a:hueOff val="-477027"/>
+                    <a:satOff val="5825"/>
+                    <a:lumOff val="41095"/>
+                  </a:schemeClr>
+                </a:gs>
+              </a:gsLst>
+              <a:lin ang="16200000" scaled="0"/>
+            </a:gradFill>
+            <a:ln w="9525" cap="flat">
+              <a:solidFill>
+                <a:srgbClr val="C82101"/>
+              </a:solidFill>
+              <a:prstDash val="solid"/>
+              <a:round/>
+            </a:ln>
+            <a:effectLst>
+              <a:outerShdw blurRad="50800" dist="12700" rotWithShape="0">
+                <a:srgbClr val="000000">
+                  <a:alpha val="50000"/>
+                </a:srgbClr>
+              </a:outerShdw>
+            </a:effectLst>
+            <a:extLst>
+              <a:ext uri="{C572A759-6A51-4108-AA02-DFA0A04FC94B}">
+                <ma14:wrappingTextBoxFlag xmlns:ma14="http://schemas.microsoft.com/office/mac/drawingml/2011/main" xmlns="" val="1"/>
+              </a:ext>
+            </a:extLst>
+          </p:spPr>
+          <p:txBody>
+            <a:bodyPr wrap="square" lIns="38100" tIns="38100" rIns="38100" bIns="38100" numCol="1" anchor="ctr">
+              <a:noAutofit/>
+            </a:bodyPr>
+            <a:lstStyle>
+              <a:lvl1pPr algn="ctr">
+                <a:defRPr sz="2100">
+                  <a:solidFill>
+                    <a:srgbClr val="FFFFFF"/>
+                  </a:solidFill>
+                </a:defRPr>
+              </a:lvl1pPr>
+            </a:lstStyle>
+            <a:p>
+              <a:r>
+                <a:t>preanalysis</a:t>
+              </a:r>
+            </a:p>
+          </p:txBody>
+        </p:sp>
+        <p:sp>
+          <p:nvSpPr>
+            <p:cNvPr id="78" name="Shape 187"/>
+            <p:cNvSpPr/>
+            <p:nvPr/>
+          </p:nvSpPr>
+          <p:spPr>
+            <a:xfrm>
+              <a:off x="5996420" y="614483"/>
+              <a:ext cx="795889" cy="1400134"/>
+            </a:xfrm>
+            <a:custGeom>
+              <a:avLst/>
+              <a:gdLst/>
+              <a:ahLst/>
+              <a:cxnLst>
+                <a:cxn ang="0">
+                  <a:pos x="wd2" y="hd2"/>
+                </a:cxn>
+                <a:cxn ang="5400000">
+                  <a:pos x="wd2" y="hd2"/>
+                </a:cxn>
+                <a:cxn ang="10800000">
+                  <a:pos x="wd2" y="hd2"/>
+                </a:cxn>
+                <a:cxn ang="16200000">
+                  <a:pos x="wd2" y="hd2"/>
+                </a:cxn>
+              </a:cxnLst>
+              <a:rect l="0" t="0" r="r" b="b"/>
+              <a:pathLst>
+                <a:path w="21600" h="21600" extrusionOk="0">
+                  <a:moveTo>
+                    <a:pt x="12210" y="14256"/>
+                  </a:moveTo>
+                  <a:lnTo>
+                    <a:pt x="12210" y="21600"/>
+                  </a:lnTo>
+                  <a:lnTo>
+                    <a:pt x="0" y="10800"/>
+                  </a:lnTo>
+                  <a:lnTo>
+                    <a:pt x="12210" y="0"/>
+                  </a:lnTo>
+                  <a:lnTo>
+                    <a:pt x="12210" y="7344"/>
+                  </a:lnTo>
+                  <a:lnTo>
+                    <a:pt x="21600" y="7344"/>
+                  </a:lnTo>
+                  <a:lnTo>
+                    <a:pt x="21600" y="14256"/>
+                  </a:lnTo>
+                  <a:close/>
+                </a:path>
+              </a:pathLst>
+            </a:custGeom>
+            <a:gradFill flip="none" rotWithShape="1">
+              <a:gsLst>
+                <a:gs pos="0">
+                  <a:srgbClr val="CE2100"/>
+                </a:gs>
+                <a:gs pos="100000">
+                  <a:schemeClr val="accent5">
+                    <a:hueOff val="-477027"/>
+                    <a:satOff val="5825"/>
+                    <a:lumOff val="41095"/>
+                  </a:schemeClr>
+                </a:gs>
+              </a:gsLst>
+              <a:lin ang="16200000" scaled="0"/>
+            </a:gradFill>
+            <a:ln w="9525" cap="flat">
+              <a:solidFill>
+                <a:srgbClr val="C82101"/>
+              </a:solidFill>
+              <a:prstDash val="solid"/>
+              <a:round/>
+            </a:ln>
+            <a:effectLst>
+              <a:outerShdw blurRad="50800" dist="12700" rotWithShape="0">
+                <a:srgbClr val="000000">
+                  <a:alpha val="50000"/>
+                </a:srgbClr>
+              </a:outerShdw>
+            </a:effectLst>
+          </p:spPr>
+          <p:txBody>
+            <a:bodyPr wrap="square" lIns="38100" tIns="38100" rIns="38100" bIns="38100" numCol="1" anchor="ctr">
+              <a:noAutofit/>
+            </a:bodyPr>
+            <a:lstStyle/>
+            <a:p>
+              <a:pPr>
+                <a:defRPr>
+                  <a:solidFill>
+                    <a:srgbClr val="FFFFFF"/>
+                  </a:solidFill>
+                </a:defRPr>
+              </a:pPr>
+              <a:endParaRPr/>
+            </a:p>
+          </p:txBody>
+        </p:sp>
+        <p:sp>
+          <p:nvSpPr>
+            <p:cNvPr id="79" name="Shape 188"/>
+            <p:cNvSpPr/>
+            <p:nvPr/>
+          </p:nvSpPr>
+          <p:spPr>
+            <a:xfrm rot="16200000">
+              <a:off x="6036327" y="974086"/>
+              <a:ext cx="2091477" cy="601512"/>
+            </a:xfrm>
+            <a:prstGeom prst="roundRect">
+              <a:avLst>
+                <a:gd name="adj" fmla="val 50000"/>
+              </a:avLst>
+            </a:prstGeom>
+            <a:gradFill flip="none" rotWithShape="1">
+              <a:gsLst>
+                <a:gs pos="0">
+                  <a:srgbClr val="CE2100"/>
+                </a:gs>
+                <a:gs pos="100000">
+                  <a:schemeClr val="accent5">
+                    <a:hueOff val="-477027"/>
+                    <a:satOff val="5825"/>
+                    <a:lumOff val="41095"/>
+                  </a:schemeClr>
+                </a:gs>
+              </a:gsLst>
+              <a:lin ang="16200000" scaled="0"/>
+            </a:gradFill>
+            <a:ln w="9525" cap="flat">
+              <a:solidFill>
+                <a:srgbClr val="C82101"/>
+              </a:solidFill>
+              <a:prstDash val="solid"/>
+              <a:round/>
+            </a:ln>
+            <a:effectLst>
+              <a:outerShdw blurRad="50800" dist="12700" rotWithShape="0">
+                <a:srgbClr val="000000">
+                  <a:alpha val="50000"/>
+                </a:srgbClr>
+              </a:outerShdw>
+            </a:effectLst>
+            <a:extLst>
+              <a:ext uri="{C572A759-6A51-4108-AA02-DFA0A04FC94B}">
+                <ma14:wrappingTextBoxFlag xmlns:ma14="http://schemas.microsoft.com/office/mac/drawingml/2011/main" xmlns="" val="1"/>
+              </a:ext>
+            </a:extLst>
+          </p:spPr>
+          <p:txBody>
+            <a:bodyPr wrap="square" lIns="38100" tIns="38100" rIns="38100" bIns="38100" numCol="1" anchor="ctr">
+              <a:noAutofit/>
+            </a:bodyPr>
+            <a:lstStyle>
+              <a:lvl1pPr algn="ctr">
+                <a:defRPr sz="2100">
+                  <a:solidFill>
+                    <a:srgbClr val="FFFFFF"/>
+                  </a:solidFill>
+                </a:defRPr>
+              </a:lvl1pPr>
+            </a:lstStyle>
+            <a:p>
+              <a:r>
+                <a:t>preanalysis</a:t>
+              </a:r>
+            </a:p>
+          </p:txBody>
+        </p:sp>
+        <p:sp>
+          <p:nvSpPr>
+            <p:cNvPr id="80" name="Shape 189"/>
+            <p:cNvSpPr/>
+            <p:nvPr/>
+          </p:nvSpPr>
+          <p:spPr>
+            <a:xfrm flipH="1" flipV="1">
+              <a:off x="7326515" y="529082"/>
+              <a:ext cx="505254" cy="1"/>
+            </a:xfrm>
+            <a:prstGeom prst="line">
+              <a:avLst/>
+            </a:prstGeom>
+            <a:noFill/>
+            <a:ln w="50800" cap="flat">
+              <a:solidFill>
+                <a:schemeClr val="accent5"/>
+              </a:solidFill>
+              <a:prstDash val="solid"/>
+              <a:round/>
+              <a:tailEnd type="triangle" w="med" len="med"/>
+            </a:ln>
+            <a:effectLst/>
+          </p:spPr>
+          <p:txBody>
+            <a:bodyPr wrap="square" lIns="45718" tIns="45718" rIns="45718" bIns="45718" numCol="1" anchor="t">
+              <a:noAutofit/>
+            </a:bodyPr>
+            <a:lstStyle/>
+            <a:p>
+              <a:endParaRPr/>
+            </a:p>
+          </p:txBody>
+        </p:sp>
+        <p:sp>
+          <p:nvSpPr>
+            <p:cNvPr id="81" name="Shape 190"/>
+            <p:cNvSpPr/>
+            <p:nvPr/>
+          </p:nvSpPr>
+          <p:spPr>
+            <a:xfrm flipH="1">
+              <a:off x="7326515" y="1272545"/>
+              <a:ext cx="505254" cy="1"/>
+            </a:xfrm>
+            <a:prstGeom prst="line">
+              <a:avLst/>
+            </a:prstGeom>
+            <a:noFill/>
+            <a:ln w="50800" cap="flat">
+              <a:solidFill>
+                <a:schemeClr val="accent5"/>
+              </a:solidFill>
+              <a:prstDash val="solid"/>
+              <a:round/>
+              <a:tailEnd type="triangle" w="med" len="med"/>
+            </a:ln>
+            <a:effectLst/>
+          </p:spPr>
+          <p:txBody>
+            <a:bodyPr wrap="square" lIns="45718" tIns="45718" rIns="45718" bIns="45718" numCol="1" anchor="t">
+              <a:noAutofit/>
+            </a:bodyPr>
+            <a:lstStyle/>
+            <a:p>
+              <a:endParaRPr/>
+            </a:p>
+          </p:txBody>
+        </p:sp>
+        <p:sp>
+          <p:nvSpPr>
+            <p:cNvPr id="82" name="Shape 191"/>
+            <p:cNvSpPr/>
+            <p:nvPr/>
+          </p:nvSpPr>
+          <p:spPr>
+            <a:xfrm flipH="1">
+              <a:off x="7326515" y="1967850"/>
+              <a:ext cx="505254" cy="1"/>
+            </a:xfrm>
+            <a:prstGeom prst="line">
+              <a:avLst/>
+            </a:prstGeom>
+            <a:noFill/>
+            <a:ln w="50800" cap="flat">
+              <a:solidFill>
+                <a:schemeClr val="accent5"/>
+              </a:solidFill>
+              <a:prstDash val="solid"/>
+              <a:round/>
+              <a:tailEnd type="triangle" w="med" len="med"/>
+            </a:ln>
+            <a:effectLst/>
+          </p:spPr>
+          <p:txBody>
+            <a:bodyPr wrap="square" lIns="45718" tIns="45718" rIns="45718" bIns="45718" numCol="1" anchor="t">
+              <a:noAutofit/>
+            </a:bodyPr>
+            <a:lstStyle/>
+            <a:p>
+              <a:endParaRPr/>
+            </a:p>
+          </p:txBody>
+        </p:sp>
+        <p:sp>
+          <p:nvSpPr>
+            <p:cNvPr id="83" name="Shape 192"/>
+            <p:cNvSpPr/>
+            <p:nvPr/>
+          </p:nvSpPr>
+          <p:spPr>
+            <a:xfrm>
+              <a:off x="2324324" y="541758"/>
+              <a:ext cx="612013" cy="1"/>
+            </a:xfrm>
+            <a:prstGeom prst="line">
+              <a:avLst/>
+            </a:prstGeom>
+            <a:noFill/>
+            <a:ln w="50800" cap="flat">
+              <a:solidFill>
+                <a:schemeClr val="accent5"/>
+              </a:solidFill>
+              <a:prstDash val="solid"/>
+              <a:round/>
+              <a:tailEnd type="triangle" w="med" len="med"/>
+            </a:ln>
+            <a:effectLst/>
+          </p:spPr>
+          <p:txBody>
+            <a:bodyPr wrap="square" lIns="45718" tIns="45718" rIns="45718" bIns="45718" numCol="1" anchor="t">
+              <a:noAutofit/>
+            </a:bodyPr>
+            <a:lstStyle/>
+            <a:p>
+              <a:endParaRPr/>
+            </a:p>
+          </p:txBody>
+        </p:sp>
+        <p:sp>
+          <p:nvSpPr>
+            <p:cNvPr id="84" name="Shape 193"/>
+            <p:cNvSpPr/>
+            <p:nvPr/>
+          </p:nvSpPr>
+          <p:spPr>
+            <a:xfrm>
+              <a:off x="2324324" y="1900785"/>
+              <a:ext cx="612013" cy="1"/>
+            </a:xfrm>
+            <a:prstGeom prst="line">
+              <a:avLst/>
+            </a:prstGeom>
+            <a:noFill/>
+            <a:ln w="50800" cap="flat">
+              <a:solidFill>
+                <a:schemeClr val="accent5"/>
+              </a:solidFill>
+              <a:prstDash val="solid"/>
+              <a:round/>
+              <a:tailEnd type="triangle" w="med" len="med"/>
+            </a:ln>
+            <a:effectLst/>
+          </p:spPr>
+          <p:txBody>
+            <a:bodyPr wrap="square" lIns="45718" tIns="45718" rIns="45718" bIns="45718" numCol="1" anchor="t">
+              <a:noAutofit/>
+            </a:bodyPr>
+            <a:lstStyle/>
+            <a:p>
+              <a:endParaRPr/>
+            </a:p>
+          </p:txBody>
+        </p:sp>
+      </p:grpSp>
     </p:spTree>
     <p:extLst>
       <p:ext uri="{BB962C8B-B14F-4D97-AF65-F5344CB8AC3E}">

</xml_diff>

<commit_message>
intermediate -> still need more WP2 content
</commit_message>
<xml_diff>
--- a/NetFutures/mami-poster.pptx
+++ b/NetFutures/mami-poster.pptx
@@ -1319,7 +1319,7 @@
         </p:nvSpPr>
         <p:spPr>
           <a:xfrm>
-            <a:off x="2134719" y="12977851"/>
+            <a:off x="1948366" y="13507331"/>
             <a:ext cx="6921767" cy="841256"/>
           </a:xfrm>
           <a:prstGeom prst="rect">
@@ -1330,7 +1330,7 @@
           </a:ln>
           <a:extLst>
             <a:ext uri="{C572A759-6A51-4108-AA02-DFA0A04FC94B}">
-              <ma14:wrappingTextBoxFlag xmlns="" xmlns:ma14="http://schemas.microsoft.com/office/mac/drawingml/2011/main" val="1"/>
+              <ma14:wrappingTextBoxFlag xmlns:ma14="http://schemas.microsoft.com/office/mac/drawingml/2011/main" val="1"/>
             </a:ext>
           </a:extLst>
         </p:spPr>
@@ -1370,7 +1370,7 @@
         </p:nvSpPr>
         <p:spPr>
           <a:xfrm>
-            <a:off x="11524484" y="12977851"/>
+            <a:off x="11482223" y="13507331"/>
             <a:ext cx="7195881" cy="841256"/>
           </a:xfrm>
           <a:prstGeom prst="rect">
@@ -1381,7 +1381,7 @@
           </a:ln>
           <a:extLst>
             <a:ext uri="{C572A759-6A51-4108-AA02-DFA0A04FC94B}">
-              <ma14:wrappingTextBoxFlag xmlns="" xmlns:ma14="http://schemas.microsoft.com/office/mac/drawingml/2011/main" val="1"/>
+              <ma14:wrappingTextBoxFlag xmlns:ma14="http://schemas.microsoft.com/office/mac/drawingml/2011/main" val="1"/>
             </a:ext>
           </a:extLst>
         </p:spPr>
@@ -1424,8 +1424,8 @@
         </p:nvSpPr>
         <p:spPr>
           <a:xfrm>
-            <a:off x="19843447" y="12977851"/>
-            <a:ext cx="9611605" cy="1579920"/>
+            <a:off x="19865181" y="13507331"/>
+            <a:ext cx="9611605" cy="841256"/>
           </a:xfrm>
           <a:prstGeom prst="rect">
             <a:avLst/>
@@ -1435,7 +1435,7 @@
           </a:ln>
           <a:extLst>
             <a:ext uri="{C572A759-6A51-4108-AA02-DFA0A04FC94B}">
-              <ma14:wrappingTextBoxFlag xmlns="" xmlns:ma14="http://schemas.microsoft.com/office/mac/drawingml/2011/main" val="1"/>
+              <ma14:wrappingTextBoxFlag xmlns:ma14="http://schemas.microsoft.com/office/mac/drawingml/2011/main" val="1"/>
             </a:ext>
           </a:extLst>
         </p:spPr>
@@ -1447,27 +1447,14 @@
           <a:p>
             <a:pPr algn="ctr"/>
             <a:r>
-              <a:rPr sz="4800" dirty="0">
+              <a:rPr lang="en-US" sz="4800" smtClean="0">
                 <a:latin typeface="Arial" panose="020B0604020202020204" pitchFamily="34" charset="0"/>
                 <a:cs typeface="Arial" panose="020B0604020202020204" pitchFamily="34" charset="0"/>
               </a:rPr>
-              <a:t>of use case applicability </a:t>
-            </a:r>
-            <a:br>
-              <a:rPr sz="4800" dirty="0">
-                <a:latin typeface="Arial" panose="020B0604020202020204" pitchFamily="34" charset="0"/>
-                <a:cs typeface="Arial" panose="020B0604020202020204" pitchFamily="34" charset="0"/>
-              </a:rPr>
-            </a:br>
-            <a:r>
-              <a:rPr sz="4800" dirty="0">
-                <a:latin typeface="Arial" panose="020B0604020202020204" pitchFamily="34" charset="0"/>
-                <a:cs typeface="Arial" panose="020B0604020202020204" pitchFamily="34" charset="0"/>
-              </a:rPr>
-              <a:t>and </a:t>
-            </a:r>
-            <a:r>
-              <a:rPr sz="4800" dirty="0" err="1">
+              <a:t>for Internet-scale </a:t>
+            </a:r>
+            <a:r>
+              <a:rPr sz="4800" dirty="0" err="1" smtClean="0">
                 <a:latin typeface="Arial" panose="020B0604020202020204" pitchFamily="34" charset="0"/>
                 <a:cs typeface="Arial" panose="020B0604020202020204" pitchFamily="34" charset="0"/>
               </a:rPr>
@@ -1488,7 +1475,7 @@
         </p:nvSpPr>
         <p:spPr>
           <a:xfrm>
-            <a:off x="2926594" y="11812660"/>
+            <a:off x="2740240" y="12342140"/>
             <a:ext cx="5338018" cy="1165191"/>
           </a:xfrm>
           <a:prstGeom prst="rect">
@@ -1499,7 +1486,7 @@
           </a:ln>
           <a:extLst>
             <a:ext uri="{C572A759-6A51-4108-AA02-DFA0A04FC94B}">
-              <ma14:wrappingTextBoxFlag xmlns="" xmlns:ma14="http://schemas.microsoft.com/office/mac/drawingml/2011/main" val="1"/>
+              <ma14:wrappingTextBoxFlag xmlns:ma14="http://schemas.microsoft.com/office/mac/drawingml/2011/main" val="1"/>
             </a:ext>
           </a:extLst>
         </p:spPr>
@@ -1548,7 +1535,7 @@
         </p:blipFill>
         <p:spPr>
           <a:xfrm>
-            <a:off x="3404853" y="7718413"/>
+            <a:off x="3218499" y="8247893"/>
             <a:ext cx="4381500" cy="4381500"/>
           </a:xfrm>
           <a:prstGeom prst="rect">
@@ -1567,7 +1554,7 @@
         </p:nvSpPr>
         <p:spPr>
           <a:xfrm>
-            <a:off x="12640175" y="11812660"/>
+            <a:off x="12597913" y="12342140"/>
             <a:ext cx="4964501" cy="1165191"/>
           </a:xfrm>
           <a:prstGeom prst="rect">
@@ -1578,7 +1565,7 @@
           </a:ln>
           <a:extLst>
             <a:ext uri="{C572A759-6A51-4108-AA02-DFA0A04FC94B}">
-              <ma14:wrappingTextBoxFlag xmlns="" xmlns:ma14="http://schemas.microsoft.com/office/mac/drawingml/2011/main" val="1"/>
+              <ma14:wrappingTextBoxFlag xmlns:ma14="http://schemas.microsoft.com/office/mac/drawingml/2011/main" val="1"/>
             </a:ext>
           </a:extLst>
         </p:spPr>
@@ -1626,7 +1613,7 @@
         </p:blipFill>
         <p:spPr>
           <a:xfrm>
-            <a:off x="12931676" y="7718413"/>
+            <a:off x="12889413" y="8247893"/>
             <a:ext cx="4381500" cy="4381500"/>
           </a:xfrm>
           <a:prstGeom prst="rect">
@@ -1645,7 +1632,7 @@
         </p:nvSpPr>
         <p:spPr>
           <a:xfrm>
-            <a:off x="21346261" y="11812660"/>
+            <a:off x="21367995" y="12348079"/>
             <a:ext cx="6605976" cy="1165191"/>
           </a:xfrm>
           <a:prstGeom prst="rect">
@@ -1656,7 +1643,7 @@
           </a:ln>
           <a:extLst>
             <a:ext uri="{C572A759-6A51-4108-AA02-DFA0A04FC94B}">
-              <ma14:wrappingTextBoxFlag xmlns="" xmlns:ma14="http://schemas.microsoft.com/office/mac/drawingml/2011/main" val="1"/>
+              <ma14:wrappingTextBoxFlag xmlns:ma14="http://schemas.microsoft.com/office/mac/drawingml/2011/main" val="1"/>
             </a:ext>
           </a:extLst>
         </p:spPr>
@@ -1704,7 +1691,7 @@
         </p:blipFill>
         <p:spPr>
           <a:xfrm>
-            <a:off x="22458499" y="7718413"/>
+            <a:off x="22480233" y="8253832"/>
             <a:ext cx="4381500" cy="4381500"/>
           </a:xfrm>
           <a:prstGeom prst="rect">
@@ -1717,16 +1704,16 @@
       </p:pic>
       <p:grpSp>
         <p:nvGrpSpPr>
-          <p:cNvPr id="50" name="Gruppieren 49"/>
+          <p:cNvPr id="11" name="Group 10"/>
           <p:cNvGrpSpPr/>
           <p:nvPr/>
         </p:nvGrpSpPr>
         <p:grpSpPr>
           <a:xfrm>
-            <a:off x="987731" y="15302909"/>
-            <a:ext cx="14007935" cy="9401933"/>
-            <a:chOff x="15860732" y="15150509"/>
-            <a:chExt cx="14007935" cy="9401933"/>
+            <a:off x="987731" y="15017159"/>
+            <a:ext cx="14007935" cy="22769381"/>
+            <a:chOff x="987731" y="15302909"/>
+            <a:chExt cx="14007935" cy="22769381"/>
           </a:xfrm>
         </p:grpSpPr>
         <p:sp>
@@ -1737,8 +1724,8 @@
           </p:nvSpPr>
           <p:spPr>
             <a:xfrm>
-              <a:off x="15860732" y="15697200"/>
-              <a:ext cx="13320000" cy="8855242"/>
+              <a:off x="987731" y="15849599"/>
+              <a:ext cx="13320000" cy="22222691"/>
             </a:xfrm>
             <a:prstGeom prst="roundRect">
               <a:avLst/>
@@ -1793,7 +1780,7 @@
           </p:blipFill>
           <p:spPr>
             <a:xfrm>
-              <a:off x="27677917" y="15150509"/>
+              <a:off x="12804916" y="15302909"/>
               <a:ext cx="2190750" cy="2190750"/>
             </a:xfrm>
             <a:prstGeom prst="rect">
@@ -1813,8 +1800,8 @@
         </p:nvGrpSpPr>
         <p:grpSpPr>
           <a:xfrm>
-            <a:off x="970800" y="25574669"/>
-            <a:ext cx="13985254" cy="9554333"/>
+            <a:off x="15883413" y="27666018"/>
+            <a:ext cx="13985254" cy="10120522"/>
             <a:chOff x="970800" y="15150509"/>
             <a:chExt cx="13985254" cy="9554333"/>
           </a:xfrm>
@@ -1895,96 +1882,81 @@
           </p:spPr>
         </p:pic>
       </p:grpSp>
-      <p:grpSp>
-        <p:nvGrpSpPr>
-          <p:cNvPr id="51" name="Gruppieren 50"/>
-          <p:cNvGrpSpPr/>
+      <p:sp>
+        <p:nvSpPr>
+          <p:cNvPr id="44" name="Abgerundetes Rechteck 43"/>
+          <p:cNvSpPr/>
           <p:nvPr/>
-        </p:nvGrpSpPr>
-        <p:grpSpPr>
+        </p:nvSpPr>
+        <p:spPr>
           <a:xfrm>
-            <a:off x="15883413" y="15348392"/>
-            <a:ext cx="13985254" cy="9312442"/>
-            <a:chOff x="970800" y="26278135"/>
-            <a:chExt cx="13985254" cy="9312442"/>
+            <a:off x="15883413" y="15519841"/>
+            <a:ext cx="13320000" cy="12033179"/>
           </a:xfrm>
-        </p:grpSpPr>
-        <p:sp>
-          <p:nvSpPr>
-            <p:cNvPr id="44" name="Abgerundetes Rechteck 43"/>
-            <p:cNvSpPr/>
-            <p:nvPr/>
-          </p:nvSpPr>
-          <p:spPr>
-            <a:xfrm>
-              <a:off x="970800" y="26735335"/>
-              <a:ext cx="13320000" cy="8855242"/>
-            </a:xfrm>
-            <a:prstGeom prst="roundRect">
-              <a:avLst/>
-            </a:prstGeom>
-            <a:noFill/>
-            <a:ln w="127000">
-              <a:solidFill>
-                <a:srgbClr val="87DEAA"/>
-              </a:solidFill>
-            </a:ln>
-          </p:spPr>
-          <p:style>
-            <a:lnRef idx="2">
-              <a:schemeClr val="accent1">
-                <a:shade val="50000"/>
-              </a:schemeClr>
-            </a:lnRef>
-            <a:fillRef idx="1">
-              <a:schemeClr val="accent1"/>
-            </a:fillRef>
-            <a:effectRef idx="0">
-              <a:schemeClr val="accent1"/>
-            </a:effectRef>
-            <a:fontRef idx="minor">
-              <a:schemeClr val="lt1"/>
-            </a:fontRef>
-          </p:style>
-          <p:txBody>
-            <a:bodyPr rtlCol="0" anchor="ctr"/>
-            <a:lstStyle/>
-            <a:p>
-              <a:pPr algn="ctr"/>
-              <a:endParaRPr lang="en-US"/>
-            </a:p>
-          </p:txBody>
-        </p:sp>
-        <p:pic>
-          <p:nvPicPr>
-            <p:cNvPr id="48" name="image6.png"/>
-            <p:cNvPicPr>
-              <a:picLocks noChangeAspect="1"/>
-            </p:cNvPicPr>
-            <p:nvPr/>
-          </p:nvPicPr>
-          <p:blipFill>
-            <a:blip r:embed="rId3">
-              <a:extLst/>
-            </a:blip>
-            <a:stretch>
-              <a:fillRect/>
-            </a:stretch>
-          </p:blipFill>
-          <p:spPr>
-            <a:xfrm>
-              <a:off x="12765304" y="26278135"/>
-              <a:ext cx="2190750" cy="2190750"/>
-            </a:xfrm>
-            <a:prstGeom prst="rect">
-              <a:avLst/>
-            </a:prstGeom>
-            <a:ln w="12700">
-              <a:miter lim="400000"/>
-            </a:ln>
-          </p:spPr>
-        </p:pic>
-      </p:grpSp>
+          <a:prstGeom prst="roundRect">
+            <a:avLst/>
+          </a:prstGeom>
+          <a:noFill/>
+          <a:ln w="127000">
+            <a:solidFill>
+              <a:srgbClr val="87DEAA"/>
+            </a:solidFill>
+          </a:ln>
+        </p:spPr>
+        <p:style>
+          <a:lnRef idx="2">
+            <a:schemeClr val="accent1">
+              <a:shade val="50000"/>
+            </a:schemeClr>
+          </a:lnRef>
+          <a:fillRef idx="1">
+            <a:schemeClr val="accent1"/>
+          </a:fillRef>
+          <a:effectRef idx="0">
+            <a:schemeClr val="accent1"/>
+          </a:effectRef>
+          <a:fontRef idx="minor">
+            <a:schemeClr val="lt1"/>
+          </a:fontRef>
+        </p:style>
+        <p:txBody>
+          <a:bodyPr rtlCol="0" anchor="ctr"/>
+          <a:lstStyle/>
+          <a:p>
+            <a:pPr algn="ctr"/>
+            <a:endParaRPr lang="en-US"/>
+          </a:p>
+        </p:txBody>
+      </p:sp>
+      <p:pic>
+        <p:nvPicPr>
+          <p:cNvPr id="48" name="image6.png"/>
+          <p:cNvPicPr>
+            <a:picLocks noChangeAspect="1"/>
+          </p:cNvPicPr>
+          <p:nvPr/>
+        </p:nvPicPr>
+        <p:blipFill>
+          <a:blip r:embed="rId3">
+            <a:extLst/>
+          </a:blip>
+          <a:stretch>
+            <a:fillRect/>
+          </a:stretch>
+        </p:blipFill>
+        <p:spPr>
+          <a:xfrm>
+            <a:off x="27677917" y="15062642"/>
+            <a:ext cx="2190750" cy="2190750"/>
+          </a:xfrm>
+          <a:prstGeom prst="rect">
+            <a:avLst/>
+          </a:prstGeom>
+          <a:ln w="12700">
+            <a:miter lim="400000"/>
+          </a:ln>
+        </p:spPr>
+      </p:pic>
       <p:sp>
         <p:nvSpPr>
           <p:cNvPr id="21" name="Shape 173"/>
@@ -1995,8 +1967,8 @@
         </p:nvSpPr>
         <p:spPr>
           <a:xfrm>
-            <a:off x="1520311" y="16726571"/>
-            <a:ext cx="13523107" cy="8061157"/>
+            <a:off x="1182789" y="17768262"/>
+            <a:ext cx="13523107" cy="5279041"/>
           </a:xfrm>
           <a:prstGeom prst="rect">
             <a:avLst/>
@@ -2169,13 +2141,11 @@
             </a:lvl9pPr>
           </a:lstStyle>
           <a:p>
-            <a:pPr marL="441325" indent="-441325" defTabSz="971550">
+            <a:pPr defTabSz="971550">
               <a:spcBef>
                 <a:spcPts val="500"/>
               </a:spcBef>
               <a:buSzPct val="100000"/>
-              <a:buFont typeface="Arial" panose="020B0604020202020204" pitchFamily="34" charset="0"/>
-              <a:buAutoNum type="arabicPeriod"/>
               <a:defRPr sz="2550" b="1"/>
             </a:pPr>
             <a:r>
@@ -2242,13 +2212,11 @@
             </a:endParaRPr>
           </a:p>
           <a:p>
-            <a:pPr marL="441325" indent="-441325" defTabSz="971550">
+            <a:pPr defTabSz="971550">
               <a:spcBef>
                 <a:spcPts val="500"/>
               </a:spcBef>
               <a:buSzPct val="100000"/>
-              <a:buFont typeface="Arial" panose="020B0604020202020204" pitchFamily="34" charset="0"/>
-              <a:buAutoNum type="arabicPeriod"/>
               <a:defRPr sz="2550"/>
             </a:pPr>
             <a:r>
@@ -2256,7 +2224,21 @@
                 <a:latin typeface="Helvetica Neue"/>
                 <a:cs typeface="Helvetica" panose="020B0604020202020204" pitchFamily="34" charset="0"/>
               </a:rPr>
-              <a:t>Development of new measurements tools:</a:t>
+              <a:t>Development of new </a:t>
+            </a:r>
+            <a:r>
+              <a:rPr lang="en-US" sz="3600" b="1" dirty="0" smtClean="0">
+                <a:latin typeface="Helvetica Neue"/>
+                <a:cs typeface="Helvetica" panose="020B0604020202020204" pitchFamily="34" charset="0"/>
+              </a:rPr>
+              <a:t>measurement tools</a:t>
+            </a:r>
+            <a:r>
+              <a:rPr lang="en-US" sz="3600" b="1" dirty="0" smtClean="0">
+                <a:latin typeface="Helvetica Neue"/>
+                <a:cs typeface="Helvetica" panose="020B0604020202020204" pitchFamily="34" charset="0"/>
+              </a:rPr>
+              <a:t>:</a:t>
             </a:r>
             <a:r>
               <a:rPr lang="en-US" sz="3600" dirty="0" smtClean="0">
@@ -2301,7 +2283,14 @@
                 <a:latin typeface="Helvetica Neue"/>
                 <a:cs typeface="Helvetica" panose="020B0604020202020204" pitchFamily="34" charset="0"/>
               </a:rPr>
-              <a:t>: tracing + impairment analysis</a:t>
+              <a:t>: tracing + impairment </a:t>
+            </a:r>
+            <a:r>
+              <a:rPr lang="en-US" sz="3200" dirty="0" smtClean="0">
+                <a:latin typeface="Helvetica Neue"/>
+                <a:cs typeface="Helvetica" panose="020B0604020202020204" pitchFamily="34" charset="0"/>
+              </a:rPr>
+              <a:t>analysis</a:t>
             </a:r>
           </a:p>
           <a:p>
@@ -2312,6 +2301,25 @@
               <a:defRPr sz="2550"/>
             </a:pPr>
             <a:r>
+              <a:rPr lang="en-US" sz="3200" dirty="0" smtClean="0">
+                <a:latin typeface="Helvetica Neue"/>
+                <a:cs typeface="Helvetica" panose="020B0604020202020204" pitchFamily="34" charset="0"/>
+              </a:rPr>
+              <a:t>Copycat: TCP/UDP differential on-path treatment </a:t>
+            </a:r>
+            <a:endParaRPr lang="en-US" sz="3200" dirty="0" smtClean="0">
+              <a:latin typeface="Helvetica Neue"/>
+              <a:cs typeface="Helvetica" panose="020B0604020202020204" pitchFamily="34" charset="0"/>
+            </a:endParaRPr>
+          </a:p>
+          <a:p>
+            <a:pPr marL="652462" lvl="1" indent="-381000" defTabSz="971550">
+              <a:spcBef>
+                <a:spcPts val="500"/>
+              </a:spcBef>
+              <a:defRPr sz="2550"/>
+            </a:pPr>
+            <a:r>
               <a:rPr lang="en-US" sz="3200" dirty="0" err="1" smtClean="0">
                 <a:latin typeface="Helvetica Neue"/>
                 <a:cs typeface="Helvetica" panose="020B0604020202020204" pitchFamily="34" charset="0"/>
@@ -2323,8 +2331,27 @@
                 <a:latin typeface="Helvetica Neue"/>
                 <a:cs typeface="Helvetica" panose="020B0604020202020204" pitchFamily="34" charset="0"/>
               </a:rPr>
-              <a:t>: A/B testing (currently on ECN support)</a:t>
-            </a:r>
+              <a:t>: A/B testing (currently on ECN support</a:t>
+            </a:r>
+            <a:r>
+              <a:rPr lang="en-US" sz="3200" dirty="0" smtClean="0">
+                <a:latin typeface="Helvetica Neue"/>
+                <a:cs typeface="Helvetica" panose="020B0604020202020204" pitchFamily="34" charset="0"/>
+              </a:rPr>
+              <a:t>)</a:t>
+            </a:r>
+          </a:p>
+          <a:p>
+            <a:pPr marL="652462" lvl="1" indent="-381000" defTabSz="971550">
+              <a:spcBef>
+                <a:spcPts val="500"/>
+              </a:spcBef>
+              <a:defRPr sz="2550"/>
+            </a:pPr>
+            <a:endParaRPr lang="en-US" sz="3200" dirty="0" smtClean="0">
+              <a:latin typeface="Helvetica Neue"/>
+              <a:cs typeface="Helvetica" panose="020B0604020202020204" pitchFamily="34" charset="0"/>
+            </a:endParaRPr>
           </a:p>
           <a:p>
             <a:pPr marL="652462" lvl="1" indent="-381000" defTabSz="971550">
@@ -2338,80 +2365,6 @@
               <a:cs typeface="Helvetica" panose="020B0604020202020204" pitchFamily="34" charset="0"/>
             </a:endParaRPr>
           </a:p>
-          <a:p>
-            <a:pPr marL="441325" indent="-441325" defTabSz="971550">
-              <a:spcBef>
-                <a:spcPts val="500"/>
-              </a:spcBef>
-              <a:buSzPct val="100000"/>
-              <a:buFont typeface="Arial" panose="020B0604020202020204" pitchFamily="34" charset="0"/>
-              <a:buAutoNum type="arabicPeriod"/>
-              <a:defRPr sz="2550"/>
-            </a:pPr>
-            <a:r>
-              <a:rPr lang="en-US" sz="3600" b="1" dirty="0" smtClean="0">
-                <a:latin typeface="Helvetica Neue"/>
-                <a:cs typeface="Helvetica" panose="020B0604020202020204" pitchFamily="34" charset="0"/>
-              </a:rPr>
-              <a:t>Path Transparency Observatory</a:t>
-            </a:r>
-          </a:p>
-          <a:p>
-            <a:pPr marL="652462" lvl="1" indent="-381000" defTabSz="971550">
-              <a:spcBef>
-                <a:spcPts val="500"/>
-              </a:spcBef>
-              <a:defRPr sz="2550"/>
-            </a:pPr>
-            <a:r>
-              <a:rPr lang="en-US" sz="3200" dirty="0" smtClean="0">
-                <a:latin typeface="Helvetica Neue"/>
-                <a:cs typeface="Helvetica" panose="020B0604020202020204" pitchFamily="34" charset="0"/>
-              </a:rPr>
-              <a:t>Active measurements by the project + external measurements</a:t>
-            </a:r>
-          </a:p>
-          <a:p>
-            <a:pPr marL="652462" lvl="1" indent="-381000" defTabSz="971550">
-              <a:spcBef>
-                <a:spcPts val="500"/>
-              </a:spcBef>
-              <a:defRPr sz="2550"/>
-            </a:pPr>
-            <a:r>
-              <a:rPr lang="en-US" sz="3200" dirty="0" smtClean="0">
-                <a:latin typeface="Helvetica Neue"/>
-                <a:cs typeface="Helvetica" panose="020B0604020202020204" pitchFamily="34" charset="0"/>
-              </a:rPr>
-              <a:t>Query interface to access observations on path impairments:</a:t>
-            </a:r>
-          </a:p>
-          <a:p>
-            <a:pPr marL="851296" lvl="2" indent="-381000" defTabSz="971550">
-              <a:spcBef>
-                <a:spcPts val="500"/>
-              </a:spcBef>
-              <a:defRPr sz="2550"/>
-            </a:pPr>
-            <a:r>
-              <a:rPr lang="en-US" sz="3200" i="1" dirty="0" smtClean="0">
-                <a:latin typeface="Helvetica Neue"/>
-                <a:cs typeface="Helvetica" panose="020B0604020202020204" pitchFamily="34" charset="0"/>
-              </a:rPr>
-              <a:t>What is the likelihood that a certain path impairment impacts my traffic</a:t>
-            </a:r>
-            <a:r>
-              <a:rPr lang="en-US" sz="3200" dirty="0" smtClean="0">
-                <a:latin typeface="Helvetica Neue"/>
-                <a:cs typeface="Helvetica" panose="020B0604020202020204" pitchFamily="34" charset="0"/>
-              </a:rPr>
-              <a:t> (modifications/stripping/dropping/blocking)?</a:t>
-            </a:r>
-            <a:endParaRPr lang="en-US" sz="3200" dirty="0">
-              <a:latin typeface="Helvetica Neue"/>
-              <a:cs typeface="Helvetica" panose="020B0604020202020204" pitchFamily="34" charset="0"/>
-            </a:endParaRPr>
-          </a:p>
         </p:txBody>
       </p:sp>
       <p:sp>
@@ -2422,8 +2375,8 @@
         </p:nvSpPr>
         <p:spPr>
           <a:xfrm>
-            <a:off x="16451031" y="16726571"/>
-            <a:ext cx="13004021" cy="6063198"/>
+            <a:off x="16451031" y="17736221"/>
+            <a:ext cx="13004021" cy="7971413"/>
           </a:xfrm>
           <a:prstGeom prst="rect">
             <a:avLst/>
@@ -2435,10 +2388,11 @@
           </a:bodyPr>
           <a:lstStyle/>
           <a:p>
-            <a:pPr marL="454526" indent="-454526">
+            <a:pPr marL="571500" indent="-571500">
               <a:buClrTx/>
               <a:buSzPct val="100000"/>
-              <a:buAutoNum type="arabicPeriod"/>
+              <a:buFont typeface="Arial" charset="0"/>
+              <a:buChar char="•"/>
               <a:defRPr b="1"/>
             </a:pPr>
             <a:r>
@@ -2476,11 +2430,11 @@
               <a:t>Transport and applications can selectively expose semantic information to </a:t>
             </a:r>
             <a:r>
-              <a:rPr lang="en-US" sz="3200" dirty="0" err="1">
-                <a:latin typeface="Helvetica" panose="020B0604020202020204" pitchFamily="34" charset="0"/>
-                <a:cs typeface="Helvetica" panose="020B0604020202020204" pitchFamily="34" charset="0"/>
-              </a:rPr>
-              <a:t>middlebox</a:t>
+              <a:rPr lang="en-US" sz="3200" dirty="0" err="1" smtClean="0">
+                <a:latin typeface="Helvetica" panose="020B0604020202020204" pitchFamily="34" charset="0"/>
+                <a:cs typeface="Helvetica" panose="020B0604020202020204" pitchFamily="34" charset="0"/>
+              </a:rPr>
+              <a:t>middleboxes</a:t>
             </a:r>
             <a:endParaRPr lang="en-US" sz="3200" dirty="0">
               <a:latin typeface="Helvetica" panose="020B0604020202020204" pitchFamily="34" charset="0"/>
@@ -2497,23 +2451,56 @@
                 <a:latin typeface="Helvetica" panose="020B0604020202020204" pitchFamily="34" charset="0"/>
                 <a:cs typeface="Helvetica" panose="020B0604020202020204" pitchFamily="34" charset="0"/>
               </a:rPr>
-              <a:t>Higher layers can fully be </a:t>
+              <a:t>Higher layers can </a:t>
             </a:r>
             <a:r>
               <a:rPr lang="en-US" sz="3200" dirty="0" smtClean="0">
                 <a:latin typeface="Helvetica" panose="020B0604020202020204" pitchFamily="34" charset="0"/>
                 <a:cs typeface="Helvetica" panose="020B0604020202020204" pitchFamily="34" charset="0"/>
               </a:rPr>
-              <a:t>encrypted</a:t>
-            </a:r>
-            <a:r>
-              <a:rPr lang="en-US" sz="3600" dirty="0" smtClean="0">
-                <a:latin typeface="Helvetica" panose="020B0604020202020204" pitchFamily="34" charset="0"/>
-                <a:cs typeface="Helvetica" panose="020B0604020202020204" pitchFamily="34" charset="0"/>
-              </a:rPr>
-              <a:t>!</a:t>
-            </a:r>
-            <a:endParaRPr lang="de-DE" sz="3600" dirty="0" smtClean="0">
+              <a:t>be fully encrypted!</a:t>
+            </a:r>
+          </a:p>
+          <a:p>
+            <a:pPr marL="722313" lvl="1" indent="-360363">
+              <a:buFont typeface="Arial" panose="020B0604020202020204" pitchFamily="34" charset="0"/>
+              <a:buChar char="•"/>
+            </a:pPr>
+            <a:r>
+              <a:rPr lang="en-US" sz="3200" dirty="0" smtClean="0">
+                <a:latin typeface="Helvetica" panose="020B0604020202020204" pitchFamily="34" charset="0"/>
+                <a:cs typeface="Helvetica" panose="020B0604020202020204" pitchFamily="34" charset="0"/>
+              </a:rPr>
+              <a:t>Implements a </a:t>
+            </a:r>
+            <a:r>
+              <a:rPr lang="en-US" sz="3200" i="1" dirty="0" smtClean="0">
+                <a:latin typeface="Helvetica" panose="020B0604020202020204" pitchFamily="34" charset="0"/>
+                <a:cs typeface="Helvetica" panose="020B0604020202020204" pitchFamily="34" charset="0"/>
+              </a:rPr>
+              <a:t>path layer</a:t>
+            </a:r>
+            <a:r>
+              <a:rPr lang="en-US" sz="3200" dirty="0" smtClean="0">
+                <a:latin typeface="Helvetica" panose="020B0604020202020204" pitchFamily="34" charset="0"/>
+                <a:cs typeface="Helvetica" panose="020B0604020202020204" pitchFamily="34" charset="0"/>
+              </a:rPr>
+              <a:t> within</a:t>
+            </a:r>
+            <a:br>
+              <a:rPr lang="en-US" sz="3200" dirty="0" smtClean="0">
+                <a:latin typeface="Helvetica" panose="020B0604020202020204" pitchFamily="34" charset="0"/>
+                <a:cs typeface="Helvetica" panose="020B0604020202020204" pitchFamily="34" charset="0"/>
+              </a:rPr>
+            </a:br>
+            <a:r>
+              <a:rPr lang="en-US" sz="3200" dirty="0" smtClean="0">
+                <a:latin typeface="Helvetica" panose="020B0604020202020204" pitchFamily="34" charset="0"/>
+                <a:cs typeface="Helvetica" panose="020B0604020202020204" pitchFamily="34" charset="0"/>
+              </a:rPr>
+              <a:t>the Internet architecture</a:t>
+            </a:r>
+            <a:endParaRPr lang="de-DE" sz="3200" dirty="0" smtClean="0">
               <a:latin typeface="Helvetica" panose="020B0604020202020204" pitchFamily="34" charset="0"/>
               <a:cs typeface="Helvetica" panose="020B0604020202020204" pitchFamily="34" charset="0"/>
             </a:endParaRPr>
@@ -2533,10 +2520,11 @@
             </a:endParaRPr>
           </a:p>
           <a:p>
-            <a:pPr marL="536575" indent="-536575">
+            <a:pPr marL="571500" indent="-571500">
               <a:buClrTx/>
               <a:buSzPct val="100000"/>
-              <a:buAutoNum type="arabicPeriod"/>
+              <a:buFont typeface="Arial" charset="0"/>
+              <a:buChar char="•"/>
               <a:defRPr b="1"/>
             </a:pPr>
             <a:r>
@@ -2611,7 +2599,21 @@
                 <a:latin typeface="Helvetica" panose="020B0604020202020204" pitchFamily="34" charset="0"/>
                 <a:cs typeface="Helvetica" panose="020B0604020202020204" pitchFamily="34" charset="0"/>
               </a:rPr>
-              <a:t>e.g. fallback or happy-eyeball </a:t>
+              <a:t>e.g</a:t>
+            </a:r>
+            <a:r>
+              <a:rPr lang="en-US" sz="3200" dirty="0" smtClean="0">
+                <a:latin typeface="Helvetica" panose="020B0604020202020204" pitchFamily="34" charset="0"/>
+                <a:cs typeface="Helvetica" panose="020B0604020202020204" pitchFamily="34" charset="0"/>
+              </a:rPr>
+              <a:t>. via </a:t>
+            </a:r>
+            <a:r>
+              <a:rPr lang="en-US" sz="3200" dirty="0">
+                <a:latin typeface="Helvetica" panose="020B0604020202020204" pitchFamily="34" charset="0"/>
+                <a:cs typeface="Helvetica" panose="020B0604020202020204" pitchFamily="34" charset="0"/>
+              </a:rPr>
+              <a:t>fallback or happy-eyeball </a:t>
             </a:r>
             <a:r>
               <a:rPr lang="en-US" sz="3200" dirty="0" smtClean="0">
@@ -2675,12 +2677,48 @@
                 <a:latin typeface="Helvetica" panose="020B0604020202020204" pitchFamily="34" charset="0"/>
                 <a:cs typeface="Helvetica" panose="020B0604020202020204" pitchFamily="34" charset="0"/>
               </a:rPr>
-              <a:t>different layers/protocols </a:t>
-            </a:r>
-            <a:endParaRPr lang="en-US" sz="3200" dirty="0">
-              <a:latin typeface="Helvetica" panose="020B0604020202020204" pitchFamily="34" charset="0"/>
-              <a:cs typeface="Helvetica" panose="020B0604020202020204" pitchFamily="34" charset="0"/>
-            </a:endParaRPr>
+              <a:t>different </a:t>
+            </a:r>
+            <a:r>
+              <a:rPr lang="en-US" sz="3200" dirty="0" smtClean="0">
+                <a:latin typeface="Helvetica" panose="020B0604020202020204" pitchFamily="34" charset="0"/>
+                <a:cs typeface="Helvetica" panose="020B0604020202020204" pitchFamily="34" charset="0"/>
+              </a:rPr>
+              <a:t>layers/protocols</a:t>
+            </a:r>
+          </a:p>
+          <a:p>
+            <a:pPr marL="722313" lvl="1" indent="-360363">
+              <a:buFont typeface="Arial" panose="020B0604020202020204" pitchFamily="34" charset="0"/>
+              <a:buChar char="•"/>
+            </a:pPr>
+            <a:r>
+              <a:rPr lang="en-US" sz="3200" dirty="0" smtClean="0">
+                <a:latin typeface="Helvetica" panose="020B0604020202020204" pitchFamily="34" charset="0"/>
+                <a:cs typeface="Helvetica" panose="020B0604020202020204" pitchFamily="34" charset="0"/>
+              </a:rPr>
+              <a:t>API with explicit support for the</a:t>
+            </a:r>
+            <a:r>
+              <a:rPr lang="en-US" sz="3200" dirty="0">
+                <a:latin typeface="Helvetica" panose="020B0604020202020204" pitchFamily="34" charset="0"/>
+                <a:cs typeface="Helvetica" panose="020B0604020202020204" pitchFamily="34" charset="0"/>
+              </a:rPr>
+              <a:t/>
+            </a:r>
+            <a:br>
+              <a:rPr lang="en-US" sz="3200" dirty="0">
+                <a:latin typeface="Helvetica" panose="020B0604020202020204" pitchFamily="34" charset="0"/>
+                <a:cs typeface="Helvetica" panose="020B0604020202020204" pitchFamily="34" charset="0"/>
+              </a:rPr>
+            </a:br>
+            <a:r>
+              <a:rPr lang="en-US" sz="3200" dirty="0" smtClean="0">
+                <a:latin typeface="Helvetica" panose="020B0604020202020204" pitchFamily="34" charset="0"/>
+                <a:cs typeface="Helvetica" panose="020B0604020202020204" pitchFamily="34" charset="0"/>
+              </a:rPr>
+              <a:t>path as a first-order concept</a:t>
+            </a:r>
           </a:p>
         </p:txBody>
       </p:sp>
@@ -2692,7 +2730,7 @@
         </p:nvGrpSpPr>
         <p:grpSpPr>
           <a:xfrm>
-            <a:off x="23962081" y="18096500"/>
+            <a:off x="23962081" y="19106150"/>
             <a:ext cx="4445001" cy="4495801"/>
             <a:chOff x="24032062" y="17402662"/>
             <a:chExt cx="4445001" cy="4495801"/>
@@ -2852,7 +2890,7 @@
         </p:nvSpPr>
         <p:spPr>
           <a:xfrm rot="20869430">
-            <a:off x="23810500" y="22185333"/>
+            <a:off x="23810500" y="23194983"/>
             <a:ext cx="5129161" cy="1395254"/>
           </a:xfrm>
           <a:prstGeom prst="rect">
@@ -2871,7 +2909,7 @@
           </a:effectLst>
           <a:extLst>
             <a:ext uri="{C572A759-6A51-4108-AA02-DFA0A04FC94B}">
-              <ma14:wrappingTextBoxFlag xmlns:ma14="http://schemas.microsoft.com/office/mac/drawingml/2011/main" xmlns="" val="1"/>
+              <ma14:wrappingTextBoxFlag xmlns:ma14="http://schemas.microsoft.com/office/mac/drawingml/2011/main" val="1"/>
             </a:ext>
           </a:extLst>
         </p:spPr>
@@ -2963,7 +3001,7 @@
         </p:nvSpPr>
         <p:spPr>
           <a:xfrm>
-            <a:off x="1520311" y="27028866"/>
+            <a:off x="16224978" y="29229204"/>
             <a:ext cx="12770489" cy="3046988"/>
           </a:xfrm>
           <a:prstGeom prst="rect">
@@ -3103,352 +3141,6 @@
           </a:p>
         </p:txBody>
       </p:sp>
-      <p:sp>
-        <p:nvSpPr>
-          <p:cNvPr id="68" name="Shape 177"/>
-          <p:cNvSpPr txBox="1">
-            <a:spLocks/>
-          </p:cNvSpPr>
-          <p:nvPr/>
-        </p:nvSpPr>
-        <p:spPr>
-          <a:xfrm>
-            <a:off x="16451031" y="27525840"/>
-            <a:ext cx="12022137" cy="6313456"/>
-          </a:xfrm>
-          <a:prstGeom prst="rect">
-            <a:avLst/>
-          </a:prstGeom>
-        </p:spPr>
-        <p:txBody>
-          <a:bodyPr/>
-          <a:lstStyle>
-            <a:lvl1pPr marL="756872" indent="-756872" algn="l" defTabSz="3027487" rtl="0" eaLnBrk="1" latinLnBrk="0" hangingPunct="1">
-              <a:lnSpc>
-                <a:spcPct val="90000"/>
-              </a:lnSpc>
-              <a:spcBef>
-                <a:spcPts val="3311"/>
-              </a:spcBef>
-              <a:buFont typeface="Arial" panose="020B0604020202020204" pitchFamily="34" charset="0"/>
-              <a:buChar char="•"/>
-              <a:defRPr sz="9271" kern="1200">
-                <a:solidFill>
-                  <a:schemeClr val="tx1"/>
-                </a:solidFill>
-                <a:latin typeface="+mn-lt"/>
-                <a:ea typeface="+mn-ea"/>
-                <a:cs typeface="+mn-cs"/>
-              </a:defRPr>
-            </a:lvl1pPr>
-            <a:lvl2pPr marL="2270615" indent="-756872" algn="l" defTabSz="3027487" rtl="0" eaLnBrk="1" latinLnBrk="0" hangingPunct="1">
-              <a:lnSpc>
-                <a:spcPct val="90000"/>
-              </a:lnSpc>
-              <a:spcBef>
-                <a:spcPts val="1655"/>
-              </a:spcBef>
-              <a:buFont typeface="Arial" panose="020B0604020202020204" pitchFamily="34" charset="0"/>
-              <a:buChar char="•"/>
-              <a:defRPr sz="7946" kern="1200">
-                <a:solidFill>
-                  <a:schemeClr val="tx1"/>
-                </a:solidFill>
-                <a:latin typeface="+mn-lt"/>
-                <a:ea typeface="+mn-ea"/>
-                <a:cs typeface="+mn-cs"/>
-              </a:defRPr>
-            </a:lvl2pPr>
-            <a:lvl3pPr marL="3784359" indent="-756872" algn="l" defTabSz="3027487" rtl="0" eaLnBrk="1" latinLnBrk="0" hangingPunct="1">
-              <a:lnSpc>
-                <a:spcPct val="90000"/>
-              </a:lnSpc>
-              <a:spcBef>
-                <a:spcPts val="1655"/>
-              </a:spcBef>
-              <a:buFont typeface="Arial" panose="020B0604020202020204" pitchFamily="34" charset="0"/>
-              <a:buChar char="•"/>
-              <a:defRPr sz="6622" kern="1200">
-                <a:solidFill>
-                  <a:schemeClr val="tx1"/>
-                </a:solidFill>
-                <a:latin typeface="+mn-lt"/>
-                <a:ea typeface="+mn-ea"/>
-                <a:cs typeface="+mn-cs"/>
-              </a:defRPr>
-            </a:lvl3pPr>
-            <a:lvl4pPr marL="5298102" indent="-756872" algn="l" defTabSz="3027487" rtl="0" eaLnBrk="1" latinLnBrk="0" hangingPunct="1">
-              <a:lnSpc>
-                <a:spcPct val="90000"/>
-              </a:lnSpc>
-              <a:spcBef>
-                <a:spcPts val="1655"/>
-              </a:spcBef>
-              <a:buFont typeface="Arial" panose="020B0604020202020204" pitchFamily="34" charset="0"/>
-              <a:buChar char="•"/>
-              <a:defRPr sz="5960" kern="1200">
-                <a:solidFill>
-                  <a:schemeClr val="tx1"/>
-                </a:solidFill>
-                <a:latin typeface="+mn-lt"/>
-                <a:ea typeface="+mn-ea"/>
-                <a:cs typeface="+mn-cs"/>
-              </a:defRPr>
-            </a:lvl4pPr>
-            <a:lvl5pPr marL="6811846" indent="-756872" algn="l" defTabSz="3027487" rtl="0" eaLnBrk="1" latinLnBrk="0" hangingPunct="1">
-              <a:lnSpc>
-                <a:spcPct val="90000"/>
-              </a:lnSpc>
-              <a:spcBef>
-                <a:spcPts val="1655"/>
-              </a:spcBef>
-              <a:buFont typeface="Arial" panose="020B0604020202020204" pitchFamily="34" charset="0"/>
-              <a:buChar char="•"/>
-              <a:defRPr sz="5960" kern="1200">
-                <a:solidFill>
-                  <a:schemeClr val="tx1"/>
-                </a:solidFill>
-                <a:latin typeface="+mn-lt"/>
-                <a:ea typeface="+mn-ea"/>
-                <a:cs typeface="+mn-cs"/>
-              </a:defRPr>
-            </a:lvl5pPr>
-            <a:lvl6pPr marL="8325589" indent="-756872" algn="l" defTabSz="3027487" rtl="0" eaLnBrk="1" latinLnBrk="0" hangingPunct="1">
-              <a:lnSpc>
-                <a:spcPct val="90000"/>
-              </a:lnSpc>
-              <a:spcBef>
-                <a:spcPts val="1655"/>
-              </a:spcBef>
-              <a:buFont typeface="Arial" panose="020B0604020202020204" pitchFamily="34" charset="0"/>
-              <a:buChar char="•"/>
-              <a:defRPr sz="5960" kern="1200">
-                <a:solidFill>
-                  <a:schemeClr val="tx1"/>
-                </a:solidFill>
-                <a:latin typeface="+mn-lt"/>
-                <a:ea typeface="+mn-ea"/>
-                <a:cs typeface="+mn-cs"/>
-              </a:defRPr>
-            </a:lvl6pPr>
-            <a:lvl7pPr marL="9839333" indent="-756872" algn="l" defTabSz="3027487" rtl="0" eaLnBrk="1" latinLnBrk="0" hangingPunct="1">
-              <a:lnSpc>
-                <a:spcPct val="90000"/>
-              </a:lnSpc>
-              <a:spcBef>
-                <a:spcPts val="1655"/>
-              </a:spcBef>
-              <a:buFont typeface="Arial" panose="020B0604020202020204" pitchFamily="34" charset="0"/>
-              <a:buChar char="•"/>
-              <a:defRPr sz="5960" kern="1200">
-                <a:solidFill>
-                  <a:schemeClr val="tx1"/>
-                </a:solidFill>
-                <a:latin typeface="+mn-lt"/>
-                <a:ea typeface="+mn-ea"/>
-                <a:cs typeface="+mn-cs"/>
-              </a:defRPr>
-            </a:lvl7pPr>
-            <a:lvl8pPr marL="11353076" indent="-756872" algn="l" defTabSz="3027487" rtl="0" eaLnBrk="1" latinLnBrk="0" hangingPunct="1">
-              <a:lnSpc>
-                <a:spcPct val="90000"/>
-              </a:lnSpc>
-              <a:spcBef>
-                <a:spcPts val="1655"/>
-              </a:spcBef>
-              <a:buFont typeface="Arial" panose="020B0604020202020204" pitchFamily="34" charset="0"/>
-              <a:buChar char="•"/>
-              <a:defRPr sz="5960" kern="1200">
-                <a:solidFill>
-                  <a:schemeClr val="tx1"/>
-                </a:solidFill>
-                <a:latin typeface="+mn-lt"/>
-                <a:ea typeface="+mn-ea"/>
-                <a:cs typeface="+mn-cs"/>
-              </a:defRPr>
-            </a:lvl8pPr>
-            <a:lvl9pPr marL="12866820" indent="-756872" algn="l" defTabSz="3027487" rtl="0" eaLnBrk="1" latinLnBrk="0" hangingPunct="1">
-              <a:lnSpc>
-                <a:spcPct val="90000"/>
-              </a:lnSpc>
-              <a:spcBef>
-                <a:spcPts val="1655"/>
-              </a:spcBef>
-              <a:buFont typeface="Arial" panose="020B0604020202020204" pitchFamily="34" charset="0"/>
-              <a:buChar char="•"/>
-              <a:defRPr sz="5960" kern="1200">
-                <a:solidFill>
-                  <a:schemeClr val="tx1"/>
-                </a:solidFill>
-                <a:latin typeface="+mn-lt"/>
-                <a:ea typeface="+mn-ea"/>
-                <a:cs typeface="+mn-cs"/>
-              </a:defRPr>
-            </a:lvl9pPr>
-          </a:lstStyle>
-          <a:p>
-            <a:pPr marL="482600" indent="-482600" defTabSz="1230630">
-              <a:spcBef>
-                <a:spcPts val="600"/>
-              </a:spcBef>
-              <a:defRPr sz="3230"/>
-            </a:pPr>
-            <a:r>
-              <a:rPr lang="en-US" sz="3230" smtClean="0"/>
-              <a:t>Observatory (public release end 2016) to derive common </a:t>
-            </a:r>
-            <a:r>
-              <a:rPr lang="en-US" sz="3230" b="1" i="1" smtClean="0">
-                <a:solidFill>
-                  <a:schemeClr val="accent5">
-                    <a:satOff val="-30358"/>
-                    <a:lumOff val="14901"/>
-                  </a:schemeClr>
-                </a:solidFill>
-              </a:rPr>
-              <a:t>observations</a:t>
-            </a:r>
-            <a:r>
-              <a:rPr lang="en-US" sz="3230" smtClean="0"/>
-              <a:t> about </a:t>
-            </a:r>
-            <a:r>
-              <a:rPr lang="en-US" sz="3230" i="1" smtClean="0">
-                <a:solidFill>
-                  <a:schemeClr val="accent5">
-                    <a:satOff val="-30358"/>
-                    <a:lumOff val="14901"/>
-                  </a:schemeClr>
-                </a:solidFill>
-              </a:rPr>
-              <a:t>conditions</a:t>
-            </a:r>
-            <a:r>
-              <a:rPr lang="en-US" sz="3230" smtClean="0"/>
-              <a:t> on a given </a:t>
-            </a:r>
-            <a:r>
-              <a:rPr lang="en-US" sz="3230" i="1" smtClean="0">
-                <a:solidFill>
-                  <a:schemeClr val="accent5">
-                    <a:satOff val="-30358"/>
-                    <a:lumOff val="14901"/>
-                  </a:schemeClr>
-                </a:solidFill>
-              </a:rPr>
-              <a:t>path</a:t>
-            </a:r>
-            <a:r>
-              <a:rPr lang="en-US" sz="3230" smtClean="0"/>
-              <a:t> at a given </a:t>
-            </a:r>
-            <a:r>
-              <a:rPr lang="en-US" sz="3230" i="1" smtClean="0">
-                <a:solidFill>
-                  <a:schemeClr val="accent5">
-                    <a:satOff val="-30358"/>
-                    <a:lumOff val="14901"/>
-                  </a:schemeClr>
-                </a:solidFill>
-              </a:rPr>
-              <a:t>time</a:t>
-            </a:r>
-          </a:p>
-          <a:p>
-            <a:pPr marL="482600" indent="-482600" defTabSz="1230630">
-              <a:spcBef>
-                <a:spcPts val="600"/>
-              </a:spcBef>
-              <a:defRPr sz="3230"/>
-            </a:pPr>
-            <a:r>
-              <a:rPr lang="en-US" sz="3230" smtClean="0"/>
-              <a:t>Combining disparate measurements leads to better insight</a:t>
-            </a:r>
-          </a:p>
-          <a:p>
-            <a:pPr marL="826452" lvl="1" indent="-482600" defTabSz="1230630">
-              <a:spcBef>
-                <a:spcPts val="600"/>
-              </a:spcBef>
-              <a:defRPr sz="3230"/>
-            </a:pPr>
-            <a:r>
-              <a:rPr lang="en-US" sz="3230" smtClean="0"/>
-              <a:t>e.g. own measurement data, traceroutes, BGP, traces</a:t>
-            </a:r>
-          </a:p>
-          <a:p>
-            <a:pPr marL="482600" indent="-482600" defTabSz="1230630">
-              <a:spcBef>
-                <a:spcPts val="600"/>
-              </a:spcBef>
-              <a:defRPr sz="3230"/>
-            </a:pPr>
-            <a:endParaRPr lang="en-US" sz="3230" smtClean="0"/>
-          </a:p>
-          <a:p>
-            <a:pPr marL="482600" indent="-482600" defTabSz="1230630">
-              <a:spcBef>
-                <a:spcPts val="600"/>
-              </a:spcBef>
-              <a:defRPr sz="3230"/>
-            </a:pPr>
-            <a:endParaRPr lang="en-US" sz="3230" smtClean="0"/>
-          </a:p>
-          <a:p>
-            <a:pPr marL="482600" indent="-482600" defTabSz="1230630">
-              <a:spcBef>
-                <a:spcPts val="600"/>
-              </a:spcBef>
-              <a:defRPr sz="3230"/>
-            </a:pPr>
-            <a:endParaRPr lang="en-US" sz="3230" smtClean="0"/>
-          </a:p>
-          <a:p>
-            <a:pPr marL="482600" indent="-482600" defTabSz="1230630">
-              <a:spcBef>
-                <a:spcPts val="600"/>
-              </a:spcBef>
-              <a:defRPr sz="4845"/>
-            </a:pPr>
-            <a:endParaRPr lang="en-US" sz="4845" smtClean="0"/>
-          </a:p>
-          <a:p>
-            <a:pPr marL="0" indent="0" defTabSz="1230630">
-              <a:spcBef>
-                <a:spcPts val="600"/>
-              </a:spcBef>
-              <a:buFont typeface="Arial" panose="020B0604020202020204" pitchFamily="34" charset="0"/>
-              <a:buNone/>
-              <a:defRPr sz="3230"/>
-            </a:pPr>
-            <a:r>
-              <a:rPr lang="en-US" sz="3230" smtClean="0"/>
-              <a:t>Follow </a:t>
-            </a:r>
-            <a:r>
-              <a:rPr lang="en-US" sz="3230" u="sng" smtClean="0">
-                <a:solidFill>
-                  <a:srgbClr val="0000FF"/>
-                </a:solidFill>
-                <a:uFill>
-                  <a:solidFill>
-                    <a:srgbClr val="0000FF"/>
-                  </a:solidFill>
-                </a:uFill>
-                <a:hlinkClick r:id="rId11"/>
-              </a:rPr>
-              <a:t>http://mami-project.eu</a:t>
-            </a:r>
-            <a:r>
-              <a:rPr lang="en-US" sz="3230" smtClean="0"/>
-              <a:t> for availability!</a:t>
-            </a:r>
-            <a:endParaRPr lang="en-US" sz="3230"/>
-          </a:p>
-        </p:txBody>
-      </p:sp>
       <p:grpSp>
         <p:nvGrpSpPr>
           <p:cNvPr id="69" name="Group 194"/>
@@ -3457,10 +3149,10 @@
         </p:nvGrpSpPr>
         <p:grpSpPr>
           <a:xfrm>
-            <a:off x="17512098" y="30293843"/>
-            <a:ext cx="9900002" cy="2462598"/>
+            <a:off x="1966557" y="31012494"/>
+            <a:ext cx="11362348" cy="2898687"/>
             <a:chOff x="0" y="0"/>
-            <a:chExt cx="9900000" cy="2462597"/>
+            <a:chExt cx="9900001" cy="2462598"/>
           </a:xfrm>
         </p:grpSpPr>
         <p:sp>
@@ -3517,7 +3209,7 @@
             </a:effectLst>
             <a:extLst>
               <a:ext uri="{C572A759-6A51-4108-AA02-DFA0A04FC94B}">
-                <ma14:wrappingTextBoxFlag xmlns:ma14="http://schemas.microsoft.com/office/mac/drawingml/2011/main" xmlns="" val="1"/>
+                <ma14:wrappingTextBoxFlag xmlns:ma14="http://schemas.microsoft.com/office/mac/drawingml/2011/main" val="1"/>
               </a:ext>
             </a:extLst>
           </p:spPr>
@@ -3598,7 +3290,7 @@
             </a:effectLst>
             <a:extLst>
               <a:ext uri="{C572A759-6A51-4108-AA02-DFA0A04FC94B}">
-                <ma14:wrappingTextBoxFlag xmlns:ma14="http://schemas.microsoft.com/office/mac/drawingml/2011/main" xmlns="" val="1"/>
+                <ma14:wrappingTextBoxFlag xmlns:ma14="http://schemas.microsoft.com/office/mac/drawingml/2011/main" val="1"/>
               </a:ext>
             </a:extLst>
           </p:spPr>
@@ -3672,7 +3364,7 @@
             </a:effectLst>
             <a:extLst>
               <a:ext uri="{C572A759-6A51-4108-AA02-DFA0A04FC94B}">
-                <ma14:wrappingTextBoxFlag xmlns:ma14="http://schemas.microsoft.com/office/mac/drawingml/2011/main" xmlns="" val="1"/>
+                <ma14:wrappingTextBoxFlag xmlns:ma14="http://schemas.microsoft.com/office/mac/drawingml/2011/main" val="1"/>
               </a:ext>
             </a:extLst>
           </p:spPr>
@@ -3753,7 +3445,7 @@
             </a:effectLst>
             <a:extLst>
               <a:ext uri="{C572A759-6A51-4108-AA02-DFA0A04FC94B}">
-                <ma14:wrappingTextBoxFlag xmlns:ma14="http://schemas.microsoft.com/office/mac/drawingml/2011/main" xmlns="" val="1"/>
+                <ma14:wrappingTextBoxFlag xmlns:ma14="http://schemas.microsoft.com/office/mac/drawingml/2011/main" val="1"/>
               </a:ext>
             </a:extLst>
           </p:spPr>
@@ -3827,7 +3519,7 @@
             </a:effectLst>
             <a:extLst>
               <a:ext uri="{C572A759-6A51-4108-AA02-DFA0A04FC94B}">
-                <ma14:wrappingTextBoxFlag xmlns:ma14="http://schemas.microsoft.com/office/mac/drawingml/2011/main" xmlns="" val="1"/>
+                <ma14:wrappingTextBoxFlag xmlns:ma14="http://schemas.microsoft.com/office/mac/drawingml/2011/main" val="1"/>
               </a:ext>
             </a:extLst>
           </p:spPr>
@@ -3892,7 +3584,7 @@
             </a:effectLst>
             <a:extLst>
               <a:ext uri="{C572A759-6A51-4108-AA02-DFA0A04FC94B}">
-                <ma14:wrappingTextBoxFlag xmlns:ma14="http://schemas.microsoft.com/office/mac/drawingml/2011/main" xmlns="" val="1"/>
+                <ma14:wrappingTextBoxFlag xmlns:ma14="http://schemas.microsoft.com/office/mac/drawingml/2011/main" val="1"/>
               </a:ext>
             </a:extLst>
           </p:spPr>
@@ -3922,6 +3614,7 @@
                 </a:defRPr>
               </a:pPr>
               <a:r>
+                <a:rPr dirty="0"/>
                 <a:t>{t,p,c,v}</a:t>
               </a:r>
             </a:p>
@@ -4038,7 +3731,7 @@
             </a:effectLst>
             <a:extLst>
               <a:ext uri="{C572A759-6A51-4108-AA02-DFA0A04FC94B}">
-                <ma14:wrappingTextBoxFlag xmlns:ma14="http://schemas.microsoft.com/office/mac/drawingml/2011/main" xmlns="" val="1"/>
+                <ma14:wrappingTextBoxFlag xmlns:ma14="http://schemas.microsoft.com/office/mac/drawingml/2011/main" val="1"/>
               </a:ext>
             </a:extLst>
           </p:spPr>
@@ -4213,7 +3906,7 @@
             </a:effectLst>
             <a:extLst>
               <a:ext uri="{C572A759-6A51-4108-AA02-DFA0A04FC94B}">
-                <ma14:wrappingTextBoxFlag xmlns:ma14="http://schemas.microsoft.com/office/mac/drawingml/2011/main" xmlns="" val="1"/>
+                <ma14:wrappingTextBoxFlag xmlns:ma14="http://schemas.microsoft.com/office/mac/drawingml/2011/main" val="1"/>
               </a:ext>
             </a:extLst>
           </p:spPr>
@@ -4413,6 +4106,430 @@
           </p:txBody>
         </p:sp>
       </p:grpSp>
+      <p:pic>
+        <p:nvPicPr>
+          <p:cNvPr id="5" name="Picture 4"/>
+          <p:cNvPicPr>
+            <a:picLocks noChangeAspect="1"/>
+          </p:cNvPicPr>
+          <p:nvPr/>
+        </p:nvPicPr>
+        <p:blipFill>
+          <a:blip r:embed="rId11"/>
+          <a:stretch>
+            <a:fillRect/>
+          </a:stretch>
+        </p:blipFill>
+        <p:spPr>
+          <a:xfrm>
+            <a:off x="3072576" y="23136108"/>
+            <a:ext cx="8409647" cy="3757502"/>
+          </a:xfrm>
+          <a:prstGeom prst="rect">
+            <a:avLst/>
+          </a:prstGeom>
+        </p:spPr>
+      </p:pic>
+      <p:sp>
+        <p:nvSpPr>
+          <p:cNvPr id="6" name="Rectangle 5"/>
+          <p:cNvSpPr/>
+          <p:nvPr/>
+        </p:nvSpPr>
+        <p:spPr>
+          <a:xfrm>
+            <a:off x="1262550" y="27553021"/>
+            <a:ext cx="13045181" cy="2808461"/>
+          </a:xfrm>
+          <a:prstGeom prst="rect">
+            <a:avLst/>
+          </a:prstGeom>
+        </p:spPr>
+        <p:txBody>
+          <a:bodyPr wrap="square">
+            <a:spAutoFit/>
+          </a:bodyPr>
+          <a:lstStyle/>
+          <a:p>
+            <a:pPr marL="571500" indent="-571500" defTabSz="971550">
+              <a:spcBef>
+                <a:spcPts val="500"/>
+              </a:spcBef>
+              <a:buSzPct val="100000"/>
+              <a:buFont typeface="Arial" charset="0"/>
+              <a:buChar char="•"/>
+              <a:defRPr sz="2550"/>
+            </a:pPr>
+            <a:r>
+              <a:rPr lang="en-US" sz="3600" b="1" dirty="0">
+                <a:latin typeface="Helvetica Neue"/>
+                <a:cs typeface="Helvetica" panose="020B0604020202020204" pitchFamily="34" charset="0"/>
+              </a:rPr>
+              <a:t>Path Transparency Observatory</a:t>
+            </a:r>
+          </a:p>
+          <a:p>
+            <a:pPr marL="728662" lvl="1" indent="-457200" defTabSz="971550">
+              <a:spcBef>
+                <a:spcPts val="500"/>
+              </a:spcBef>
+              <a:buFont typeface="Arial" charset="0"/>
+              <a:buChar char="•"/>
+              <a:defRPr sz="2550"/>
+            </a:pPr>
+            <a:r>
+              <a:rPr lang="en-US" sz="3200" dirty="0">
+                <a:latin typeface="Helvetica Neue"/>
+                <a:cs typeface="Helvetica" panose="020B0604020202020204" pitchFamily="34" charset="0"/>
+              </a:rPr>
+              <a:t>Active measurements by the project + external measurements</a:t>
+            </a:r>
+          </a:p>
+          <a:p>
+            <a:pPr marL="728662" lvl="1" indent="-457200" defTabSz="971550">
+              <a:spcBef>
+                <a:spcPts val="500"/>
+              </a:spcBef>
+              <a:buFont typeface="Arial" charset="0"/>
+              <a:buChar char="•"/>
+              <a:defRPr sz="2550"/>
+            </a:pPr>
+            <a:r>
+              <a:rPr lang="en-US" sz="3200" dirty="0" smtClean="0">
+                <a:latin typeface="Helvetica Neue"/>
+                <a:cs typeface="Helvetica" panose="020B0604020202020204" pitchFamily="34" charset="0"/>
+              </a:rPr>
+              <a:t>Public query interface (end 2016) </a:t>
+            </a:r>
+            <a:r>
+              <a:rPr lang="en-US" sz="3200" dirty="0">
+                <a:latin typeface="Helvetica Neue"/>
+                <a:cs typeface="Helvetica" panose="020B0604020202020204" pitchFamily="34" charset="0"/>
+              </a:rPr>
+              <a:t>to access </a:t>
+            </a:r>
+            <a:r>
+              <a:rPr lang="en-US" sz="3200" dirty="0" smtClean="0">
+                <a:latin typeface="Helvetica Neue"/>
+                <a:cs typeface="Helvetica" panose="020B0604020202020204" pitchFamily="34" charset="0"/>
+              </a:rPr>
+              <a:t>path impairment data:</a:t>
+            </a:r>
+            <a:endParaRPr lang="en-US" sz="3200" dirty="0">
+              <a:latin typeface="Helvetica Neue"/>
+              <a:cs typeface="Helvetica" panose="020B0604020202020204" pitchFamily="34" charset="0"/>
+            </a:endParaRPr>
+          </a:p>
+          <a:p>
+            <a:pPr marL="927496" lvl="2" indent="-457200" defTabSz="971550">
+              <a:spcBef>
+                <a:spcPts val="500"/>
+              </a:spcBef>
+              <a:buFont typeface="Arial" charset="0"/>
+              <a:buChar char="•"/>
+              <a:defRPr sz="2550"/>
+            </a:pPr>
+            <a:r>
+              <a:rPr lang="en-US" sz="3200" i="1" dirty="0">
+                <a:latin typeface="Helvetica Neue"/>
+                <a:cs typeface="Helvetica" panose="020B0604020202020204" pitchFamily="34" charset="0"/>
+              </a:rPr>
+              <a:t>What is the likelihood that a certain path impairment impacts my traffic</a:t>
+            </a:r>
+            <a:r>
+              <a:rPr lang="en-US" sz="3200" dirty="0">
+                <a:latin typeface="Helvetica Neue"/>
+                <a:cs typeface="Helvetica" panose="020B0604020202020204" pitchFamily="34" charset="0"/>
+              </a:rPr>
+              <a:t> (modifications/stripping/dropping/blocking)?</a:t>
+            </a:r>
+            <a:endParaRPr lang="en-US" sz="3200" dirty="0">
+              <a:latin typeface="Helvetica Neue"/>
+              <a:cs typeface="Helvetica" panose="020B0604020202020204" pitchFamily="34" charset="0"/>
+            </a:endParaRPr>
+          </a:p>
+        </p:txBody>
+      </p:sp>
+      <p:sp>
+        <p:nvSpPr>
+          <p:cNvPr id="7" name="Rectangle 6"/>
+          <p:cNvSpPr/>
+          <p:nvPr/>
+        </p:nvSpPr>
+        <p:spPr>
+          <a:xfrm>
+            <a:off x="1262550" y="34567867"/>
+            <a:ext cx="12347269" cy="2811026"/>
+          </a:xfrm>
+          <a:prstGeom prst="rect">
+            <a:avLst/>
+          </a:prstGeom>
+        </p:spPr>
+        <p:txBody>
+          <a:bodyPr wrap="square">
+            <a:spAutoFit/>
+          </a:bodyPr>
+          <a:lstStyle/>
+          <a:p>
+            <a:pPr marL="457200" indent="-457200" defTabSz="971550">
+              <a:spcBef>
+                <a:spcPts val="500"/>
+              </a:spcBef>
+              <a:buFont typeface="Arial" charset="0"/>
+              <a:buChar char="•"/>
+              <a:defRPr sz="2550"/>
+            </a:pPr>
+            <a:r>
+              <a:rPr lang="en-US" sz="3200" dirty="0" smtClean="0">
+                <a:latin typeface="Helvetica Neue"/>
+                <a:cs typeface="Helvetica" panose="020B0604020202020204" pitchFamily="34" charset="0"/>
+              </a:rPr>
+              <a:t>Common data model for all </a:t>
+            </a:r>
+            <a:r>
+              <a:rPr lang="en-US" sz="3200" i="1" dirty="0" smtClean="0">
+                <a:latin typeface="Helvetica Neue"/>
+                <a:cs typeface="Helvetica" panose="020B0604020202020204" pitchFamily="34" charset="0"/>
+              </a:rPr>
+              <a:t>observations</a:t>
+            </a:r>
+            <a:r>
+              <a:rPr lang="en-US" sz="3200" dirty="0" smtClean="0">
+                <a:latin typeface="Helvetica Neue"/>
+                <a:cs typeface="Helvetica" panose="020B0604020202020204" pitchFamily="34" charset="0"/>
+              </a:rPr>
+              <a:t> of path conditions</a:t>
+            </a:r>
+          </a:p>
+          <a:p>
+            <a:pPr marL="2211065" lvl="1" indent="-457200" defTabSz="971550">
+              <a:spcBef>
+                <a:spcPts val="500"/>
+              </a:spcBef>
+              <a:buFont typeface="Arial" charset="0"/>
+              <a:buChar char="•"/>
+              <a:defRPr sz="2550"/>
+            </a:pPr>
+            <a:r>
+              <a:rPr lang="en-US" sz="3200" b="1" i="1" dirty="0" smtClean="0">
+                <a:latin typeface="Helvetica Neue"/>
+                <a:cs typeface="Helvetica" panose="020B0604020202020204" pitchFamily="34" charset="0"/>
+              </a:rPr>
+              <a:t>t</a:t>
+            </a:r>
+            <a:r>
+              <a:rPr lang="en-US" sz="3200" dirty="0" smtClean="0">
+                <a:latin typeface="Helvetica Neue"/>
+                <a:cs typeface="Helvetica" panose="020B0604020202020204" pitchFamily="34" charset="0"/>
+              </a:rPr>
+              <a:t>: time of observation</a:t>
+            </a:r>
+          </a:p>
+          <a:p>
+            <a:pPr marL="2211065" lvl="1" indent="-457200" defTabSz="971550">
+              <a:spcBef>
+                <a:spcPts val="500"/>
+              </a:spcBef>
+              <a:buFont typeface="Arial" charset="0"/>
+              <a:buChar char="•"/>
+              <a:defRPr sz="2550"/>
+            </a:pPr>
+            <a:r>
+              <a:rPr lang="en-US" sz="3200" b="1" i="1" dirty="0" smtClean="0">
+                <a:latin typeface="Helvetica Neue"/>
+                <a:cs typeface="Helvetica" panose="020B0604020202020204" pitchFamily="34" charset="0"/>
+              </a:rPr>
+              <a:t>p</a:t>
+            </a:r>
+            <a:r>
+              <a:rPr lang="en-US" sz="3200" dirty="0" smtClean="0">
+                <a:latin typeface="Helvetica Neue"/>
+                <a:cs typeface="Helvetica" panose="020B0604020202020204" pitchFamily="34" charset="0"/>
+              </a:rPr>
+              <a:t>: path to which observation applies</a:t>
+            </a:r>
+          </a:p>
+          <a:p>
+            <a:pPr marL="2211065" lvl="1" indent="-457200" defTabSz="971550">
+              <a:spcBef>
+                <a:spcPts val="500"/>
+              </a:spcBef>
+              <a:buFont typeface="Arial" charset="0"/>
+              <a:buChar char="•"/>
+              <a:defRPr sz="2550"/>
+            </a:pPr>
+            <a:r>
+              <a:rPr lang="en-US" sz="3200" b="1" i="1" dirty="0" smtClean="0">
+                <a:latin typeface="Helvetica Neue"/>
+                <a:cs typeface="Helvetica" panose="020B0604020202020204" pitchFamily="34" charset="0"/>
+              </a:rPr>
+              <a:t>c</a:t>
+            </a:r>
+            <a:r>
+              <a:rPr lang="en-US" sz="3200" dirty="0" smtClean="0">
+                <a:latin typeface="Helvetica Neue"/>
+                <a:cs typeface="Helvetica" panose="020B0604020202020204" pitchFamily="34" charset="0"/>
+              </a:rPr>
+              <a:t>: condition observed, e.g. “feature X </a:t>
+            </a:r>
+            <a:r>
+              <a:rPr lang="en-US" sz="3200" dirty="0" smtClean="0">
+                <a:latin typeface="Helvetica Neue"/>
+                <a:cs typeface="Helvetica" panose="020B0604020202020204" pitchFamily="34" charset="0"/>
+                <a:sym typeface="Wingdings"/>
+              </a:rPr>
+              <a:t> </a:t>
+            </a:r>
+            <a:r>
+              <a:rPr lang="en-US" sz="3200" dirty="0" smtClean="0">
+                <a:latin typeface="Helvetica Neue"/>
+                <a:cs typeface="Helvetica" panose="020B0604020202020204" pitchFamily="34" charset="0"/>
+              </a:rPr>
+              <a:t>packet loss”</a:t>
+            </a:r>
+          </a:p>
+          <a:p>
+            <a:pPr marL="2211065" lvl="1" indent="-457200" defTabSz="971550">
+              <a:spcBef>
+                <a:spcPts val="500"/>
+              </a:spcBef>
+              <a:buFont typeface="Arial" charset="0"/>
+              <a:buChar char="•"/>
+              <a:defRPr sz="2550"/>
+            </a:pPr>
+            <a:r>
+              <a:rPr lang="en-US" sz="3200" b="1" i="1" dirty="0" smtClean="0">
+                <a:latin typeface="Helvetica Neue"/>
+                <a:cs typeface="Helvetica" panose="020B0604020202020204" pitchFamily="34" charset="0"/>
+              </a:rPr>
+              <a:t>v</a:t>
+            </a:r>
+            <a:r>
+              <a:rPr lang="en-US" sz="3200" dirty="0" smtClean="0">
+                <a:latin typeface="Helvetica Neue"/>
+                <a:cs typeface="Helvetica" panose="020B0604020202020204" pitchFamily="34" charset="0"/>
+              </a:rPr>
+              <a:t>: vector of condition-specific values</a:t>
+            </a:r>
+          </a:p>
+        </p:txBody>
+      </p:sp>
+      <p:sp>
+        <p:nvSpPr>
+          <p:cNvPr id="10" name="TextBox 9"/>
+          <p:cNvSpPr txBox="1"/>
+          <p:nvPr/>
+        </p:nvSpPr>
+        <p:spPr>
+          <a:xfrm>
+            <a:off x="2520782" y="15976792"/>
+            <a:ext cx="10528716" cy="1446550"/>
+          </a:xfrm>
+          <a:prstGeom prst="rect">
+            <a:avLst/>
+          </a:prstGeom>
+          <a:noFill/>
+        </p:spPr>
+        <p:txBody>
+          <a:bodyPr wrap="none" rtlCol="0">
+            <a:spAutoFit/>
+          </a:bodyPr>
+          <a:lstStyle/>
+          <a:p>
+            <a:pPr algn="ctr"/>
+            <a:r>
+              <a:rPr lang="en-US" sz="4400" b="1" i="1" dirty="0" smtClean="0">
+                <a:latin typeface="Helvetica Neue" charset="0"/>
+                <a:ea typeface="Helvetica Neue" charset="0"/>
+                <a:cs typeface="Helvetica Neue" charset="0"/>
+              </a:rPr>
+              <a:t>To understand </a:t>
+            </a:r>
+            <a:r>
+              <a:rPr lang="en-US" sz="4400" b="1" i="1" dirty="0" err="1" smtClean="0">
+                <a:latin typeface="Helvetica Neue" charset="0"/>
+                <a:ea typeface="Helvetica Neue" charset="0"/>
+                <a:cs typeface="Helvetica Neue" charset="0"/>
+              </a:rPr>
+              <a:t>middlebox</a:t>
+            </a:r>
+            <a:r>
+              <a:rPr lang="en-US" sz="4400" b="1" i="1" dirty="0" smtClean="0">
+                <a:latin typeface="Helvetica Neue" charset="0"/>
+                <a:ea typeface="Helvetica Neue" charset="0"/>
+                <a:cs typeface="Helvetica Neue" charset="0"/>
+              </a:rPr>
+              <a:t> impairment, </a:t>
+            </a:r>
+          </a:p>
+          <a:p>
+            <a:pPr algn="ctr"/>
+            <a:r>
+              <a:rPr lang="en-US" sz="4400" b="1" i="1" dirty="0" smtClean="0">
+                <a:latin typeface="Helvetica Neue" charset="0"/>
+                <a:ea typeface="Helvetica Neue" charset="0"/>
+                <a:cs typeface="Helvetica Neue" charset="0"/>
+              </a:rPr>
+              <a:t>we must first measure it.</a:t>
+            </a:r>
+            <a:endParaRPr lang="en-US" sz="4400" b="1" i="1" dirty="0">
+              <a:latin typeface="Helvetica Neue" charset="0"/>
+              <a:ea typeface="Helvetica Neue" charset="0"/>
+              <a:cs typeface="Helvetica Neue" charset="0"/>
+            </a:endParaRPr>
+          </a:p>
+        </p:txBody>
+      </p:sp>
+      <p:sp>
+        <p:nvSpPr>
+          <p:cNvPr id="54" name="TextBox 53"/>
+          <p:cNvSpPr txBox="1"/>
+          <p:nvPr/>
+        </p:nvSpPr>
+        <p:spPr>
+          <a:xfrm>
+            <a:off x="16508585" y="15972057"/>
+            <a:ext cx="11731097" cy="1446550"/>
+          </a:xfrm>
+          <a:prstGeom prst="rect">
+            <a:avLst/>
+          </a:prstGeom>
+          <a:noFill/>
+        </p:spPr>
+        <p:txBody>
+          <a:bodyPr wrap="none" rtlCol="0">
+            <a:spAutoFit/>
+          </a:bodyPr>
+          <a:lstStyle/>
+          <a:p>
+            <a:pPr algn="ctr"/>
+            <a:r>
+              <a:rPr lang="en-US" sz="4400" b="1" i="1" dirty="0" smtClean="0">
+                <a:latin typeface="Helvetica Neue" charset="0"/>
+                <a:ea typeface="Helvetica Neue" charset="0"/>
+                <a:cs typeface="Helvetica Neue" charset="0"/>
+              </a:rPr>
+              <a:t>Then we adjust the Internet architecture</a:t>
+            </a:r>
+          </a:p>
+          <a:p>
+            <a:pPr algn="ctr"/>
+            <a:r>
+              <a:rPr lang="en-US" sz="4400" b="1" i="1" dirty="0" smtClean="0">
+                <a:latin typeface="Helvetica Neue" charset="0"/>
+                <a:ea typeface="Helvetica Neue" charset="0"/>
+                <a:cs typeface="Helvetica Neue" charset="0"/>
+              </a:rPr>
+              <a:t>for explicit cooperation with path elements</a:t>
+            </a:r>
+            <a:endParaRPr lang="en-US" sz="4400" b="1" i="1" dirty="0">
+              <a:latin typeface="Helvetica Neue" charset="0"/>
+              <a:ea typeface="Helvetica Neue" charset="0"/>
+              <a:cs typeface="Helvetica Neue" charset="0"/>
+            </a:endParaRPr>
+          </a:p>
+        </p:txBody>
+      </p:sp>
     </p:spTree>
     <p:extLst>
       <p:ext uri="{BB962C8B-B14F-4D97-AF65-F5344CB8AC3E}">

</xml_diff>

<commit_message>
spaces aligned and header smaller
</commit_message>
<xml_diff>
--- a/NetFutures/mami-poster.pptx
+++ b/NetFutures/mami-poster.pptx
@@ -199,7 +199,7 @@
         <p:spPr bwMode="auto">
           <a:xfrm>
             <a:off x="667328" y="666000"/>
-            <a:ext cx="22031325" cy="5986463"/>
+            <a:ext cx="14687550" cy="3990975"/>
           </a:xfrm>
           <a:prstGeom prst="rect">
             <a:avLst/>
@@ -906,8 +906,8 @@
         </p:blipFill>
         <p:spPr>
           <a:xfrm>
-            <a:off x="19936903" y="711360"/>
-            <a:ext cx="10058400" cy="4905721"/>
+            <a:off x="22957702" y="666000"/>
+            <a:ext cx="6644351" cy="3239875"/>
           </a:xfrm>
           <a:prstGeom prst="rect">
             <a:avLst/>
@@ -922,7 +922,7 @@
         </p:nvSpPr>
         <p:spPr>
           <a:xfrm>
-            <a:off x="25685560" y="6134803"/>
+            <a:off x="25565383" y="4010644"/>
             <a:ext cx="3749744" cy="646331"/>
           </a:xfrm>
           <a:prstGeom prst="rect">
@@ -965,7 +965,7 @@
         </p:nvSpPr>
         <p:spPr>
           <a:xfrm>
-            <a:off x="26055853" y="5488472"/>
+            <a:off x="21850281" y="4010644"/>
             <a:ext cx="3379451" cy="646331"/>
           </a:xfrm>
           <a:prstGeom prst="rect">
@@ -1319,7 +1319,7 @@
         </p:nvSpPr>
         <p:spPr>
           <a:xfrm>
-            <a:off x="1948366" y="12650081"/>
+            <a:off x="1947035" y="10839438"/>
             <a:ext cx="6921767" cy="841256"/>
           </a:xfrm>
           <a:prstGeom prst="rect">
@@ -1330,7 +1330,7 @@
           </a:ln>
           <a:extLst>
             <a:ext uri="{C572A759-6A51-4108-AA02-DFA0A04FC94B}">
-              <ma14:wrappingTextBoxFlag xmlns:ma14="http://schemas.microsoft.com/office/mac/drawingml/2011/main" val="1"/>
+              <ma14:wrappingTextBoxFlag xmlns:ma14="http://schemas.microsoft.com/office/mac/drawingml/2011/main" xmlns="" val="1"/>
             </a:ext>
           </a:extLst>
         </p:spPr>
@@ -1343,20 +1343,20 @@
             <a:pPr algn="ctr"/>
             <a:r>
               <a:rPr sz="4800" dirty="0">
-                <a:latin typeface="Arial" panose="020B0604020202020204" pitchFamily="34" charset="0"/>
+                <a:latin typeface="Helvetica Neue"/>
                 <a:cs typeface="Arial" panose="020B0604020202020204" pitchFamily="34" charset="0"/>
               </a:rPr>
               <a:t>of deployed </a:t>
             </a:r>
             <a:r>
               <a:rPr sz="4800" dirty="0" err="1">
-                <a:latin typeface="Arial" panose="020B0604020202020204" pitchFamily="34" charset="0"/>
+                <a:latin typeface="Helvetica Neue"/>
                 <a:cs typeface="Arial" panose="020B0604020202020204" pitchFamily="34" charset="0"/>
               </a:rPr>
               <a:t>middleboxes</a:t>
             </a:r>
             <a:endParaRPr sz="4800" dirty="0">
-              <a:latin typeface="Arial" panose="020B0604020202020204" pitchFamily="34" charset="0"/>
+              <a:latin typeface="Helvetica Neue"/>
               <a:cs typeface="Arial" panose="020B0604020202020204" pitchFamily="34" charset="0"/>
             </a:endParaRPr>
           </a:p>
@@ -1370,7 +1370,7 @@
         </p:nvSpPr>
         <p:spPr>
           <a:xfrm>
-            <a:off x="11482223" y="12650081"/>
+            <a:off x="11480892" y="10839438"/>
             <a:ext cx="7195881" cy="841256"/>
           </a:xfrm>
           <a:prstGeom prst="rect">
@@ -1381,7 +1381,7 @@
           </a:ln>
           <a:extLst>
             <a:ext uri="{C572A759-6A51-4108-AA02-DFA0A04FC94B}">
-              <ma14:wrappingTextBoxFlag xmlns:ma14="http://schemas.microsoft.com/office/mac/drawingml/2011/main" val="1"/>
+              <ma14:wrappingTextBoxFlag xmlns:ma14="http://schemas.microsoft.com/office/mac/drawingml/2011/main" xmlns="" val="1"/>
             </a:ext>
           </a:extLst>
         </p:spPr>
@@ -1394,21 +1394,21 @@
             <a:pPr algn="ctr"/>
             <a:r>
               <a:rPr sz="4800" dirty="0">
-                <a:latin typeface="Arial" panose="020B0604020202020204" pitchFamily="34" charset="0"/>
+                <a:latin typeface="Helvetica Neue"/>
                 <a:cs typeface="Arial" panose="020B0604020202020204" pitchFamily="34" charset="0"/>
               </a:rPr>
               <a:t>for </a:t>
             </a:r>
             <a:r>
               <a:rPr sz="4800" dirty="0" err="1">
-                <a:latin typeface="Arial" panose="020B0604020202020204" pitchFamily="34" charset="0"/>
+                <a:latin typeface="Helvetica Neue"/>
                 <a:cs typeface="Arial" panose="020B0604020202020204" pitchFamily="34" charset="0"/>
               </a:rPr>
               <a:t>middlebox</a:t>
             </a:r>
             <a:r>
               <a:rPr sz="4800" dirty="0">
-                <a:latin typeface="Arial" panose="020B0604020202020204" pitchFamily="34" charset="0"/>
+                <a:latin typeface="Helvetica Neue"/>
                 <a:cs typeface="Arial" panose="020B0604020202020204" pitchFamily="34" charset="0"/>
               </a:rPr>
               <a:t> cooperation</a:t>
@@ -1424,7 +1424,7 @@
         </p:nvSpPr>
         <p:spPr>
           <a:xfrm>
-            <a:off x="19865181" y="12650081"/>
+            <a:off x="19863850" y="10839438"/>
             <a:ext cx="9611605" cy="841256"/>
           </a:xfrm>
           <a:prstGeom prst="rect">
@@ -1435,7 +1435,7 @@
           </a:ln>
           <a:extLst>
             <a:ext uri="{C572A759-6A51-4108-AA02-DFA0A04FC94B}">
-              <ma14:wrappingTextBoxFlag xmlns:ma14="http://schemas.microsoft.com/office/mac/drawingml/2011/main" val="1"/>
+              <ma14:wrappingTextBoxFlag xmlns:ma14="http://schemas.microsoft.com/office/mac/drawingml/2011/main" xmlns="" val="1"/>
             </a:ext>
           </a:extLst>
         </p:spPr>
@@ -1447,21 +1447,21 @@
           <a:p>
             <a:pPr algn="ctr"/>
             <a:r>
-              <a:rPr lang="en-US" sz="4800" smtClean="0">
-                <a:latin typeface="Arial" panose="020B0604020202020204" pitchFamily="34" charset="0"/>
+              <a:rPr lang="en-US" sz="4800" dirty="0" smtClean="0">
+                <a:latin typeface="Helvetica Neue"/>
                 <a:cs typeface="Arial" panose="020B0604020202020204" pitchFamily="34" charset="0"/>
               </a:rPr>
               <a:t>for Internet-scale </a:t>
             </a:r>
             <a:r>
               <a:rPr sz="4800" dirty="0" err="1" smtClean="0">
-                <a:latin typeface="Arial" panose="020B0604020202020204" pitchFamily="34" charset="0"/>
+                <a:latin typeface="Helvetica Neue"/>
                 <a:cs typeface="Arial" panose="020B0604020202020204" pitchFamily="34" charset="0"/>
               </a:rPr>
               <a:t>deployability</a:t>
             </a:r>
             <a:endParaRPr sz="4800" dirty="0">
-              <a:latin typeface="Arial" panose="020B0604020202020204" pitchFamily="34" charset="0"/>
+              <a:latin typeface="Helvetica Neue"/>
               <a:cs typeface="Arial" panose="020B0604020202020204" pitchFamily="34" charset="0"/>
             </a:endParaRPr>
           </a:p>
@@ -1475,7 +1475,7 @@
         </p:nvSpPr>
         <p:spPr>
           <a:xfrm>
-            <a:off x="2740240" y="11484890"/>
+            <a:off x="2738909" y="9674247"/>
             <a:ext cx="5338018" cy="1165191"/>
           </a:xfrm>
           <a:prstGeom prst="rect">
@@ -1486,7 +1486,7 @@
           </a:ln>
           <a:extLst>
             <a:ext uri="{C572A759-6A51-4108-AA02-DFA0A04FC94B}">
-              <ma14:wrappingTextBoxFlag xmlns:ma14="http://schemas.microsoft.com/office/mac/drawingml/2011/main" val="1"/>
+              <ma14:wrappingTextBoxFlag xmlns:ma14="http://schemas.microsoft.com/office/mac/drawingml/2011/main" xmlns="" val="1"/>
             </a:ext>
           </a:extLst>
         </p:spPr>
@@ -1535,7 +1535,7 @@
         </p:blipFill>
         <p:spPr>
           <a:xfrm>
-            <a:off x="3218499" y="7390643"/>
+            <a:off x="3217168" y="5580000"/>
             <a:ext cx="4381500" cy="4381500"/>
           </a:xfrm>
           <a:prstGeom prst="rect">
@@ -1554,7 +1554,7 @@
         </p:nvSpPr>
         <p:spPr>
           <a:xfrm>
-            <a:off x="12597913" y="11484890"/>
+            <a:off x="12596582" y="9674247"/>
             <a:ext cx="4964501" cy="1165191"/>
           </a:xfrm>
           <a:prstGeom prst="rect">
@@ -1565,7 +1565,7 @@
           </a:ln>
           <a:extLst>
             <a:ext uri="{C572A759-6A51-4108-AA02-DFA0A04FC94B}">
-              <ma14:wrappingTextBoxFlag xmlns:ma14="http://schemas.microsoft.com/office/mac/drawingml/2011/main" val="1"/>
+              <ma14:wrappingTextBoxFlag xmlns:ma14="http://schemas.microsoft.com/office/mac/drawingml/2011/main" xmlns="" val="1"/>
             </a:ext>
           </a:extLst>
         </p:spPr>
@@ -1613,7 +1613,7 @@
         </p:blipFill>
         <p:spPr>
           <a:xfrm>
-            <a:off x="12889413" y="7390643"/>
+            <a:off x="12888082" y="5580000"/>
             <a:ext cx="4381500" cy="4381500"/>
           </a:xfrm>
           <a:prstGeom prst="rect">
@@ -1632,7 +1632,7 @@
         </p:nvSpPr>
         <p:spPr>
           <a:xfrm>
-            <a:off x="21367995" y="11490829"/>
+            <a:off x="21366664" y="9680186"/>
             <a:ext cx="6605976" cy="1165191"/>
           </a:xfrm>
           <a:prstGeom prst="rect">
@@ -1643,7 +1643,7 @@
           </a:ln>
           <a:extLst>
             <a:ext uri="{C572A759-6A51-4108-AA02-DFA0A04FC94B}">
-              <ma14:wrappingTextBoxFlag xmlns:ma14="http://schemas.microsoft.com/office/mac/drawingml/2011/main" val="1"/>
+              <ma14:wrappingTextBoxFlag xmlns:ma14="http://schemas.microsoft.com/office/mac/drawingml/2011/main" xmlns="" val="1"/>
             </a:ext>
           </a:extLst>
         </p:spPr>
@@ -1691,7 +1691,7 @@
         </p:blipFill>
         <p:spPr>
           <a:xfrm>
-            <a:off x="22480233" y="7396582"/>
+            <a:off x="22478902" y="5585939"/>
             <a:ext cx="4381500" cy="4381500"/>
           </a:xfrm>
           <a:prstGeom prst="rect">
@@ -1702,96 +1702,81 @@
           </a:ln>
         </p:spPr>
       </p:pic>
-      <p:grpSp>
-        <p:nvGrpSpPr>
-          <p:cNvPr id="11" name="Group 10"/>
-          <p:cNvGrpSpPr/>
+      <p:sp>
+        <p:nvSpPr>
+          <p:cNvPr id="36" name="Abgerundetes Rechteck 35"/>
+          <p:cNvSpPr/>
           <p:nvPr/>
-        </p:nvGrpSpPr>
-        <p:grpSpPr>
+        </p:nvSpPr>
+        <p:spPr>
           <a:xfrm>
-            <a:off x="987731" y="14159909"/>
-            <a:ext cx="14007935" cy="22769381"/>
-            <a:chOff x="987731" y="15302909"/>
-            <a:chExt cx="14007935" cy="22769381"/>
+            <a:off x="986400" y="12895956"/>
+            <a:ext cx="13320000" cy="23768513"/>
           </a:xfrm>
-        </p:grpSpPr>
-        <p:sp>
-          <p:nvSpPr>
-            <p:cNvPr id="36" name="Abgerundetes Rechteck 35"/>
-            <p:cNvSpPr/>
-            <p:nvPr/>
-          </p:nvSpPr>
-          <p:spPr>
-            <a:xfrm>
-              <a:off x="987731" y="15849599"/>
-              <a:ext cx="13320000" cy="22222691"/>
-            </a:xfrm>
-            <a:prstGeom prst="roundRect">
-              <a:avLst/>
-            </a:prstGeom>
-            <a:noFill/>
-            <a:ln w="127000">
-              <a:solidFill>
-                <a:srgbClr val="FF8080"/>
-              </a:solidFill>
-            </a:ln>
-          </p:spPr>
-          <p:style>
-            <a:lnRef idx="2">
-              <a:schemeClr val="accent1">
-                <a:shade val="50000"/>
-              </a:schemeClr>
-            </a:lnRef>
-            <a:fillRef idx="1">
-              <a:schemeClr val="accent1"/>
-            </a:fillRef>
-            <a:effectRef idx="0">
-              <a:schemeClr val="accent1"/>
-            </a:effectRef>
-            <a:fontRef idx="minor">
-              <a:schemeClr val="lt1"/>
-            </a:fontRef>
-          </p:style>
-          <p:txBody>
-            <a:bodyPr rtlCol="0" anchor="ctr"/>
-            <a:lstStyle/>
-            <a:p>
-              <a:pPr algn="ctr"/>
-              <a:endParaRPr lang="en-US"/>
-            </a:p>
-          </p:txBody>
-        </p:sp>
-        <p:pic>
-          <p:nvPicPr>
-            <p:cNvPr id="46" name="image5.png"/>
-            <p:cNvPicPr>
-              <a:picLocks noChangeAspect="1"/>
-            </p:cNvPicPr>
-            <p:nvPr/>
-          </p:nvPicPr>
-          <p:blipFill>
-            <a:blip r:embed="rId2">
-              <a:extLst/>
-            </a:blip>
-            <a:stretch>
-              <a:fillRect/>
-            </a:stretch>
-          </p:blipFill>
-          <p:spPr>
-            <a:xfrm>
-              <a:off x="12804916" y="15302909"/>
-              <a:ext cx="2190750" cy="2190750"/>
-            </a:xfrm>
-            <a:prstGeom prst="rect">
-              <a:avLst/>
-            </a:prstGeom>
-            <a:ln w="12700">
-              <a:miter lim="400000"/>
-            </a:ln>
-          </p:spPr>
-        </p:pic>
-      </p:grpSp>
+          <a:prstGeom prst="roundRect">
+            <a:avLst/>
+          </a:prstGeom>
+          <a:noFill/>
+          <a:ln w="127000">
+            <a:solidFill>
+              <a:srgbClr val="FF8080"/>
+            </a:solidFill>
+          </a:ln>
+        </p:spPr>
+        <p:style>
+          <a:lnRef idx="2">
+            <a:schemeClr val="accent1">
+              <a:shade val="50000"/>
+            </a:schemeClr>
+          </a:lnRef>
+          <a:fillRef idx="1">
+            <a:schemeClr val="accent1"/>
+          </a:fillRef>
+          <a:effectRef idx="0">
+            <a:schemeClr val="accent1"/>
+          </a:effectRef>
+          <a:fontRef idx="minor">
+            <a:schemeClr val="lt1"/>
+          </a:fontRef>
+        </p:style>
+        <p:txBody>
+          <a:bodyPr rtlCol="0" anchor="ctr"/>
+          <a:lstStyle/>
+          <a:p>
+            <a:pPr algn="ctr"/>
+            <a:endParaRPr lang="en-US"/>
+          </a:p>
+        </p:txBody>
+      </p:sp>
+      <p:pic>
+        <p:nvPicPr>
+          <p:cNvPr id="46" name="image5.png"/>
+          <p:cNvPicPr>
+            <a:picLocks noChangeAspect="1"/>
+          </p:cNvPicPr>
+          <p:nvPr/>
+        </p:nvPicPr>
+        <p:blipFill>
+          <a:blip r:embed="rId2">
+            <a:extLst/>
+          </a:blip>
+          <a:stretch>
+            <a:fillRect/>
+          </a:stretch>
+        </p:blipFill>
+        <p:spPr>
+          <a:xfrm>
+            <a:off x="12803585" y="12349266"/>
+            <a:ext cx="2190750" cy="2190750"/>
+          </a:xfrm>
+          <a:prstGeom prst="rect">
+            <a:avLst/>
+          </a:prstGeom>
+          <a:ln w="12700">
+            <a:miter lim="400000"/>
+          </a:ln>
+        </p:spPr>
+      </p:pic>
       <p:sp>
         <p:nvSpPr>
           <p:cNvPr id="47" name="Abgerundetes Rechteck 46"/>
@@ -1800,8 +1785,8 @@
         </p:nvSpPr>
         <p:spPr>
           <a:xfrm>
-            <a:off x="15883413" y="28577988"/>
-            <a:ext cx="13320000" cy="8260024"/>
+            <a:off x="15882082" y="26767345"/>
+            <a:ext cx="13320000" cy="9897124"/>
           </a:xfrm>
           <a:prstGeom prst="roundRect">
             <a:avLst/>
@@ -1856,7 +1841,7 @@
         </p:blipFill>
         <p:spPr>
           <a:xfrm>
-            <a:off x="27677917" y="27837468"/>
+            <a:off x="27676586" y="26026825"/>
             <a:ext cx="2190750" cy="2320574"/>
           </a:xfrm>
           <a:prstGeom prst="rect">
@@ -1875,7 +1860,7 @@
         </p:nvSpPr>
         <p:spPr>
           <a:xfrm>
-            <a:off x="15883413" y="14662590"/>
+            <a:off x="15882082" y="12851947"/>
             <a:ext cx="13320000" cy="12744971"/>
           </a:xfrm>
           <a:prstGeom prst="roundRect">
@@ -1931,7 +1916,7 @@
         </p:blipFill>
         <p:spPr>
           <a:xfrm>
-            <a:off x="27677917" y="14205392"/>
+            <a:off x="27676586" y="12394749"/>
             <a:ext cx="2190750" cy="2190750"/>
           </a:xfrm>
           <a:prstGeom prst="rect">
@@ -1952,15 +1937,15 @@
         </p:nvSpPr>
         <p:spPr>
           <a:xfrm>
-            <a:off x="1182789" y="16911012"/>
-            <a:ext cx="11866709" cy="5279041"/>
+            <a:off x="986400" y="15100369"/>
+            <a:ext cx="13320000" cy="20708942"/>
           </a:xfrm>
           <a:prstGeom prst="rect">
             <a:avLst/>
           </a:prstGeom>
         </p:spPr>
         <p:txBody>
-          <a:bodyPr/>
+          <a:bodyPr lIns="450000" rIns="450000"/>
           <a:lstStyle>
             <a:lvl1pPr marL="756872" indent="-756872" algn="l" defTabSz="3027487" rtl="0" eaLnBrk="1" latinLnBrk="0" hangingPunct="1">
               <a:lnSpc>
@@ -2126,11 +2111,12 @@
             </a:lvl9pPr>
           </a:lstStyle>
           <a:p>
-            <a:pPr defTabSz="971550">
+            <a:pPr marL="0" indent="0" defTabSz="971550">
               <a:spcBef>
                 <a:spcPts val="500"/>
               </a:spcBef>
               <a:buSzPct val="100000"/>
+              <a:buNone/>
               <a:defRPr sz="2550" b="1"/>
             </a:pPr>
             <a:r>
@@ -2181,49 +2167,234 @@
                 <a:latin typeface="Helvetica Neue"/>
                 <a:cs typeface="Helvetica" panose="020B0604020202020204" pitchFamily="34" charset="0"/>
               </a:rPr>
-              <a:t>(e.g. TFO, MPTCP), and other protocol (ICMP, DNS, …)</a:t>
-            </a:r>
-          </a:p>
-          <a:p>
-            <a:pPr marL="652462" lvl="1" indent="-381000" defTabSz="971550">
-              <a:spcBef>
-                <a:spcPts val="500"/>
-              </a:spcBef>
-              <a:defRPr sz="2550"/>
-            </a:pPr>
+              <a:t>(e.g. TFO, MPTCP), and other protocol (ICMP, DNS, </a:t>
+            </a:r>
+            <a:r>
+              <a:rPr lang="en-US" sz="3200" dirty="0" smtClean="0">
+                <a:latin typeface="Helvetica Neue"/>
+                <a:cs typeface="Helvetica" panose="020B0604020202020204" pitchFamily="34" charset="0"/>
+              </a:rPr>
+              <a:t>…)</a:t>
+            </a:r>
             <a:endParaRPr lang="en-US" sz="1200" dirty="0" smtClean="0">
               <a:latin typeface="Helvetica Neue"/>
               <a:cs typeface="Helvetica" panose="020B0604020202020204" pitchFamily="34" charset="0"/>
             </a:endParaRPr>
           </a:p>
           <a:p>
-            <a:pPr defTabSz="971550">
+            <a:pPr marL="0" indent="0" defTabSz="971550">
               <a:spcBef>
                 <a:spcPts val="500"/>
               </a:spcBef>
               <a:buSzPct val="100000"/>
+              <a:buNone/>
               <a:defRPr sz="2550"/>
             </a:pPr>
+            <a:endParaRPr lang="de-DE" sz="3600" b="1" dirty="0" smtClean="0">
+              <a:latin typeface="Helvetica Neue"/>
+              <a:cs typeface="Helvetica" panose="020B0604020202020204" pitchFamily="34" charset="0"/>
+            </a:endParaRPr>
+          </a:p>
+          <a:p>
+            <a:pPr marL="0" indent="0" defTabSz="971550">
+              <a:spcBef>
+                <a:spcPts val="500"/>
+              </a:spcBef>
+              <a:buSzPct val="100000"/>
+              <a:buNone/>
+              <a:defRPr sz="2550"/>
+            </a:pPr>
+            <a:endParaRPr lang="de-DE" sz="3600" b="1" dirty="0">
+              <a:latin typeface="Helvetica Neue"/>
+              <a:cs typeface="Helvetica" panose="020B0604020202020204" pitchFamily="34" charset="0"/>
+            </a:endParaRPr>
+          </a:p>
+          <a:p>
+            <a:pPr marL="0" indent="0" defTabSz="971550">
+              <a:spcBef>
+                <a:spcPts val="500"/>
+              </a:spcBef>
+              <a:buSzPct val="100000"/>
+              <a:buNone/>
+              <a:defRPr sz="2550"/>
+            </a:pPr>
+            <a:endParaRPr lang="de-DE" sz="3600" b="1" dirty="0" smtClean="0">
+              <a:latin typeface="Helvetica Neue"/>
+              <a:cs typeface="Helvetica" panose="020B0604020202020204" pitchFamily="34" charset="0"/>
+            </a:endParaRPr>
+          </a:p>
+          <a:p>
+            <a:pPr marL="0" indent="0" defTabSz="971550">
+              <a:spcBef>
+                <a:spcPts val="500"/>
+              </a:spcBef>
+              <a:buSzPct val="100000"/>
+              <a:buNone/>
+              <a:defRPr sz="2550"/>
+            </a:pPr>
+            <a:endParaRPr lang="de-DE" sz="3600" b="1" dirty="0">
+              <a:latin typeface="Helvetica Neue"/>
+              <a:cs typeface="Helvetica" panose="020B0604020202020204" pitchFamily="34" charset="0"/>
+            </a:endParaRPr>
+          </a:p>
+          <a:p>
+            <a:pPr marL="0" indent="0" defTabSz="971550">
+              <a:spcBef>
+                <a:spcPts val="500"/>
+              </a:spcBef>
+              <a:buSzPct val="100000"/>
+              <a:buNone/>
+              <a:defRPr sz="2550"/>
+            </a:pPr>
+            <a:endParaRPr lang="de-DE" sz="3600" b="1" dirty="0" smtClean="0">
+              <a:latin typeface="Helvetica Neue"/>
+              <a:cs typeface="Helvetica" panose="020B0604020202020204" pitchFamily="34" charset="0"/>
+            </a:endParaRPr>
+          </a:p>
+          <a:p>
+            <a:pPr marL="0" indent="0" defTabSz="971550">
+              <a:spcBef>
+                <a:spcPts val="500"/>
+              </a:spcBef>
+              <a:buSzPct val="100000"/>
+              <a:buNone/>
+              <a:defRPr sz="2550"/>
+            </a:pPr>
+            <a:endParaRPr lang="de-DE" sz="3600" b="1" dirty="0" smtClean="0">
+              <a:latin typeface="Helvetica Neue"/>
+              <a:cs typeface="Helvetica" panose="020B0604020202020204" pitchFamily="34" charset="0"/>
+            </a:endParaRPr>
+          </a:p>
+          <a:p>
+            <a:pPr marL="0" indent="0" defTabSz="971550">
+              <a:spcBef>
+                <a:spcPts val="500"/>
+              </a:spcBef>
+              <a:buSzPct val="100000"/>
+              <a:buNone/>
+              <a:defRPr sz="2550"/>
+            </a:pPr>
+            <a:endParaRPr lang="de-DE" sz="3600" b="1" dirty="0">
+              <a:latin typeface="Helvetica Neue"/>
+              <a:cs typeface="Helvetica" panose="020B0604020202020204" pitchFamily="34" charset="0"/>
+            </a:endParaRPr>
+          </a:p>
+          <a:p>
+            <a:pPr marL="0" indent="0" defTabSz="971550">
+              <a:spcBef>
+                <a:spcPts val="500"/>
+              </a:spcBef>
+              <a:buSzPct val="100000"/>
+              <a:buNone/>
+              <a:defRPr sz="2550"/>
+            </a:pPr>
+            <a:endParaRPr lang="en-US" sz="3600" b="1" dirty="0" smtClean="0">
+              <a:latin typeface="Helvetica Neue"/>
+              <a:cs typeface="Helvetica" panose="020B0604020202020204" pitchFamily="34" charset="0"/>
+            </a:endParaRPr>
+          </a:p>
+          <a:p>
+            <a:pPr marL="0" indent="0" defTabSz="971550">
+              <a:spcBef>
+                <a:spcPts val="500"/>
+              </a:spcBef>
+              <a:buSzPct val="100000"/>
+              <a:buNone/>
+              <a:defRPr sz="2550"/>
+            </a:pPr>
+            <a:endParaRPr lang="en-US" sz="3600" b="1" dirty="0" smtClean="0">
+              <a:latin typeface="Helvetica Neue"/>
+              <a:cs typeface="Helvetica" panose="020B0604020202020204" pitchFamily="34" charset="0"/>
+            </a:endParaRPr>
+          </a:p>
+          <a:p>
+            <a:pPr marL="0" indent="0" defTabSz="971550">
+              <a:spcBef>
+                <a:spcPts val="500"/>
+              </a:spcBef>
+              <a:buSzPct val="100000"/>
+              <a:buNone/>
+              <a:defRPr sz="2550"/>
+            </a:pPr>
+            <a:endParaRPr lang="de-DE" sz="3600" b="1" dirty="0" smtClean="0">
+              <a:latin typeface="Helvetica Neue"/>
+              <a:cs typeface="Helvetica" panose="020B0604020202020204" pitchFamily="34" charset="0"/>
+            </a:endParaRPr>
+          </a:p>
+          <a:p>
+            <a:pPr marL="0" indent="0" defTabSz="971550">
+              <a:spcBef>
+                <a:spcPts val="500"/>
+              </a:spcBef>
+              <a:buSzPct val="100000"/>
+              <a:buNone/>
+              <a:defRPr sz="2550"/>
+            </a:pPr>
+            <a:endParaRPr lang="en-US" sz="3600" b="1" dirty="0">
+              <a:latin typeface="Helvetica Neue"/>
+              <a:cs typeface="Helvetica" panose="020B0604020202020204" pitchFamily="34" charset="0"/>
+            </a:endParaRPr>
+          </a:p>
+          <a:p>
+            <a:pPr marL="0" indent="0" defTabSz="971550">
+              <a:spcBef>
+                <a:spcPts val="500"/>
+              </a:spcBef>
+              <a:buSzPct val="100000"/>
+              <a:buNone/>
+              <a:defRPr sz="2550"/>
+            </a:pPr>
+            <a:endParaRPr lang="en-US" sz="2400" b="1" dirty="0" smtClean="0">
+              <a:latin typeface="Helvetica Neue"/>
+              <a:cs typeface="Helvetica" panose="020B0604020202020204" pitchFamily="34" charset="0"/>
+            </a:endParaRPr>
+          </a:p>
+          <a:p>
+            <a:pPr marL="0" indent="0" defTabSz="971550">
+              <a:spcBef>
+                <a:spcPts val="500"/>
+              </a:spcBef>
+              <a:buSzPct val="100000"/>
+              <a:buNone/>
+              <a:defRPr sz="2550"/>
+            </a:pPr>
             <a:r>
               <a:rPr lang="en-US" sz="3600" b="1" dirty="0" smtClean="0">
                 <a:latin typeface="Helvetica Neue"/>
                 <a:cs typeface="Helvetica" panose="020B0604020202020204" pitchFamily="34" charset="0"/>
               </a:rPr>
-              <a:t>Development of new </a:t>
+              <a:t>Development </a:t>
             </a:r>
             <a:r>
               <a:rPr lang="en-US" sz="3600" b="1" dirty="0" smtClean="0">
                 <a:latin typeface="Helvetica Neue"/>
                 <a:cs typeface="Helvetica" panose="020B0604020202020204" pitchFamily="34" charset="0"/>
               </a:rPr>
-              <a:t>measurement tools</a:t>
+              <a:t>of new measurement </a:t>
             </a:r>
             <a:r>
               <a:rPr lang="en-US" sz="3600" b="1" dirty="0" smtClean="0">
                 <a:latin typeface="Helvetica Neue"/>
                 <a:cs typeface="Helvetica" panose="020B0604020202020204" pitchFamily="34" charset="0"/>
               </a:rPr>
-              <a:t>:</a:t>
+              <a:t>tools</a:t>
+            </a:r>
+          </a:p>
+          <a:p>
+            <a:pPr marL="0" indent="0" defTabSz="971550">
+              <a:spcBef>
+                <a:spcPts val="500"/>
+              </a:spcBef>
+              <a:buSzPct val="100000"/>
+              <a:buNone/>
+              <a:defRPr sz="2550"/>
+            </a:pPr>
+            <a:r>
+              <a:rPr lang="en-US" sz="3600" b="1" dirty="0">
+                <a:latin typeface="Helvetica Neue"/>
+                <a:cs typeface="Helvetica" panose="020B0604020202020204" pitchFamily="34" charset="0"/>
+              </a:rPr>
+              <a:t>	</a:t>
             </a:r>
             <a:r>
               <a:rPr lang="en-US" sz="3600" dirty="0" smtClean="0">
@@ -2257,7 +2428,7 @@
               <a:defRPr sz="2550"/>
             </a:pPr>
             <a:r>
-              <a:rPr lang="en-US" sz="3200" dirty="0" err="1" smtClean="0">
+              <a:rPr lang="en-US" sz="3200" b="1" i="1" dirty="0" err="1" smtClean="0">
                 <a:latin typeface="Helvetica Neue"/>
                 <a:cs typeface="Helvetica" panose="020B0604020202020204" pitchFamily="34" charset="0"/>
               </a:rPr>
@@ -2268,14 +2439,7 @@
                 <a:latin typeface="Helvetica Neue"/>
                 <a:cs typeface="Helvetica" panose="020B0604020202020204" pitchFamily="34" charset="0"/>
               </a:rPr>
-              <a:t>: tracing + impairment </a:t>
-            </a:r>
-            <a:r>
-              <a:rPr lang="en-US" sz="3200" dirty="0" smtClean="0">
-                <a:latin typeface="Helvetica Neue"/>
-                <a:cs typeface="Helvetica" panose="020B0604020202020204" pitchFamily="34" charset="0"/>
-              </a:rPr>
-              <a:t>analysis</a:t>
+              <a:t>: tracing + impairment analysis</a:t>
             </a:r>
           </a:p>
           <a:p>
@@ -2286,16 +2450,19 @@
               <a:defRPr sz="2550"/>
             </a:pPr>
             <a:r>
+              <a:rPr lang="en-US" sz="3200" b="1" i="1" dirty="0" smtClean="0">
+                <a:latin typeface="Helvetica Neue"/>
+                <a:cs typeface="Helvetica" panose="020B0604020202020204" pitchFamily="34" charset="0"/>
+              </a:rPr>
+              <a:t>Copycat</a:t>
+            </a:r>
+            <a:r>
               <a:rPr lang="en-US" sz="3200" dirty="0" smtClean="0">
                 <a:latin typeface="Helvetica Neue"/>
                 <a:cs typeface="Helvetica" panose="020B0604020202020204" pitchFamily="34" charset="0"/>
               </a:rPr>
-              <a:t>Copycat: TCP/UDP differential on-path treatment </a:t>
-            </a:r>
-            <a:endParaRPr lang="en-US" sz="3200" dirty="0" smtClean="0">
-              <a:latin typeface="Helvetica Neue"/>
-              <a:cs typeface="Helvetica" panose="020B0604020202020204" pitchFamily="34" charset="0"/>
-            </a:endParaRPr>
+              <a:t>: TCP/UDP differential on-path treatment </a:t>
+            </a:r>
           </a:p>
           <a:p>
             <a:pPr marL="652462" lvl="1" indent="-381000" defTabSz="971550">
@@ -2305,7 +2472,7 @@
               <a:defRPr sz="2550"/>
             </a:pPr>
             <a:r>
-              <a:rPr lang="en-US" sz="3200" dirty="0" err="1" smtClean="0">
+              <a:rPr lang="en-US" sz="3200" b="1" i="1" dirty="0" err="1" smtClean="0">
                 <a:latin typeface="Helvetica Neue"/>
                 <a:cs typeface="Helvetica" panose="020B0604020202020204" pitchFamily="34" charset="0"/>
               </a:rPr>
@@ -2316,21 +2483,7 @@
                 <a:latin typeface="Helvetica Neue"/>
                 <a:cs typeface="Helvetica" panose="020B0604020202020204" pitchFamily="34" charset="0"/>
               </a:rPr>
-              <a:t>: A/B testing </a:t>
-            </a:r>
-            <a:r>
-              <a:rPr lang="en-US" sz="3200" dirty="0" smtClean="0">
-                <a:latin typeface="Helvetica Neue"/>
-                <a:cs typeface="Helvetica" panose="020B0604020202020204" pitchFamily="34" charset="0"/>
-              </a:rPr>
-              <a:t>(</a:t>
-            </a:r>
-            <a:r>
-              <a:rPr lang="en-US" sz="3200" dirty="0" smtClean="0">
-                <a:latin typeface="Helvetica Neue"/>
-                <a:cs typeface="Helvetica" panose="020B0604020202020204" pitchFamily="34" charset="0"/>
-              </a:rPr>
-              <a:t>currently on ECN support</a:t>
+              <a:t>: A/B testing (currently on ECN support</a:t>
             </a:r>
             <a:r>
               <a:rPr lang="en-US" sz="3200" dirty="0" smtClean="0">
@@ -2347,18 +2500,385 @@
               </a:spcBef>
               <a:defRPr sz="2550"/>
             </a:pPr>
+            <a:endParaRPr lang="de-DE" sz="2800" dirty="0">
+              <a:latin typeface="Helvetica Neue"/>
+              <a:cs typeface="Helvetica" panose="020B0604020202020204" pitchFamily="34" charset="0"/>
+            </a:endParaRPr>
+          </a:p>
+          <a:p>
+            <a:pPr marL="0" indent="0" defTabSz="971550">
+              <a:spcBef>
+                <a:spcPts val="500"/>
+              </a:spcBef>
+              <a:buSzPct val="100000"/>
+              <a:buNone/>
+              <a:defRPr sz="2550"/>
+            </a:pPr>
+            <a:r>
+              <a:rPr lang="en-US" sz="3600" b="1" dirty="0">
+                <a:latin typeface="Helvetica Neue"/>
+                <a:cs typeface="Helvetica" panose="020B0604020202020204" pitchFamily="34" charset="0"/>
+              </a:rPr>
+              <a:t>Path Transparency Observatory</a:t>
+            </a:r>
+          </a:p>
+          <a:p>
+            <a:pPr marL="728662" lvl="1" indent="-457200" defTabSz="971550">
+              <a:spcBef>
+                <a:spcPts val="500"/>
+              </a:spcBef>
+              <a:buFont typeface="Arial" charset="0"/>
+              <a:buChar char="•"/>
+              <a:defRPr sz="2550"/>
+            </a:pPr>
+            <a:r>
+              <a:rPr lang="en-US" sz="3200" dirty="0">
+                <a:latin typeface="Helvetica Neue"/>
+                <a:cs typeface="Helvetica" panose="020B0604020202020204" pitchFamily="34" charset="0"/>
+              </a:rPr>
+              <a:t>Active measurements by the project + external measurements</a:t>
+            </a:r>
+          </a:p>
+          <a:p>
+            <a:pPr marL="728662" lvl="1" indent="-457200" defTabSz="971550">
+              <a:spcBef>
+                <a:spcPts val="500"/>
+              </a:spcBef>
+              <a:buFont typeface="Arial" charset="0"/>
+              <a:buChar char="•"/>
+              <a:defRPr sz="2550"/>
+            </a:pPr>
+            <a:r>
+              <a:rPr lang="en-US" sz="3200" dirty="0">
+                <a:latin typeface="Helvetica Neue"/>
+                <a:cs typeface="Helvetica" panose="020B0604020202020204" pitchFamily="34" charset="0"/>
+              </a:rPr>
+              <a:t>Public query interface </a:t>
+            </a:r>
+            <a:r>
+              <a:rPr lang="en-US" sz="3200" dirty="0" smtClean="0">
+                <a:latin typeface="Helvetica Neue"/>
+                <a:cs typeface="Helvetica" panose="020B0604020202020204" pitchFamily="34" charset="0"/>
+              </a:rPr>
+              <a:t>(end 2016) to </a:t>
+            </a:r>
+            <a:r>
+              <a:rPr lang="en-US" sz="3200" dirty="0">
+                <a:latin typeface="Helvetica Neue"/>
+                <a:cs typeface="Helvetica" panose="020B0604020202020204" pitchFamily="34" charset="0"/>
+              </a:rPr>
+              <a:t>access </a:t>
+            </a:r>
+            <a:r>
+              <a:rPr lang="en-US" sz="3200" dirty="0" smtClean="0">
+                <a:latin typeface="Helvetica Neue"/>
+                <a:cs typeface="Helvetica" panose="020B0604020202020204" pitchFamily="34" charset="0"/>
+              </a:rPr>
+              <a:t>path </a:t>
+            </a:r>
+            <a:r>
+              <a:rPr lang="en-US" sz="3200" dirty="0">
+                <a:latin typeface="Helvetica Neue"/>
+                <a:cs typeface="Helvetica" panose="020B0604020202020204" pitchFamily="34" charset="0"/>
+              </a:rPr>
+              <a:t>impairment data</a:t>
+            </a:r>
+            <a:r>
+              <a:rPr lang="en-US" sz="3200" dirty="0" smtClean="0">
+                <a:latin typeface="Helvetica Neue"/>
+                <a:cs typeface="Helvetica" panose="020B0604020202020204" pitchFamily="34" charset="0"/>
+              </a:rPr>
+              <a:t>:</a:t>
+            </a:r>
+          </a:p>
+          <a:p>
+            <a:pPr marL="977900" lvl="1" indent="0" defTabSz="971550">
+              <a:spcBef>
+                <a:spcPts val="500"/>
+              </a:spcBef>
+              <a:buNone/>
+              <a:defRPr sz="2550"/>
+            </a:pPr>
+            <a:r>
+              <a:rPr lang="en-US" sz="3200" i="1" dirty="0">
+                <a:latin typeface="Helvetica Neue"/>
+                <a:cs typeface="Helvetica" panose="020B0604020202020204" pitchFamily="34" charset="0"/>
+              </a:rPr>
+              <a:t>What is the likelihood that a certain path impairment impacts my traffic</a:t>
+            </a:r>
+            <a:r>
+              <a:rPr lang="en-US" sz="3200" dirty="0">
+                <a:latin typeface="Helvetica Neue"/>
+                <a:cs typeface="Helvetica" panose="020B0604020202020204" pitchFamily="34" charset="0"/>
+              </a:rPr>
+              <a:t> (modifications/stripping/dropping/blocking)?</a:t>
+            </a:r>
+          </a:p>
+          <a:p>
+            <a:pPr marL="728662" lvl="1" indent="-457200" defTabSz="971550">
+              <a:spcBef>
+                <a:spcPts val="500"/>
+              </a:spcBef>
+              <a:buFont typeface="Arial" charset="0"/>
+              <a:buChar char="•"/>
+              <a:defRPr sz="2550"/>
+            </a:pPr>
+            <a:endParaRPr lang="de-DE" sz="3200" dirty="0" smtClean="0">
+              <a:latin typeface="Helvetica Neue"/>
+              <a:cs typeface="Helvetica" panose="020B0604020202020204" pitchFamily="34" charset="0"/>
+            </a:endParaRPr>
+          </a:p>
+          <a:p>
+            <a:pPr marL="728662" lvl="1" indent="-457200" defTabSz="971550">
+              <a:spcBef>
+                <a:spcPts val="500"/>
+              </a:spcBef>
+              <a:buFont typeface="Arial" charset="0"/>
+              <a:buChar char="•"/>
+              <a:defRPr sz="2550"/>
+            </a:pPr>
+            <a:endParaRPr lang="de-DE" sz="3200" dirty="0">
+              <a:latin typeface="Helvetica Neue"/>
+              <a:cs typeface="Helvetica" panose="020B0604020202020204" pitchFamily="34" charset="0"/>
+            </a:endParaRPr>
+          </a:p>
+          <a:p>
+            <a:pPr marL="728662" lvl="1" indent="-457200" defTabSz="971550">
+              <a:spcBef>
+                <a:spcPts val="500"/>
+              </a:spcBef>
+              <a:buFont typeface="Arial" charset="0"/>
+              <a:buChar char="•"/>
+              <a:defRPr sz="2550"/>
+            </a:pPr>
+            <a:endParaRPr lang="de-DE" sz="3200" dirty="0" smtClean="0">
+              <a:latin typeface="Helvetica Neue"/>
+              <a:cs typeface="Helvetica" panose="020B0604020202020204" pitchFamily="34" charset="0"/>
+            </a:endParaRPr>
+          </a:p>
+          <a:p>
+            <a:pPr marL="728662" lvl="1" indent="-457200" defTabSz="971550">
+              <a:spcBef>
+                <a:spcPts val="500"/>
+              </a:spcBef>
+              <a:buFont typeface="Arial" charset="0"/>
+              <a:buChar char="•"/>
+              <a:defRPr sz="2550"/>
+            </a:pPr>
+            <a:endParaRPr lang="de-DE" sz="3200" dirty="0">
+              <a:latin typeface="Helvetica Neue"/>
+              <a:cs typeface="Helvetica" panose="020B0604020202020204" pitchFamily="34" charset="0"/>
+            </a:endParaRPr>
+          </a:p>
+          <a:p>
+            <a:pPr marL="728662" lvl="1" indent="-457200" defTabSz="971550">
+              <a:spcBef>
+                <a:spcPts val="500"/>
+              </a:spcBef>
+              <a:buFont typeface="Arial" charset="0"/>
+              <a:buChar char="•"/>
+              <a:defRPr sz="2550"/>
+            </a:pPr>
+            <a:endParaRPr lang="de-DE" sz="3200" dirty="0" smtClean="0">
+              <a:latin typeface="Helvetica Neue"/>
+              <a:cs typeface="Helvetica" panose="020B0604020202020204" pitchFamily="34" charset="0"/>
+            </a:endParaRPr>
+          </a:p>
+          <a:p>
+            <a:pPr marL="728662" lvl="1" indent="-457200" defTabSz="971550">
+              <a:spcBef>
+                <a:spcPts val="500"/>
+              </a:spcBef>
+              <a:buFont typeface="Arial" charset="0"/>
+              <a:buChar char="•"/>
+              <a:defRPr sz="2550"/>
+            </a:pPr>
+            <a:endParaRPr lang="de-DE" sz="3200" dirty="0">
+              <a:latin typeface="Helvetica Neue"/>
+              <a:cs typeface="Helvetica" panose="020B0604020202020204" pitchFamily="34" charset="0"/>
+            </a:endParaRPr>
+          </a:p>
+          <a:p>
+            <a:pPr marL="271462" lvl="1" indent="0" defTabSz="971550">
+              <a:spcBef>
+                <a:spcPts val="500"/>
+              </a:spcBef>
+              <a:buNone/>
+              <a:defRPr sz="2550"/>
+            </a:pPr>
+            <a:endParaRPr lang="de-DE" sz="3200" dirty="0" smtClean="0">
+              <a:latin typeface="Helvetica Neue"/>
+              <a:cs typeface="Helvetica" panose="020B0604020202020204" pitchFamily="34" charset="0"/>
+            </a:endParaRPr>
+          </a:p>
+          <a:p>
+            <a:pPr marL="271462" lvl="1" indent="0" defTabSz="971550">
+              <a:spcBef>
+                <a:spcPts val="500"/>
+              </a:spcBef>
+              <a:buNone/>
+              <a:defRPr sz="2550"/>
+            </a:pPr>
             <a:endParaRPr lang="en-US" sz="3200" dirty="0" smtClean="0">
               <a:latin typeface="Helvetica Neue"/>
               <a:cs typeface="Helvetica" panose="020B0604020202020204" pitchFamily="34" charset="0"/>
             </a:endParaRPr>
           </a:p>
           <a:p>
-            <a:pPr marL="652462" lvl="1" indent="-381000" defTabSz="971550">
+            <a:pPr marL="728662" lvl="1" indent="-457200" defTabSz="971550">
               <a:spcBef>
                 <a:spcPts val="500"/>
               </a:spcBef>
+              <a:buFont typeface="Arial" charset="0"/>
+              <a:buChar char="•"/>
               <a:defRPr sz="2550"/>
             </a:pPr>
+            <a:r>
+              <a:rPr lang="de-DE" sz="3200" dirty="0" smtClean="0">
+                <a:latin typeface="Helvetica Neue"/>
+                <a:cs typeface="Helvetica" panose="020B0604020202020204" pitchFamily="34" charset="0"/>
+              </a:rPr>
+              <a:t>Common </a:t>
+            </a:r>
+            <a:r>
+              <a:rPr lang="en-US" sz="3200" dirty="0">
+                <a:latin typeface="Helvetica Neue"/>
+                <a:cs typeface="Helvetica" panose="020B0604020202020204" pitchFamily="34" charset="0"/>
+              </a:rPr>
+              <a:t>data model for all </a:t>
+            </a:r>
+            <a:r>
+              <a:rPr lang="en-US" sz="3200" i="1" dirty="0">
+                <a:latin typeface="Helvetica Neue"/>
+                <a:cs typeface="Helvetica" panose="020B0604020202020204" pitchFamily="34" charset="0"/>
+              </a:rPr>
+              <a:t>observations</a:t>
+            </a:r>
+            <a:r>
+              <a:rPr lang="en-US" sz="3200" dirty="0">
+                <a:latin typeface="Helvetica Neue"/>
+                <a:cs typeface="Helvetica" panose="020B0604020202020204" pitchFamily="34" charset="0"/>
+              </a:rPr>
+              <a:t> of path </a:t>
+            </a:r>
+            <a:r>
+              <a:rPr lang="en-US" sz="3200" dirty="0" smtClean="0">
+                <a:latin typeface="Helvetica Neue"/>
+                <a:cs typeface="Helvetica" panose="020B0604020202020204" pitchFamily="34" charset="0"/>
+              </a:rPr>
+              <a:t>conditions</a:t>
+            </a:r>
+          </a:p>
+          <a:p>
+            <a:pPr marL="1260475" lvl="1" indent="-441325" defTabSz="971550">
+              <a:spcBef>
+                <a:spcPts val="500"/>
+              </a:spcBef>
+              <a:buFont typeface="Arial" charset="0"/>
+              <a:buChar char="•"/>
+              <a:defRPr sz="2550"/>
+            </a:pPr>
+            <a:r>
+              <a:rPr lang="en-US" sz="3200" b="1" i="1" dirty="0" smtClean="0">
+                <a:latin typeface="Helvetica Neue"/>
+                <a:cs typeface="Helvetica" panose="020B0604020202020204" pitchFamily="34" charset="0"/>
+              </a:rPr>
+              <a:t>t</a:t>
+            </a:r>
+            <a:r>
+              <a:rPr lang="en-US" sz="3200" dirty="0" smtClean="0">
+                <a:latin typeface="Helvetica Neue"/>
+                <a:cs typeface="Helvetica" panose="020B0604020202020204" pitchFamily="34" charset="0"/>
+              </a:rPr>
+              <a:t>: time of observation</a:t>
+            </a:r>
+          </a:p>
+          <a:p>
+            <a:pPr marL="1260475" lvl="1" indent="-441325" defTabSz="971550">
+              <a:spcBef>
+                <a:spcPts val="500"/>
+              </a:spcBef>
+              <a:buFont typeface="Arial" charset="0"/>
+              <a:buChar char="•"/>
+              <a:defRPr sz="2550"/>
+            </a:pPr>
+            <a:r>
+              <a:rPr lang="en-US" sz="3200" b="1" i="1" dirty="0" smtClean="0">
+                <a:latin typeface="Helvetica Neue"/>
+                <a:cs typeface="Helvetica" panose="020B0604020202020204" pitchFamily="34" charset="0"/>
+              </a:rPr>
+              <a:t>p</a:t>
+            </a:r>
+            <a:r>
+              <a:rPr lang="en-US" sz="3200" dirty="0" smtClean="0">
+                <a:latin typeface="Helvetica Neue"/>
+                <a:cs typeface="Helvetica" panose="020B0604020202020204" pitchFamily="34" charset="0"/>
+              </a:rPr>
+              <a:t>: path to which observation applies</a:t>
+            </a:r>
+          </a:p>
+          <a:p>
+            <a:pPr marL="1260475" lvl="1" indent="-441325" defTabSz="971550">
+              <a:spcBef>
+                <a:spcPts val="500"/>
+              </a:spcBef>
+              <a:buFont typeface="Arial" charset="0"/>
+              <a:buChar char="•"/>
+              <a:defRPr sz="2550"/>
+            </a:pPr>
+            <a:r>
+              <a:rPr lang="en-US" sz="3200" b="1" i="1" dirty="0" smtClean="0">
+                <a:latin typeface="Helvetica Neue"/>
+                <a:cs typeface="Helvetica" panose="020B0604020202020204" pitchFamily="34" charset="0"/>
+              </a:rPr>
+              <a:t>c</a:t>
+            </a:r>
+            <a:r>
+              <a:rPr lang="en-US" sz="3200" dirty="0" smtClean="0">
+                <a:latin typeface="Helvetica Neue"/>
+                <a:cs typeface="Helvetica" panose="020B0604020202020204" pitchFamily="34" charset="0"/>
+              </a:rPr>
+              <a:t>: condition observed, e.g. “feature X </a:t>
+            </a:r>
+            <a:r>
+              <a:rPr lang="en-US" sz="3200" dirty="0" smtClean="0">
+                <a:latin typeface="Helvetica Neue"/>
+                <a:cs typeface="Helvetica" panose="020B0604020202020204" pitchFamily="34" charset="0"/>
+                <a:sym typeface="Wingdings"/>
+              </a:rPr>
+              <a:t> </a:t>
+            </a:r>
+            <a:r>
+              <a:rPr lang="en-US" sz="3200" dirty="0" smtClean="0">
+                <a:latin typeface="Helvetica Neue"/>
+                <a:cs typeface="Helvetica" panose="020B0604020202020204" pitchFamily="34" charset="0"/>
+              </a:rPr>
+              <a:t>packet loss”</a:t>
+            </a:r>
+          </a:p>
+          <a:p>
+            <a:pPr marL="1260475" lvl="1" indent="-441325" defTabSz="971550">
+              <a:spcBef>
+                <a:spcPts val="500"/>
+              </a:spcBef>
+              <a:buFont typeface="Arial" charset="0"/>
+              <a:buChar char="•"/>
+              <a:defRPr sz="2550"/>
+            </a:pPr>
+            <a:r>
+              <a:rPr lang="en-US" sz="3200" b="1" i="1" dirty="0" smtClean="0">
+                <a:latin typeface="Helvetica Neue"/>
+                <a:cs typeface="Helvetica" panose="020B0604020202020204" pitchFamily="34" charset="0"/>
+              </a:rPr>
+              <a:t>v</a:t>
+            </a:r>
+            <a:r>
+              <a:rPr lang="en-US" sz="3200" dirty="0" smtClean="0">
+                <a:latin typeface="Helvetica Neue"/>
+                <a:cs typeface="Helvetica" panose="020B0604020202020204" pitchFamily="34" charset="0"/>
+              </a:rPr>
+              <a:t>: vector of condition-specific values</a:t>
+            </a:r>
             <a:endParaRPr lang="en-US" sz="1200" dirty="0" smtClean="0">
               <a:latin typeface="Helvetica Neue"/>
               <a:cs typeface="Helvetica" panose="020B0604020202020204" pitchFamily="34" charset="0"/>
@@ -2374,24 +2894,22 @@
         </p:nvSpPr>
         <p:spPr>
           <a:xfrm>
-            <a:off x="16451031" y="16878971"/>
-            <a:ext cx="13004021" cy="10064294"/>
+            <a:off x="15882082" y="15097294"/>
+            <a:ext cx="13320000" cy="10125849"/>
           </a:xfrm>
           <a:prstGeom prst="rect">
             <a:avLst/>
           </a:prstGeom>
         </p:spPr>
         <p:txBody>
-          <a:bodyPr wrap="square">
+          <a:bodyPr wrap="square" lIns="450000" rIns="450000">
             <a:spAutoFit/>
           </a:bodyPr>
           <a:lstStyle/>
           <a:p>
-            <a:pPr marL="571500" indent="-571500">
+            <a:pPr>
               <a:buClrTx/>
               <a:buSzPct val="100000"/>
-              <a:buFont typeface="Arial" charset="0"/>
-              <a:buChar char="•"/>
               <a:defRPr b="1"/>
             </a:pPr>
             <a:r>
@@ -2473,18 +2991,25 @@
               <a:t>Implements a </a:t>
             </a:r>
             <a:r>
-              <a:rPr lang="en-US" sz="3200" i="1" dirty="0" smtClean="0">
+              <a:rPr lang="en-US" sz="3200" b="1" i="1" dirty="0" smtClean="0">
                 <a:latin typeface="Helvetica" panose="020B0604020202020204" pitchFamily="34" charset="0"/>
                 <a:cs typeface="Helvetica" panose="020B0604020202020204" pitchFamily="34" charset="0"/>
               </a:rPr>
               <a:t>path layer</a:t>
             </a:r>
             <a:r>
+              <a:rPr lang="en-US" sz="3200" b="1" dirty="0" smtClean="0">
+                <a:latin typeface="Helvetica" panose="020B0604020202020204" pitchFamily="34" charset="0"/>
+                <a:cs typeface="Helvetica" panose="020B0604020202020204" pitchFamily="34" charset="0"/>
+              </a:rPr>
+              <a:t> </a:t>
+            </a:r>
+            <a:r>
               <a:rPr lang="en-US" sz="3200" dirty="0" smtClean="0">
                 <a:latin typeface="Helvetica" panose="020B0604020202020204" pitchFamily="34" charset="0"/>
                 <a:cs typeface="Helvetica" panose="020B0604020202020204" pitchFamily="34" charset="0"/>
               </a:rPr>
-              <a:t> within</a:t>
+              <a:t>within</a:t>
             </a:r>
             <a:br>
               <a:rPr lang="en-US" sz="3200" dirty="0" smtClean="0">
@@ -2497,41 +3022,45 @@
                 <a:latin typeface="Helvetica" panose="020B0604020202020204" pitchFamily="34" charset="0"/>
                 <a:cs typeface="Helvetica" panose="020B0604020202020204" pitchFamily="34" charset="0"/>
               </a:rPr>
-              <a:t>the Internet architecture</a:t>
-            </a:r>
-            <a:endParaRPr lang="de-DE" sz="3200" dirty="0" smtClean="0">
+              <a:t>the Internet </a:t>
+            </a:r>
+            <a:r>
+              <a:rPr lang="en-US" sz="3200" dirty="0" smtClean="0">
+                <a:latin typeface="Helvetica" panose="020B0604020202020204" pitchFamily="34" charset="0"/>
+                <a:cs typeface="Helvetica" panose="020B0604020202020204" pitchFamily="34" charset="0"/>
+              </a:rPr>
+              <a:t>architecture</a:t>
+            </a:r>
+          </a:p>
+          <a:p>
+            <a:pPr marL="722313" lvl="1" indent="-360363">
+              <a:buFont typeface="Arial" panose="020B0604020202020204" pitchFamily="34" charset="0"/>
+              <a:buChar char="•"/>
+            </a:pPr>
+            <a:endParaRPr lang="en-US" sz="2800" dirty="0">
               <a:latin typeface="Helvetica" panose="020B0604020202020204" pitchFamily="34" charset="0"/>
               <a:cs typeface="Helvetica" panose="020B0604020202020204" pitchFamily="34" charset="0"/>
             </a:endParaRPr>
           </a:p>
           <a:p>
-            <a:pPr marL="361950" lvl="1"/>
-            <a:endParaRPr lang="en-US" sz="1200" dirty="0" smtClean="0">
-              <a:latin typeface="Helvetica" panose="020B0604020202020204" pitchFamily="34" charset="0"/>
-              <a:cs typeface="Helvetica" panose="020B0604020202020204" pitchFamily="34" charset="0"/>
-            </a:endParaRPr>
-          </a:p>
-          <a:p>
-            <a:pPr marL="722313" lvl="1" indent="-360363"/>
-            <a:endParaRPr lang="en-US" sz="1200" dirty="0">
-              <a:latin typeface="Helvetica" panose="020B0604020202020204" pitchFamily="34" charset="0"/>
-              <a:cs typeface="Helvetica" panose="020B0604020202020204" pitchFamily="34" charset="0"/>
-            </a:endParaRPr>
-          </a:p>
-          <a:p>
-            <a:pPr marL="571500" indent="-571500">
+            <a:pPr>
               <a:buClrTx/>
               <a:buSzPct val="100000"/>
-              <a:buFont typeface="Arial" charset="0"/>
-              <a:buChar char="•"/>
               <a:defRPr b="1"/>
             </a:pPr>
             <a:r>
+              <a:rPr lang="en-US" sz="3600" dirty="0" smtClean="0">
+                <a:latin typeface="Helvetica" panose="020B0604020202020204" pitchFamily="34" charset="0"/>
+                <a:cs typeface="Helvetica" panose="020B0604020202020204" pitchFamily="34" charset="0"/>
+              </a:rPr>
+              <a:t>Flexible </a:t>
+            </a:r>
+            <a:r>
               <a:rPr lang="en-US" sz="3600" dirty="0">
                 <a:latin typeface="Helvetica" panose="020B0604020202020204" pitchFamily="34" charset="0"/>
                 <a:cs typeface="Helvetica" panose="020B0604020202020204" pitchFamily="34" charset="0"/>
               </a:rPr>
-              <a:t>Flexible Transport Layer (FTL)</a:t>
+              <a:t>Transport Layer (FTL)</a:t>
             </a:r>
           </a:p>
           <a:p>
@@ -2716,7 +3245,14 @@
                 <a:latin typeface="Helvetica" panose="020B0604020202020204" pitchFamily="34" charset="0"/>
                 <a:cs typeface="Helvetica" panose="020B0604020202020204" pitchFamily="34" charset="0"/>
               </a:rPr>
-              <a:t>path as a first-order concept</a:t>
+              <a:t>path as a first-order </a:t>
+            </a:r>
+            <a:r>
+              <a:rPr lang="en-US" sz="3200" dirty="0" smtClean="0">
+                <a:latin typeface="Helvetica" panose="020B0604020202020204" pitchFamily="34" charset="0"/>
+                <a:cs typeface="Helvetica" panose="020B0604020202020204" pitchFamily="34" charset="0"/>
+              </a:rPr>
+              <a:t>concept</a:t>
             </a:r>
             <a:endParaRPr lang="en-US" sz="3200" dirty="0">
               <a:latin typeface="Helvetica" panose="020B0604020202020204" pitchFamily="34" charset="0"/>
@@ -2724,46 +3260,47 @@
             </a:endParaRPr>
           </a:p>
           <a:p>
-            <a:pPr marL="457200" indent="-457200">
-              <a:buFont typeface="Arial" charset="0"/>
+            <a:pPr marL="722313" lvl="1" indent="-360363">
+              <a:buFont typeface="Arial" panose="020B0604020202020204" pitchFamily="34" charset="0"/>
               <a:buChar char="•"/>
             </a:pPr>
+            <a:endParaRPr lang="en-US" sz="2800" b="1" dirty="0" smtClean="0">
+              <a:latin typeface="Helvetica" panose="020B0604020202020204" pitchFamily="34" charset="0"/>
+              <a:cs typeface="Helvetica" panose="020B0604020202020204" pitchFamily="34" charset="0"/>
+            </a:endParaRPr>
+          </a:p>
+          <a:p>
+            <a:r>
+              <a:rPr lang="en-US" sz="3600" b="1" dirty="0" smtClean="0">
+                <a:latin typeface="Helvetica" panose="020B0604020202020204" pitchFamily="34" charset="0"/>
+                <a:cs typeface="Helvetica" panose="020B0604020202020204" pitchFamily="34" charset="0"/>
+              </a:rPr>
+              <a:t>Focus on standardization activities </a:t>
+            </a:r>
             <a:endParaRPr lang="en-US" sz="3600" b="1" dirty="0" smtClean="0">
               <a:latin typeface="Helvetica" panose="020B0604020202020204" pitchFamily="34" charset="0"/>
               <a:cs typeface="Helvetica" panose="020B0604020202020204" pitchFamily="34" charset="0"/>
             </a:endParaRPr>
           </a:p>
           <a:p>
-            <a:pPr marL="457200" indent="-457200">
-              <a:buFont typeface="Arial" charset="0"/>
-              <a:buChar char="•"/>
-            </a:pPr>
-            <a:r>
-              <a:rPr lang="en-US" sz="3600" b="1" dirty="0" smtClean="0">
-                <a:latin typeface="Helvetica" panose="020B0604020202020204" pitchFamily="34" charset="0"/>
-                <a:cs typeface="Helvetica" panose="020B0604020202020204" pitchFamily="34" charset="0"/>
-              </a:rPr>
-              <a:t>Focus on standardization activities </a:t>
-            </a:r>
-            <a:r>
-              <a:rPr lang="en-US" sz="3600" b="1" dirty="0">
-                <a:latin typeface="Helvetica" panose="020B0604020202020204" pitchFamily="34" charset="0"/>
-                <a:cs typeface="Helvetica" panose="020B0604020202020204" pitchFamily="34" charset="0"/>
-              </a:rPr>
-              <a:t/>
-            </a:r>
-            <a:br>
-              <a:rPr lang="en-US" sz="3600" b="1" dirty="0">
-                <a:latin typeface="Helvetica" panose="020B0604020202020204" pitchFamily="34" charset="0"/>
-                <a:cs typeface="Helvetica" panose="020B0604020202020204" pitchFamily="34" charset="0"/>
-              </a:rPr>
-            </a:br>
+            <a:pPr marL="725488" lvl="1">
+              <a:tabLst>
+                <a:tab pos="725488" algn="l"/>
+              </a:tabLst>
+            </a:pPr>
             <a:r>
               <a:rPr lang="en-US" sz="3200" dirty="0" smtClean="0">
                 <a:latin typeface="Helvetica" panose="020B0604020202020204" pitchFamily="34" charset="0"/>
                 <a:cs typeface="Helvetica" panose="020B0604020202020204" pitchFamily="34" charset="0"/>
               </a:rPr>
-              <a:t>for coordination with industry and transition to practice</a:t>
+              <a:t>for </a:t>
+            </a:r>
+            <a:r>
+              <a:rPr lang="en-US" sz="3200" dirty="0" smtClean="0">
+                <a:latin typeface="Helvetica" panose="020B0604020202020204" pitchFamily="34" charset="0"/>
+                <a:cs typeface="Helvetica" panose="020B0604020202020204" pitchFamily="34" charset="0"/>
+              </a:rPr>
+              <a:t>coordination with industry and transition to practice</a:t>
             </a:r>
             <a:br>
               <a:rPr lang="en-US" sz="3200" dirty="0" smtClean="0">
@@ -2789,7 +3326,7 @@
         </p:nvGrpSpPr>
         <p:grpSpPr>
           <a:xfrm>
-            <a:off x="23962081" y="18248900"/>
+            <a:off x="23740033" y="17005815"/>
             <a:ext cx="4445001" cy="4495801"/>
             <a:chOff x="24032062" y="17402662"/>
             <a:chExt cx="4445001" cy="4495801"/>
@@ -2949,7 +3486,7 @@
         </p:nvSpPr>
         <p:spPr>
           <a:xfrm rot="20869430">
-            <a:off x="23810500" y="22337733"/>
+            <a:off x="23588452" y="21094648"/>
             <a:ext cx="5129161" cy="1395254"/>
           </a:xfrm>
           <a:prstGeom prst="rect">
@@ -2968,7 +3505,7 @@
           </a:effectLst>
           <a:extLst>
             <a:ext uri="{C572A759-6A51-4108-AA02-DFA0A04FC94B}">
-              <ma14:wrappingTextBoxFlag xmlns:ma14="http://schemas.microsoft.com/office/mac/drawingml/2011/main" val="1"/>
+              <ma14:wrappingTextBoxFlag xmlns:ma14="http://schemas.microsoft.com/office/mac/drawingml/2011/main" xmlns="" val="1"/>
             </a:ext>
           </a:extLst>
         </p:spPr>
@@ -3060,8 +3597,8 @@
         </p:nvSpPr>
         <p:spPr>
           <a:xfrm>
-            <a:off x="16094988" y="31329793"/>
-            <a:ext cx="12770489" cy="5078313"/>
+            <a:off x="15882082" y="29702030"/>
+            <a:ext cx="13319999" cy="6678751"/>
           </a:xfrm>
           <a:prstGeom prst="rect">
             <a:avLst/>
@@ -3069,55 +3606,161 @@
           <a:noFill/>
         </p:spPr>
         <p:txBody>
-          <a:bodyPr wrap="square" rtlCol="0">
+          <a:bodyPr wrap="square" lIns="450000" rIns="450000" rtlCol="0">
             <a:spAutoFit/>
           </a:bodyPr>
           <a:lstStyle/>
           <a:p>
+            <a:r>
+              <a:rPr lang="en-US" sz="3600" b="1" dirty="0" smtClean="0">
+                <a:latin typeface="Helvetica Neue"/>
+                <a:cs typeface="Helvetica" panose="020B0604020202020204" pitchFamily="34" charset="0"/>
+              </a:rPr>
+              <a:t>Implementation and  </a:t>
+            </a:r>
+            <a:r>
+              <a:rPr lang="en-US" sz="3600" b="1" dirty="0" smtClean="0">
+                <a:latin typeface="Helvetica Neue"/>
+                <a:cs typeface="Helvetica" panose="020B0604020202020204" pitchFamily="34" charset="0"/>
+              </a:rPr>
+              <a:t>testing of </a:t>
+            </a:r>
+            <a:r>
+              <a:rPr lang="en-US" sz="3600" b="1" dirty="0" smtClean="0">
+                <a:latin typeface="Helvetica Neue"/>
+                <a:cs typeface="Helvetica" panose="020B0604020202020204" pitchFamily="34" charset="0"/>
+              </a:rPr>
+              <a:t>MCP/TLF software</a:t>
+            </a:r>
+          </a:p>
+          <a:p>
+            <a:pPr marL="725488" lvl="1" indent="-379413">
+              <a:buFont typeface="Arial" panose="020B0604020202020204" pitchFamily="34" charset="0"/>
+              <a:buChar char="•"/>
+            </a:pPr>
+            <a:r>
+              <a:rPr lang="en-US" sz="3200" dirty="0">
+                <a:latin typeface="Helvetica Neue"/>
+                <a:cs typeface="Helvetica" panose="020B0604020202020204" pitchFamily="34" charset="0"/>
+              </a:rPr>
+              <a:t>Testing applicability of MCP in the Internet</a:t>
+            </a:r>
+          </a:p>
+          <a:p>
+            <a:pPr marL="725488" lvl="1" indent="-379413">
+              <a:buFont typeface="Arial" panose="020B0604020202020204" pitchFamily="34" charset="0"/>
+              <a:buChar char="•"/>
+            </a:pPr>
+            <a:r>
+              <a:rPr lang="en-US" sz="3200" dirty="0">
+                <a:latin typeface="Helvetica Neue"/>
+                <a:cs typeface="Helvetica" panose="020B0604020202020204" pitchFamily="34" charset="0"/>
+              </a:rPr>
+              <a:t>Functional testing of </a:t>
+            </a:r>
+            <a:r>
+              <a:rPr lang="en-US" sz="3200" dirty="0" err="1">
+                <a:latin typeface="Helvetica Neue"/>
+                <a:cs typeface="Helvetica" panose="020B0604020202020204" pitchFamily="34" charset="0"/>
+              </a:rPr>
+              <a:t>middlebox</a:t>
+            </a:r>
+            <a:r>
+              <a:rPr lang="en-US" sz="3200" dirty="0">
+                <a:latin typeface="Helvetica Neue"/>
+                <a:cs typeface="Helvetica" panose="020B0604020202020204" pitchFamily="34" charset="0"/>
+              </a:rPr>
+              <a:t> </a:t>
+            </a:r>
+            <a:r>
+              <a:rPr lang="en-US" sz="3200" dirty="0" smtClean="0">
+                <a:latin typeface="Helvetica Neue"/>
+                <a:cs typeface="Helvetica" panose="020B0604020202020204" pitchFamily="34" charset="0"/>
+              </a:rPr>
+              <a:t>implementation in </a:t>
+            </a:r>
+            <a:r>
+              <a:rPr lang="en-US" sz="3200" dirty="0">
+                <a:latin typeface="Helvetica Neue"/>
+                <a:cs typeface="Helvetica" panose="020B0604020202020204" pitchFamily="34" charset="0"/>
+              </a:rPr>
+              <a:t>a NFV- based </a:t>
+            </a:r>
+            <a:r>
+              <a:rPr lang="en-US" sz="3200" dirty="0" smtClean="0">
+                <a:latin typeface="Helvetica Neue"/>
+                <a:cs typeface="Helvetica" panose="020B0604020202020204" pitchFamily="34" charset="0"/>
+              </a:rPr>
+              <a:t>network</a:t>
+            </a:r>
+            <a:endParaRPr lang="en-US" sz="3200" dirty="0" smtClean="0">
+              <a:latin typeface="Helvetica Neue"/>
+              <a:cs typeface="Helvetica" panose="020B0604020202020204" pitchFamily="34" charset="0"/>
+            </a:endParaRPr>
+          </a:p>
+          <a:p>
             <a:pPr marL="571500" indent="-571500">
               <a:buFont typeface="Arial" charset="0"/>
               <a:buChar char="•"/>
             </a:pPr>
+            <a:endParaRPr lang="en-US" sz="2800" b="1" dirty="0" smtClean="0">
+              <a:latin typeface="Helvetica" panose="020B0604020202020204" pitchFamily="34" charset="0"/>
+              <a:cs typeface="Helvetica" panose="020B0604020202020204" pitchFamily="34" charset="0"/>
+            </a:endParaRPr>
+          </a:p>
+          <a:p>
             <a:r>
               <a:rPr lang="en-US" sz="3600" b="1" dirty="0" smtClean="0">
                 <a:latin typeface="Helvetica" panose="020B0604020202020204" pitchFamily="34" charset="0"/>
                 <a:cs typeface="Helvetica" panose="020B0604020202020204" pitchFamily="34" charset="0"/>
               </a:rPr>
-              <a:t>End-to-end testing of endpoint and </a:t>
-            </a:r>
-            <a:r>
-              <a:rPr lang="en-US" sz="3600" b="1" dirty="0" err="1" smtClean="0">
-                <a:latin typeface="Helvetica" panose="020B0604020202020204" pitchFamily="34" charset="0"/>
-                <a:cs typeface="Helvetica" panose="020B0604020202020204" pitchFamily="34" charset="0"/>
-              </a:rPr>
-              <a:t>middlebox</a:t>
-            </a:r>
-            <a:r>
-              <a:rPr lang="en-US" sz="3600" b="1" dirty="0" smtClean="0">
-                <a:latin typeface="Helvetica" panose="020B0604020202020204" pitchFamily="34" charset="0"/>
-                <a:cs typeface="Helvetica" panose="020B0604020202020204" pitchFamily="34" charset="0"/>
-              </a:rPr>
-              <a:t> MCP/FTL software</a:t>
-            </a:r>
-          </a:p>
-          <a:p>
-            <a:pPr marL="571500" indent="-571500">
+              <a:t>Focus on current challenges to the Internet</a:t>
+            </a:r>
+          </a:p>
+          <a:p>
+            <a:pPr marL="725488" lvl="1" indent="-379413">
               <a:buFont typeface="Arial" charset="0"/>
               <a:buChar char="•"/>
             </a:pPr>
             <a:r>
-              <a:rPr lang="en-US" sz="3600" b="1" dirty="0" smtClean="0">
-                <a:latin typeface="Helvetica" panose="020B0604020202020204" pitchFamily="34" charset="0"/>
-                <a:cs typeface="Helvetica" panose="020B0604020202020204" pitchFamily="34" charset="0"/>
-              </a:rPr>
-              <a:t>Focus on current c</a:t>
-            </a:r>
-            <a:r>
-              <a:rPr lang="en-US" sz="3600" b="1" dirty="0" smtClean="0">
-                <a:latin typeface="Helvetica" panose="020B0604020202020204" pitchFamily="34" charset="0"/>
-                <a:cs typeface="Helvetica" panose="020B0604020202020204" pitchFamily="34" charset="0"/>
-              </a:rPr>
-              <a:t>hallenges to the Internet</a:t>
+              <a:rPr lang="en-US" sz="3200" dirty="0" smtClean="0">
+                <a:latin typeface="Helvetica" panose="020B0604020202020204" pitchFamily="34" charset="0"/>
+                <a:cs typeface="Helvetica" panose="020B0604020202020204" pitchFamily="34" charset="0"/>
+              </a:rPr>
+              <a:t>Congestion management in 4G/5G networks</a:t>
+            </a:r>
+          </a:p>
+          <a:p>
+            <a:pPr marL="725488" lvl="1" indent="-379413">
+              <a:buFont typeface="Arial" charset="0"/>
+              <a:buChar char="•"/>
+            </a:pPr>
+            <a:r>
+              <a:rPr lang="en-US" sz="3200" dirty="0" smtClean="0">
+                <a:latin typeface="Helvetica" panose="020B0604020202020204" pitchFamily="34" charset="0"/>
+                <a:cs typeface="Helvetica" panose="020B0604020202020204" pitchFamily="34" charset="0"/>
+              </a:rPr>
+              <a:t>Low latency support for end-to-end applications</a:t>
+            </a:r>
+          </a:p>
+          <a:p>
+            <a:pPr marL="725488" lvl="1" indent="-379413">
+              <a:buFont typeface="Arial" charset="0"/>
+              <a:buChar char="•"/>
+            </a:pPr>
+            <a:r>
+              <a:rPr lang="en-US" sz="3200" dirty="0" smtClean="0">
+                <a:latin typeface="Helvetica" panose="020B0604020202020204" pitchFamily="34" charset="0"/>
+                <a:cs typeface="Helvetica" panose="020B0604020202020204" pitchFamily="34" charset="0"/>
+              </a:rPr>
+              <a:t>Gateways for in-network privacy </a:t>
+            </a:r>
+            <a:r>
+              <a:rPr lang="en-US" sz="3200" dirty="0" smtClean="0">
+                <a:latin typeface="Helvetica" panose="020B0604020202020204" pitchFamily="34" charset="0"/>
+                <a:cs typeface="Helvetica" panose="020B0604020202020204" pitchFamily="34" charset="0"/>
+              </a:rPr>
+              <a:t>protection</a:t>
             </a:r>
           </a:p>
           <a:p>
@@ -3125,78 +3768,41 @@
               <a:buFont typeface="Arial" charset="0"/>
               <a:buChar char="•"/>
             </a:pPr>
-            <a:r>
-              <a:rPr lang="en-US" sz="3600" dirty="0" smtClean="0">
-                <a:latin typeface="Helvetica" panose="020B0604020202020204" pitchFamily="34" charset="0"/>
-                <a:cs typeface="Helvetica" panose="020B0604020202020204" pitchFamily="34" charset="0"/>
-              </a:rPr>
-              <a:t>Congestion management in 4G/5G networks</a:t>
-            </a:r>
-          </a:p>
-          <a:p>
-            <a:pPr marL="2325365" lvl="1" indent="-571500">
-              <a:buFont typeface="Arial" charset="0"/>
-              <a:buChar char="•"/>
-            </a:pPr>
-            <a:r>
-              <a:rPr lang="en-US" sz="3600" dirty="0" smtClean="0">
-                <a:latin typeface="Helvetica" panose="020B0604020202020204" pitchFamily="34" charset="0"/>
-                <a:cs typeface="Helvetica" panose="020B0604020202020204" pitchFamily="34" charset="0"/>
-              </a:rPr>
-              <a:t>Low latency support for end-to-end applications</a:t>
-            </a:r>
-          </a:p>
-          <a:p>
-            <a:pPr marL="2325365" lvl="1" indent="-571500">
-              <a:buFont typeface="Arial" charset="0"/>
-              <a:buChar char="•"/>
-            </a:pPr>
-            <a:r>
-              <a:rPr lang="en-US" sz="3600" dirty="0" smtClean="0">
-                <a:latin typeface="Helvetica" panose="020B0604020202020204" pitchFamily="34" charset="0"/>
-                <a:cs typeface="Helvetica" panose="020B0604020202020204" pitchFamily="34" charset="0"/>
-              </a:rPr>
-              <a:t>Gateways for in-network privacy protection</a:t>
-            </a:r>
-            <a:endParaRPr lang="en-US" sz="3600" b="1" dirty="0">
+            <a:endParaRPr lang="en-US" sz="2800" b="1" dirty="0">
               <a:latin typeface="Helvetica" panose="020B0604020202020204" pitchFamily="34" charset="0"/>
               <a:cs typeface="Helvetica" panose="020B0604020202020204" pitchFamily="34" charset="0"/>
             </a:endParaRPr>
           </a:p>
           <a:p>
-            <a:pPr marL="571500" indent="-571500">
+            <a:r>
+              <a:rPr lang="en-US" sz="3600" b="1" dirty="0" smtClean="0">
+                <a:latin typeface="Helvetica" panose="020B0604020202020204" pitchFamily="34" charset="0"/>
+                <a:cs typeface="Helvetica" panose="020B0604020202020204" pitchFamily="34" charset="0"/>
+              </a:rPr>
+              <a:t>Leveraging FIRE </a:t>
+            </a:r>
+            <a:r>
+              <a:rPr lang="en-US" sz="3600" b="1" dirty="0" err="1" smtClean="0">
+                <a:latin typeface="Helvetica" panose="020B0604020202020204" pitchFamily="34" charset="0"/>
+                <a:cs typeface="Helvetica" panose="020B0604020202020204" pitchFamily="34" charset="0"/>
+              </a:rPr>
+              <a:t>testbeds</a:t>
+            </a:r>
+            <a:r>
+              <a:rPr lang="en-US" sz="3600" b="1" dirty="0" smtClean="0">
+                <a:latin typeface="Helvetica" panose="020B0604020202020204" pitchFamily="34" charset="0"/>
+                <a:cs typeface="Helvetica" panose="020B0604020202020204" pitchFamily="34" charset="0"/>
+              </a:rPr>
+              <a:t> for real-world experience</a:t>
+            </a:r>
+          </a:p>
+          <a:p>
+            <a:pPr marL="725488" lvl="1" indent="-379413">
               <a:buFont typeface="Arial" charset="0"/>
               <a:buChar char="•"/>
             </a:pPr>
             <a:r>
-              <a:rPr lang="en-US" sz="3600" b="1" dirty="0" smtClean="0">
-                <a:latin typeface="Helvetica" panose="020B0604020202020204" pitchFamily="34" charset="0"/>
-                <a:cs typeface="Helvetica" panose="020B0604020202020204" pitchFamily="34" charset="0"/>
-              </a:rPr>
-              <a:t>Leveraging FIRE </a:t>
-            </a:r>
-            <a:r>
-              <a:rPr lang="en-US" sz="3600" b="1" dirty="0" err="1" smtClean="0">
-                <a:latin typeface="Helvetica" panose="020B0604020202020204" pitchFamily="34" charset="0"/>
-                <a:cs typeface="Helvetica" panose="020B0604020202020204" pitchFamily="34" charset="0"/>
-              </a:rPr>
-              <a:t>testbeds</a:t>
-            </a:r>
-            <a:r>
-              <a:rPr lang="en-US" sz="3600" b="1" dirty="0" smtClean="0">
-                <a:latin typeface="Helvetica" panose="020B0604020202020204" pitchFamily="34" charset="0"/>
-                <a:cs typeface="Helvetica" panose="020B0604020202020204" pitchFamily="34" charset="0"/>
-              </a:rPr>
-              <a:t> for real-world experience</a:t>
-            </a:r>
-          </a:p>
-          <a:p>
-            <a:pPr marL="2325365" lvl="1" indent="-571500">
-              <a:buFont typeface="Arial" charset="0"/>
-              <a:buChar char="•"/>
-            </a:pPr>
-            <a:r>
-              <a:rPr lang="en-US" sz="3600" dirty="0" smtClean="0">
+              <a:rPr lang="en-US" sz="3200" dirty="0" smtClean="0">
                 <a:latin typeface="Helvetica" panose="020B0604020202020204" pitchFamily="34" charset="0"/>
                 <a:cs typeface="Helvetica" panose="020B0604020202020204" pitchFamily="34" charset="0"/>
               </a:rPr>
@@ -3213,8 +3819,8 @@
         </p:nvGrpSpPr>
         <p:grpSpPr>
           <a:xfrm>
-            <a:off x="1966557" y="30155244"/>
-            <a:ext cx="11362348" cy="2898687"/>
+            <a:off x="1773264" y="30183290"/>
+            <a:ext cx="11746272" cy="3000836"/>
             <a:chOff x="0" y="0"/>
             <a:chExt cx="9900001" cy="2462598"/>
           </a:xfrm>
@@ -3273,7 +3879,7 @@
             </a:effectLst>
             <a:extLst>
               <a:ext uri="{C572A759-6A51-4108-AA02-DFA0A04FC94B}">
-                <ma14:wrappingTextBoxFlag xmlns:ma14="http://schemas.microsoft.com/office/mac/drawingml/2011/main" val="1"/>
+                <ma14:wrappingTextBoxFlag xmlns:ma14="http://schemas.microsoft.com/office/mac/drawingml/2011/main" xmlns="" val="1"/>
               </a:ext>
             </a:extLst>
           </p:spPr>
@@ -3287,6 +3893,7 @@
                 <a:defRPr sz="1800"/>
               </a:pPr>
               <a:r>
+                <a:rPr dirty="0"/>
                 <a:t>active A/B test</a:t>
               </a:r>
             </a:p>
@@ -3295,7 +3902,16 @@
                 <a:defRPr sz="1800"/>
               </a:pPr>
               <a:r>
-                <a:t>(PathSpider)</a:t>
+                <a:rPr dirty="0"/>
+                <a:t>(</a:t>
+              </a:r>
+              <a:r>
+                <a:rPr dirty="0" err="1"/>
+                <a:t>PathSpider</a:t>
+              </a:r>
+              <a:r>
+                <a:rPr dirty="0"/>
+                <a:t>)</a:t>
               </a:r>
             </a:p>
           </p:txBody>
@@ -3354,7 +3970,7 @@
             </a:effectLst>
             <a:extLst>
               <a:ext uri="{C572A759-6A51-4108-AA02-DFA0A04FC94B}">
-                <ma14:wrappingTextBoxFlag xmlns:ma14="http://schemas.microsoft.com/office/mac/drawingml/2011/main" val="1"/>
+                <ma14:wrappingTextBoxFlag xmlns:ma14="http://schemas.microsoft.com/office/mac/drawingml/2011/main" xmlns="" val="1"/>
               </a:ext>
             </a:extLst>
           </p:spPr>
@@ -3428,7 +4044,7 @@
             </a:effectLst>
             <a:extLst>
               <a:ext uri="{C572A759-6A51-4108-AA02-DFA0A04FC94B}">
-                <ma14:wrappingTextBoxFlag xmlns:ma14="http://schemas.microsoft.com/office/mac/drawingml/2011/main" val="1"/>
+                <ma14:wrappingTextBoxFlag xmlns:ma14="http://schemas.microsoft.com/office/mac/drawingml/2011/main" xmlns="" val="1"/>
               </a:ext>
             </a:extLst>
           </p:spPr>
@@ -3509,7 +4125,7 @@
             </a:effectLst>
             <a:extLst>
               <a:ext uri="{C572A759-6A51-4108-AA02-DFA0A04FC94B}">
-                <ma14:wrappingTextBoxFlag xmlns:ma14="http://schemas.microsoft.com/office/mac/drawingml/2011/main" val="1"/>
+                <ma14:wrappingTextBoxFlag xmlns:ma14="http://schemas.microsoft.com/office/mac/drawingml/2011/main" xmlns="" val="1"/>
               </a:ext>
             </a:extLst>
           </p:spPr>
@@ -3583,7 +4199,7 @@
             </a:effectLst>
             <a:extLst>
               <a:ext uri="{C572A759-6A51-4108-AA02-DFA0A04FC94B}">
-                <ma14:wrappingTextBoxFlag xmlns:ma14="http://schemas.microsoft.com/office/mac/drawingml/2011/main" val="1"/>
+                <ma14:wrappingTextBoxFlag xmlns:ma14="http://schemas.microsoft.com/office/mac/drawingml/2011/main" xmlns="" val="1"/>
               </a:ext>
             </a:extLst>
           </p:spPr>
@@ -3648,7 +4264,7 @@
             </a:effectLst>
             <a:extLst>
               <a:ext uri="{C572A759-6A51-4108-AA02-DFA0A04FC94B}">
-                <ma14:wrappingTextBoxFlag xmlns:ma14="http://schemas.microsoft.com/office/mac/drawingml/2011/main" val="1"/>
+                <ma14:wrappingTextBoxFlag xmlns:ma14="http://schemas.microsoft.com/office/mac/drawingml/2011/main" xmlns="" val="1"/>
               </a:ext>
             </a:extLst>
           </p:spPr>
@@ -3666,6 +4282,7 @@
                 </a:defRPr>
               </a:pPr>
               <a:r>
+                <a:rPr dirty="0"/>
                 <a:t>observations</a:t>
               </a:r>
             </a:p>
@@ -3795,7 +4412,7 @@
             </a:effectLst>
             <a:extLst>
               <a:ext uri="{C572A759-6A51-4108-AA02-DFA0A04FC94B}">
-                <ma14:wrappingTextBoxFlag xmlns:ma14="http://schemas.microsoft.com/office/mac/drawingml/2011/main" val="1"/>
+                <ma14:wrappingTextBoxFlag xmlns:ma14="http://schemas.microsoft.com/office/mac/drawingml/2011/main" xmlns="" val="1"/>
               </a:ext>
             </a:extLst>
           </p:spPr>
@@ -3970,7 +4587,7 @@
             </a:effectLst>
             <a:extLst>
               <a:ext uri="{C572A759-6A51-4108-AA02-DFA0A04FC94B}">
-                <ma14:wrappingTextBoxFlag xmlns:ma14="http://schemas.microsoft.com/office/mac/drawingml/2011/main" val="1"/>
+                <ma14:wrappingTextBoxFlag xmlns:ma14="http://schemas.microsoft.com/office/mac/drawingml/2011/main" xmlns="" val="1"/>
               </a:ext>
             </a:extLst>
           </p:spPr>
@@ -4172,297 +4789,13 @@
       </p:grpSp>
       <p:sp>
         <p:nvSpPr>
-          <p:cNvPr id="6" name="Rectangle 5"/>
-          <p:cNvSpPr/>
-          <p:nvPr/>
-        </p:nvSpPr>
-        <p:spPr>
-          <a:xfrm>
-            <a:off x="1262550" y="26695771"/>
-            <a:ext cx="13045181" cy="2808461"/>
-          </a:xfrm>
-          <a:prstGeom prst="rect">
-            <a:avLst/>
-          </a:prstGeom>
-        </p:spPr>
-        <p:txBody>
-          <a:bodyPr wrap="square">
-            <a:spAutoFit/>
-          </a:bodyPr>
-          <a:lstStyle/>
-          <a:p>
-            <a:pPr marL="571500" indent="-571500" defTabSz="971550">
-              <a:spcBef>
-                <a:spcPts val="500"/>
-              </a:spcBef>
-              <a:buSzPct val="100000"/>
-              <a:buFont typeface="Arial" charset="0"/>
-              <a:buChar char="•"/>
-              <a:defRPr sz="2550"/>
-            </a:pPr>
-            <a:r>
-              <a:rPr lang="en-US" sz="3600" b="1" dirty="0">
-                <a:latin typeface="Helvetica Neue"/>
-                <a:cs typeface="Helvetica" panose="020B0604020202020204" pitchFamily="34" charset="0"/>
-              </a:rPr>
-              <a:t>Path Transparency Observatory</a:t>
-            </a:r>
-          </a:p>
-          <a:p>
-            <a:pPr marL="728662" lvl="1" indent="-457200" defTabSz="971550">
-              <a:spcBef>
-                <a:spcPts val="500"/>
-              </a:spcBef>
-              <a:buFont typeface="Arial" charset="0"/>
-              <a:buChar char="•"/>
-              <a:defRPr sz="2550"/>
-            </a:pPr>
-            <a:r>
-              <a:rPr lang="en-US" sz="3200" dirty="0">
-                <a:latin typeface="Helvetica Neue"/>
-                <a:cs typeface="Helvetica" panose="020B0604020202020204" pitchFamily="34" charset="0"/>
-              </a:rPr>
-              <a:t>Active measurements by the project + external measurements</a:t>
-            </a:r>
-          </a:p>
-          <a:p>
-            <a:pPr marL="728662" lvl="1" indent="-457200" defTabSz="971550">
-              <a:spcBef>
-                <a:spcPts val="500"/>
-              </a:spcBef>
-              <a:buFont typeface="Arial" charset="0"/>
-              <a:buChar char="•"/>
-              <a:defRPr sz="2550"/>
-            </a:pPr>
-            <a:r>
-              <a:rPr lang="en-US" sz="3200" dirty="0" smtClean="0">
-                <a:latin typeface="Helvetica Neue"/>
-                <a:cs typeface="Helvetica" panose="020B0604020202020204" pitchFamily="34" charset="0"/>
-              </a:rPr>
-              <a:t>Public query interface (end 2016) </a:t>
-            </a:r>
-            <a:r>
-              <a:rPr lang="en-US" sz="3200" dirty="0">
-                <a:latin typeface="Helvetica Neue"/>
-                <a:cs typeface="Helvetica" panose="020B0604020202020204" pitchFamily="34" charset="0"/>
-              </a:rPr>
-              <a:t>to access </a:t>
-            </a:r>
-            <a:r>
-              <a:rPr lang="en-US" sz="3200" dirty="0" smtClean="0">
-                <a:latin typeface="Helvetica Neue"/>
-                <a:cs typeface="Helvetica" panose="020B0604020202020204" pitchFamily="34" charset="0"/>
-              </a:rPr>
-              <a:t>path impairment data:</a:t>
-            </a:r>
-            <a:endParaRPr lang="en-US" sz="3200" dirty="0">
-              <a:latin typeface="Helvetica Neue"/>
-              <a:cs typeface="Helvetica" panose="020B0604020202020204" pitchFamily="34" charset="0"/>
-            </a:endParaRPr>
-          </a:p>
-          <a:p>
-            <a:pPr marL="927496" lvl="2" indent="-457200" defTabSz="971550">
-              <a:spcBef>
-                <a:spcPts val="500"/>
-              </a:spcBef>
-              <a:buFont typeface="Arial" charset="0"/>
-              <a:buChar char="•"/>
-              <a:defRPr sz="2550"/>
-            </a:pPr>
-            <a:r>
-              <a:rPr lang="en-US" sz="3200" i="1" dirty="0">
-                <a:latin typeface="Helvetica Neue"/>
-                <a:cs typeface="Helvetica" panose="020B0604020202020204" pitchFamily="34" charset="0"/>
-              </a:rPr>
-              <a:t>What is the likelihood that a certain path impairment impacts my traffic</a:t>
-            </a:r>
-            <a:r>
-              <a:rPr lang="en-US" sz="3200" dirty="0">
-                <a:latin typeface="Helvetica Neue"/>
-                <a:cs typeface="Helvetica" panose="020B0604020202020204" pitchFamily="34" charset="0"/>
-              </a:rPr>
-              <a:t> (modifications/stripping/dropping/blocking)?</a:t>
-            </a:r>
-            <a:endParaRPr lang="en-US" sz="3200" dirty="0">
-              <a:latin typeface="Helvetica Neue"/>
-              <a:cs typeface="Helvetica" panose="020B0604020202020204" pitchFamily="34" charset="0"/>
-            </a:endParaRPr>
-          </a:p>
-        </p:txBody>
-      </p:sp>
-      <p:sp>
-        <p:nvSpPr>
-          <p:cNvPr id="7" name="Rectangle 6"/>
-          <p:cNvSpPr/>
-          <p:nvPr/>
-        </p:nvSpPr>
-        <p:spPr>
-          <a:xfrm>
-            <a:off x="1262550" y="33710617"/>
-            <a:ext cx="12347269" cy="2811026"/>
-          </a:xfrm>
-          <a:prstGeom prst="rect">
-            <a:avLst/>
-          </a:prstGeom>
-        </p:spPr>
-        <p:txBody>
-          <a:bodyPr wrap="square">
-            <a:spAutoFit/>
-          </a:bodyPr>
-          <a:lstStyle/>
-          <a:p>
-            <a:pPr marL="457200" indent="-457200" defTabSz="971550">
-              <a:spcBef>
-                <a:spcPts val="500"/>
-              </a:spcBef>
-              <a:buFont typeface="Arial" charset="0"/>
-              <a:buChar char="•"/>
-              <a:defRPr sz="2550"/>
-            </a:pPr>
-            <a:r>
-              <a:rPr lang="en-US" sz="3200" dirty="0" smtClean="0">
-                <a:latin typeface="Helvetica Neue"/>
-                <a:cs typeface="Helvetica" panose="020B0604020202020204" pitchFamily="34" charset="0"/>
-              </a:rPr>
-              <a:t>Common data model for all </a:t>
-            </a:r>
-            <a:r>
-              <a:rPr lang="en-US" sz="3200" i="1" dirty="0" smtClean="0">
-                <a:latin typeface="Helvetica Neue"/>
-                <a:cs typeface="Helvetica" panose="020B0604020202020204" pitchFamily="34" charset="0"/>
-              </a:rPr>
-              <a:t>observations</a:t>
-            </a:r>
-            <a:r>
-              <a:rPr lang="en-US" sz="3200" dirty="0" smtClean="0">
-                <a:latin typeface="Helvetica Neue"/>
-                <a:cs typeface="Helvetica" panose="020B0604020202020204" pitchFamily="34" charset="0"/>
-              </a:rPr>
-              <a:t> of path conditions</a:t>
-            </a:r>
-          </a:p>
-          <a:p>
-            <a:pPr marL="2211065" lvl="1" indent="-457200" defTabSz="971550">
-              <a:spcBef>
-                <a:spcPts val="500"/>
-              </a:spcBef>
-              <a:buFont typeface="Arial" charset="0"/>
-              <a:buChar char="•"/>
-              <a:defRPr sz="2550"/>
-            </a:pPr>
-            <a:r>
-              <a:rPr lang="en-US" sz="3200" b="1" i="1" dirty="0" smtClean="0">
-                <a:latin typeface="Helvetica Neue"/>
-                <a:cs typeface="Helvetica" panose="020B0604020202020204" pitchFamily="34" charset="0"/>
-              </a:rPr>
-              <a:t>t</a:t>
-            </a:r>
-            <a:r>
-              <a:rPr lang="en-US" sz="3200" dirty="0" smtClean="0">
-                <a:latin typeface="Helvetica Neue"/>
-                <a:cs typeface="Helvetica" panose="020B0604020202020204" pitchFamily="34" charset="0"/>
-              </a:rPr>
-              <a:t>: time of observation</a:t>
-            </a:r>
-          </a:p>
-          <a:p>
-            <a:pPr marL="2211065" lvl="1" indent="-457200" defTabSz="971550">
-              <a:spcBef>
-                <a:spcPts val="500"/>
-              </a:spcBef>
-              <a:buFont typeface="Arial" charset="0"/>
-              <a:buChar char="•"/>
-              <a:defRPr sz="2550"/>
-            </a:pPr>
-            <a:r>
-              <a:rPr lang="en-US" sz="3200" b="1" i="1" dirty="0" smtClean="0">
-                <a:latin typeface="Helvetica Neue"/>
-                <a:cs typeface="Helvetica" panose="020B0604020202020204" pitchFamily="34" charset="0"/>
-              </a:rPr>
-              <a:t>p</a:t>
-            </a:r>
-            <a:r>
-              <a:rPr lang="en-US" sz="3200" dirty="0" smtClean="0">
-                <a:latin typeface="Helvetica Neue"/>
-                <a:cs typeface="Helvetica" panose="020B0604020202020204" pitchFamily="34" charset="0"/>
-              </a:rPr>
-              <a:t>: path to which observation applies</a:t>
-            </a:r>
-          </a:p>
-          <a:p>
-            <a:pPr marL="2211065" lvl="1" indent="-457200" defTabSz="971550">
-              <a:spcBef>
-                <a:spcPts val="500"/>
-              </a:spcBef>
-              <a:buFont typeface="Arial" charset="0"/>
-              <a:buChar char="•"/>
-              <a:defRPr sz="2550"/>
-            </a:pPr>
-            <a:r>
-              <a:rPr lang="en-US" sz="3200" b="1" i="1" dirty="0" smtClean="0">
-                <a:latin typeface="Helvetica Neue"/>
-                <a:cs typeface="Helvetica" panose="020B0604020202020204" pitchFamily="34" charset="0"/>
-              </a:rPr>
-              <a:t>c</a:t>
-            </a:r>
-            <a:r>
-              <a:rPr lang="en-US" sz="3200" dirty="0" smtClean="0">
-                <a:latin typeface="Helvetica Neue"/>
-                <a:cs typeface="Helvetica" panose="020B0604020202020204" pitchFamily="34" charset="0"/>
-              </a:rPr>
-              <a:t>: condition observed, e.g. “feature X </a:t>
-            </a:r>
-            <a:r>
-              <a:rPr lang="en-US" sz="3200" dirty="0" smtClean="0">
-                <a:latin typeface="Helvetica Neue"/>
-                <a:cs typeface="Helvetica" panose="020B0604020202020204" pitchFamily="34" charset="0"/>
-                <a:sym typeface="Wingdings"/>
-              </a:rPr>
-              <a:t> </a:t>
-            </a:r>
-            <a:r>
-              <a:rPr lang="en-US" sz="3200" dirty="0" smtClean="0">
-                <a:latin typeface="Helvetica Neue"/>
-                <a:cs typeface="Helvetica" panose="020B0604020202020204" pitchFamily="34" charset="0"/>
-              </a:rPr>
-              <a:t>packet loss”</a:t>
-            </a:r>
-          </a:p>
-          <a:p>
-            <a:pPr marL="2211065" lvl="1" indent="-457200" defTabSz="971550">
-              <a:spcBef>
-                <a:spcPts val="500"/>
-              </a:spcBef>
-              <a:buFont typeface="Arial" charset="0"/>
-              <a:buChar char="•"/>
-              <a:defRPr sz="2550"/>
-            </a:pPr>
-            <a:r>
-              <a:rPr lang="en-US" sz="3200" b="1" i="1" dirty="0" smtClean="0">
-                <a:latin typeface="Helvetica Neue"/>
-                <a:cs typeface="Helvetica" panose="020B0604020202020204" pitchFamily="34" charset="0"/>
-              </a:rPr>
-              <a:t>v</a:t>
-            </a:r>
-            <a:r>
-              <a:rPr lang="en-US" sz="3200" dirty="0" smtClean="0">
-                <a:latin typeface="Helvetica Neue"/>
-                <a:cs typeface="Helvetica" panose="020B0604020202020204" pitchFamily="34" charset="0"/>
-              </a:rPr>
-              <a:t>: vector of condition-specific values</a:t>
-            </a:r>
-          </a:p>
-        </p:txBody>
-      </p:sp>
-      <p:sp>
-        <p:nvSpPr>
           <p:cNvPr id="10" name="TextBox 9"/>
           <p:cNvSpPr txBox="1"/>
           <p:nvPr/>
         </p:nvSpPr>
         <p:spPr>
           <a:xfrm>
-            <a:off x="2520782" y="15119542"/>
+            <a:off x="2382042" y="13314879"/>
             <a:ext cx="10528716" cy="1446550"/>
           </a:xfrm>
           <a:prstGeom prst="rect">
@@ -4528,7 +4861,7 @@
         </p:nvSpPr>
         <p:spPr>
           <a:xfrm>
-            <a:off x="16508585" y="15114807"/>
+            <a:off x="16376220" y="13316400"/>
             <a:ext cx="11731097" cy="1446550"/>
           </a:xfrm>
           <a:prstGeom prst="rect">
@@ -4586,7 +4919,7 @@
         </p:blipFill>
         <p:spPr>
           <a:xfrm>
-            <a:off x="1832967" y="22213865"/>
+            <a:off x="2118177" y="17410189"/>
             <a:ext cx="11056446" cy="3889907"/>
           </a:xfrm>
           <a:prstGeom prst="rect">
@@ -4602,8 +4935,8 @@
         </p:nvSpPr>
         <p:spPr>
           <a:xfrm>
-            <a:off x="16423494" y="29089783"/>
-            <a:ext cx="11639212" cy="2123658"/>
+            <a:off x="16486716" y="27172859"/>
+            <a:ext cx="11984371" cy="2123658"/>
           </a:xfrm>
           <a:prstGeom prst="rect">
             <a:avLst/>
@@ -4642,18 +4975,7 @@
                 <a:ea typeface="Helvetica Neue" charset="0"/>
                 <a:cs typeface="Helvetica Neue" charset="0"/>
               </a:rPr>
-              <a:t>an coexist and be incrementally deployed</a:t>
-            </a:r>
-          </a:p>
-          <a:p>
-            <a:pPr algn="ctr"/>
-            <a:r>
-              <a:rPr lang="en-US" sz="4400" b="1" i="1" dirty="0">
-                <a:latin typeface="Helvetica Neue" charset="0"/>
-                <a:ea typeface="Helvetica Neue" charset="0"/>
-                <a:cs typeface="Helvetica Neue" charset="0"/>
-              </a:rPr>
-              <a:t>i</a:t>
+              <a:t>an coexist and be incrementally </a:t>
             </a:r>
             <a:r>
               <a:rPr lang="en-US" sz="4400" b="1" i="1" dirty="0" smtClean="0">
@@ -4661,8 +4983,24 @@
                 <a:ea typeface="Helvetica Neue" charset="0"/>
                 <a:cs typeface="Helvetica Neue" charset="0"/>
               </a:rPr>
-              <a:t>n today’s Internet</a:t>
-            </a:r>
+              <a:t>deployed  </a:t>
+            </a:r>
+          </a:p>
+          <a:p>
+            <a:pPr algn="ctr"/>
+            <a:r>
+              <a:rPr lang="en-US" sz="4400" b="1" i="1" dirty="0" smtClean="0">
+                <a:latin typeface="Helvetica Neue" charset="0"/>
+                <a:ea typeface="Helvetica Neue" charset="0"/>
+                <a:cs typeface="Helvetica Neue" charset="0"/>
+              </a:rPr>
+              <a:t>in today’s Internet</a:t>
+            </a:r>
+            <a:endParaRPr lang="en-US" sz="4400" b="1" i="1" dirty="0" smtClean="0">
+              <a:latin typeface="Helvetica Neue" charset="0"/>
+              <a:ea typeface="Helvetica Neue" charset="0"/>
+              <a:cs typeface="Helvetica Neue" charset="0"/>
+            </a:endParaRPr>
           </a:p>
         </p:txBody>
       </p:sp>

</xml_diff>

<commit_message>
two-state middlebox impairment graphic
</commit_message>
<xml_diff>
--- a/NetFutures/mami-poster.pptx
+++ b/NetFutures/mami-poster.pptx
@@ -1330,7 +1330,7 @@
           </a:ln>
           <a:extLst>
             <a:ext uri="{C572A759-6A51-4108-AA02-DFA0A04FC94B}">
-              <ma14:wrappingTextBoxFlag xmlns:ma14="http://schemas.microsoft.com/office/mac/drawingml/2011/main" xmlns="" val="1"/>
+              <ma14:wrappingTextBoxFlag xmlns:ma14="http://schemas.microsoft.com/office/mac/drawingml/2011/main" val="1"/>
             </a:ext>
           </a:extLst>
         </p:spPr>
@@ -1381,7 +1381,7 @@
           </a:ln>
           <a:extLst>
             <a:ext uri="{C572A759-6A51-4108-AA02-DFA0A04FC94B}">
-              <ma14:wrappingTextBoxFlag xmlns:ma14="http://schemas.microsoft.com/office/mac/drawingml/2011/main" xmlns="" val="1"/>
+              <ma14:wrappingTextBoxFlag xmlns:ma14="http://schemas.microsoft.com/office/mac/drawingml/2011/main" val="1"/>
             </a:ext>
           </a:extLst>
         </p:spPr>
@@ -1435,7 +1435,7 @@
           </a:ln>
           <a:extLst>
             <a:ext uri="{C572A759-6A51-4108-AA02-DFA0A04FC94B}">
-              <ma14:wrappingTextBoxFlag xmlns:ma14="http://schemas.microsoft.com/office/mac/drawingml/2011/main" xmlns="" val="1"/>
+              <ma14:wrappingTextBoxFlag xmlns:ma14="http://schemas.microsoft.com/office/mac/drawingml/2011/main" val="1"/>
             </a:ext>
           </a:extLst>
         </p:spPr>
@@ -1486,7 +1486,7 @@
           </a:ln>
           <a:extLst>
             <a:ext uri="{C572A759-6A51-4108-AA02-DFA0A04FC94B}">
-              <ma14:wrappingTextBoxFlag xmlns:ma14="http://schemas.microsoft.com/office/mac/drawingml/2011/main" xmlns="" val="1"/>
+              <ma14:wrappingTextBoxFlag xmlns:ma14="http://schemas.microsoft.com/office/mac/drawingml/2011/main" val="1"/>
             </a:ext>
           </a:extLst>
         </p:spPr>
@@ -1565,7 +1565,7 @@
           </a:ln>
           <a:extLst>
             <a:ext uri="{C572A759-6A51-4108-AA02-DFA0A04FC94B}">
-              <ma14:wrappingTextBoxFlag xmlns:ma14="http://schemas.microsoft.com/office/mac/drawingml/2011/main" xmlns="" val="1"/>
+              <ma14:wrappingTextBoxFlag xmlns:ma14="http://schemas.microsoft.com/office/mac/drawingml/2011/main" val="1"/>
             </a:ext>
           </a:extLst>
         </p:spPr>
@@ -1643,7 +1643,7 @@
           </a:ln>
           <a:extLst>
             <a:ext uri="{C572A759-6A51-4108-AA02-DFA0A04FC94B}">
-              <ma14:wrappingTextBoxFlag xmlns:ma14="http://schemas.microsoft.com/office/mac/drawingml/2011/main" xmlns="" val="1"/>
+              <ma14:wrappingTextBoxFlag xmlns:ma14="http://schemas.microsoft.com/office/mac/drawingml/2011/main" val="1"/>
             </a:ext>
           </a:extLst>
         </p:spPr>
@@ -2167,14 +2167,7 @@
                 <a:latin typeface="Helvetica Neue"/>
                 <a:cs typeface="Helvetica" panose="020B0604020202020204" pitchFamily="34" charset="0"/>
               </a:rPr>
-              <a:t>(e.g. TFO, MPTCP), and other protocol (ICMP, DNS, </a:t>
-            </a:r>
-            <a:r>
-              <a:rPr lang="en-US" sz="3200" dirty="0" smtClean="0">
-                <a:latin typeface="Helvetica Neue"/>
-                <a:cs typeface="Helvetica" panose="020B0604020202020204" pitchFamily="34" charset="0"/>
-              </a:rPr>
-              <a:t>…)</a:t>
+              <a:t>(e.g. TFO, MPTCP), and other protocol (ICMP, DNS, …)</a:t>
             </a:r>
             <a:endParaRPr lang="en-US" sz="1200" dirty="0" smtClean="0">
               <a:latin typeface="Helvetica Neue"/>
@@ -2363,21 +2356,7 @@
                 <a:latin typeface="Helvetica Neue"/>
                 <a:cs typeface="Helvetica" panose="020B0604020202020204" pitchFamily="34" charset="0"/>
               </a:rPr>
-              <a:t>Development </a:t>
-            </a:r>
-            <a:r>
-              <a:rPr lang="en-US" sz="3600" b="1" dirty="0" smtClean="0">
-                <a:latin typeface="Helvetica Neue"/>
-                <a:cs typeface="Helvetica" panose="020B0604020202020204" pitchFamily="34" charset="0"/>
-              </a:rPr>
-              <a:t>of new measurement </a:t>
-            </a:r>
-            <a:r>
-              <a:rPr lang="en-US" sz="3600" b="1" dirty="0" smtClean="0">
-                <a:latin typeface="Helvetica Neue"/>
-                <a:cs typeface="Helvetica" panose="020B0604020202020204" pitchFamily="34" charset="0"/>
-              </a:rPr>
-              <a:t>tools</a:t>
+              <a:t>Development of new measurement tools</a:t>
             </a:r>
           </a:p>
           <a:p>
@@ -2483,14 +2462,7 @@
                 <a:latin typeface="Helvetica Neue"/>
                 <a:cs typeface="Helvetica" panose="020B0604020202020204" pitchFamily="34" charset="0"/>
               </a:rPr>
-              <a:t>: A/B testing (currently on ECN support</a:t>
-            </a:r>
-            <a:r>
-              <a:rPr lang="en-US" sz="3200" dirty="0" smtClean="0">
-                <a:latin typeface="Helvetica Neue"/>
-                <a:cs typeface="Helvetica" panose="020B0604020202020204" pitchFamily="34" charset="0"/>
-              </a:rPr>
-              <a:t>)</a:t>
+              <a:t>: A/B testing (currently on ECN support)</a:t>
             </a:r>
           </a:p>
           <a:p>
@@ -3022,14 +2994,7 @@
                 <a:latin typeface="Helvetica" panose="020B0604020202020204" pitchFamily="34" charset="0"/>
                 <a:cs typeface="Helvetica" panose="020B0604020202020204" pitchFamily="34" charset="0"/>
               </a:rPr>
-              <a:t>the Internet </a:t>
-            </a:r>
-            <a:r>
-              <a:rPr lang="en-US" sz="3200" dirty="0" smtClean="0">
-                <a:latin typeface="Helvetica" panose="020B0604020202020204" pitchFamily="34" charset="0"/>
-                <a:cs typeface="Helvetica" panose="020B0604020202020204" pitchFamily="34" charset="0"/>
-              </a:rPr>
-              <a:t>architecture</a:t>
+              <a:t>the Internet architecture</a:t>
             </a:r>
           </a:p>
           <a:p>
@@ -3245,14 +3210,7 @@
                 <a:latin typeface="Helvetica" panose="020B0604020202020204" pitchFamily="34" charset="0"/>
                 <a:cs typeface="Helvetica" panose="020B0604020202020204" pitchFamily="34" charset="0"/>
               </a:rPr>
-              <a:t>path as a first-order </a:t>
-            </a:r>
-            <a:r>
-              <a:rPr lang="en-US" sz="3200" dirty="0" smtClean="0">
-                <a:latin typeface="Helvetica" panose="020B0604020202020204" pitchFamily="34" charset="0"/>
-                <a:cs typeface="Helvetica" panose="020B0604020202020204" pitchFamily="34" charset="0"/>
-              </a:rPr>
-              <a:t>concept</a:t>
+              <a:t>path as a first-order concept</a:t>
             </a:r>
             <a:endParaRPr lang="en-US" sz="3200" dirty="0">
               <a:latin typeface="Helvetica" panose="020B0604020202020204" pitchFamily="34" charset="0"/>
@@ -3277,10 +3235,6 @@
               </a:rPr>
               <a:t>Focus on standardization activities </a:t>
             </a:r>
-            <a:endParaRPr lang="en-US" sz="3600" b="1" dirty="0" smtClean="0">
-              <a:latin typeface="Helvetica" panose="020B0604020202020204" pitchFamily="34" charset="0"/>
-              <a:cs typeface="Helvetica" panose="020B0604020202020204" pitchFamily="34" charset="0"/>
-            </a:endParaRPr>
           </a:p>
           <a:p>
             <a:pPr marL="725488" lvl="1">
@@ -3293,14 +3247,7 @@
                 <a:latin typeface="Helvetica" panose="020B0604020202020204" pitchFamily="34" charset="0"/>
                 <a:cs typeface="Helvetica" panose="020B0604020202020204" pitchFamily="34" charset="0"/>
               </a:rPr>
-              <a:t>for </a:t>
-            </a:r>
-            <a:r>
-              <a:rPr lang="en-US" sz="3200" dirty="0" smtClean="0">
-                <a:latin typeface="Helvetica" panose="020B0604020202020204" pitchFamily="34" charset="0"/>
-                <a:cs typeface="Helvetica" panose="020B0604020202020204" pitchFamily="34" charset="0"/>
-              </a:rPr>
-              <a:t>coordination with industry and transition to practice</a:t>
+              <a:t>for coordination with industry and transition to practice</a:t>
             </a:r>
             <a:br>
               <a:rPr lang="en-US" sz="3200" dirty="0" smtClean="0">
@@ -3505,7 +3452,7 @@
           </a:effectLst>
           <a:extLst>
             <a:ext uri="{C572A759-6A51-4108-AA02-DFA0A04FC94B}">
-              <ma14:wrappingTextBoxFlag xmlns:ma14="http://schemas.microsoft.com/office/mac/drawingml/2011/main" xmlns="" val="1"/>
+              <ma14:wrappingTextBoxFlag xmlns:ma14="http://schemas.microsoft.com/office/mac/drawingml/2011/main" val="1"/>
             </a:ext>
           </a:extLst>
         </p:spPr>
@@ -3616,21 +3563,7 @@
                 <a:latin typeface="Helvetica Neue"/>
                 <a:cs typeface="Helvetica" panose="020B0604020202020204" pitchFamily="34" charset="0"/>
               </a:rPr>
-              <a:t>Implementation and  </a:t>
-            </a:r>
-            <a:r>
-              <a:rPr lang="en-US" sz="3600" b="1" dirty="0" smtClean="0">
-                <a:latin typeface="Helvetica Neue"/>
-                <a:cs typeface="Helvetica" panose="020B0604020202020204" pitchFamily="34" charset="0"/>
-              </a:rPr>
-              <a:t>testing of </a:t>
-            </a:r>
-            <a:r>
-              <a:rPr lang="en-US" sz="3600" b="1" dirty="0" smtClean="0">
-                <a:latin typeface="Helvetica Neue"/>
-                <a:cs typeface="Helvetica" panose="020B0604020202020204" pitchFamily="34" charset="0"/>
-              </a:rPr>
-              <a:t>MCP/TLF software</a:t>
+              <a:t>Implementation and  testing of MCP/TLF software</a:t>
             </a:r>
           </a:p>
           <a:p>
@@ -3693,10 +3626,6 @@
               </a:rPr>
               <a:t>network</a:t>
             </a:r>
-            <a:endParaRPr lang="en-US" sz="3200" dirty="0" smtClean="0">
-              <a:latin typeface="Helvetica Neue"/>
-              <a:cs typeface="Helvetica" panose="020B0604020202020204" pitchFamily="34" charset="0"/>
-            </a:endParaRPr>
           </a:p>
           <a:p>
             <a:pPr marL="571500" indent="-571500">
@@ -3753,14 +3682,7 @@
                 <a:latin typeface="Helvetica" panose="020B0604020202020204" pitchFamily="34" charset="0"/>
                 <a:cs typeface="Helvetica" panose="020B0604020202020204" pitchFamily="34" charset="0"/>
               </a:rPr>
-              <a:t>Gateways for in-network privacy </a:t>
-            </a:r>
-            <a:r>
-              <a:rPr lang="en-US" sz="3200" dirty="0" smtClean="0">
-                <a:latin typeface="Helvetica" panose="020B0604020202020204" pitchFamily="34" charset="0"/>
-                <a:cs typeface="Helvetica" panose="020B0604020202020204" pitchFamily="34" charset="0"/>
-              </a:rPr>
-              <a:t>protection</a:t>
+              <a:t>Gateways for in-network privacy protection</a:t>
             </a:r>
           </a:p>
           <a:p>
@@ -3879,7 +3801,7 @@
             </a:effectLst>
             <a:extLst>
               <a:ext uri="{C572A759-6A51-4108-AA02-DFA0A04FC94B}">
-                <ma14:wrappingTextBoxFlag xmlns:ma14="http://schemas.microsoft.com/office/mac/drawingml/2011/main" xmlns="" val="1"/>
+                <ma14:wrappingTextBoxFlag xmlns:ma14="http://schemas.microsoft.com/office/mac/drawingml/2011/main" val="1"/>
               </a:ext>
             </a:extLst>
           </p:spPr>
@@ -3970,7 +3892,7 @@
             </a:effectLst>
             <a:extLst>
               <a:ext uri="{C572A759-6A51-4108-AA02-DFA0A04FC94B}">
-                <ma14:wrappingTextBoxFlag xmlns:ma14="http://schemas.microsoft.com/office/mac/drawingml/2011/main" xmlns="" val="1"/>
+                <ma14:wrappingTextBoxFlag xmlns:ma14="http://schemas.microsoft.com/office/mac/drawingml/2011/main" val="1"/>
               </a:ext>
             </a:extLst>
           </p:spPr>
@@ -4044,7 +3966,7 @@
             </a:effectLst>
             <a:extLst>
               <a:ext uri="{C572A759-6A51-4108-AA02-DFA0A04FC94B}">
-                <ma14:wrappingTextBoxFlag xmlns:ma14="http://schemas.microsoft.com/office/mac/drawingml/2011/main" xmlns="" val="1"/>
+                <ma14:wrappingTextBoxFlag xmlns:ma14="http://schemas.microsoft.com/office/mac/drawingml/2011/main" val="1"/>
               </a:ext>
             </a:extLst>
           </p:spPr>
@@ -4125,7 +4047,7 @@
             </a:effectLst>
             <a:extLst>
               <a:ext uri="{C572A759-6A51-4108-AA02-DFA0A04FC94B}">
-                <ma14:wrappingTextBoxFlag xmlns:ma14="http://schemas.microsoft.com/office/mac/drawingml/2011/main" xmlns="" val="1"/>
+                <ma14:wrappingTextBoxFlag xmlns:ma14="http://schemas.microsoft.com/office/mac/drawingml/2011/main" val="1"/>
               </a:ext>
             </a:extLst>
           </p:spPr>
@@ -4199,7 +4121,7 @@
             </a:effectLst>
             <a:extLst>
               <a:ext uri="{C572A759-6A51-4108-AA02-DFA0A04FC94B}">
-                <ma14:wrappingTextBoxFlag xmlns:ma14="http://schemas.microsoft.com/office/mac/drawingml/2011/main" xmlns="" val="1"/>
+                <ma14:wrappingTextBoxFlag xmlns:ma14="http://schemas.microsoft.com/office/mac/drawingml/2011/main" val="1"/>
               </a:ext>
             </a:extLst>
           </p:spPr>
@@ -4264,7 +4186,7 @@
             </a:effectLst>
             <a:extLst>
               <a:ext uri="{C572A759-6A51-4108-AA02-DFA0A04FC94B}">
-                <ma14:wrappingTextBoxFlag xmlns:ma14="http://schemas.microsoft.com/office/mac/drawingml/2011/main" xmlns="" val="1"/>
+                <ma14:wrappingTextBoxFlag xmlns:ma14="http://schemas.microsoft.com/office/mac/drawingml/2011/main" val="1"/>
               </a:ext>
             </a:extLst>
           </p:spPr>
@@ -4412,7 +4334,7 @@
             </a:effectLst>
             <a:extLst>
               <a:ext uri="{C572A759-6A51-4108-AA02-DFA0A04FC94B}">
-                <ma14:wrappingTextBoxFlag xmlns:ma14="http://schemas.microsoft.com/office/mac/drawingml/2011/main" xmlns="" val="1"/>
+                <ma14:wrappingTextBoxFlag xmlns:ma14="http://schemas.microsoft.com/office/mac/drawingml/2011/main" val="1"/>
               </a:ext>
             </a:extLst>
           </p:spPr>
@@ -4587,7 +4509,7 @@
             </a:effectLst>
             <a:extLst>
               <a:ext uri="{C572A759-6A51-4108-AA02-DFA0A04FC94B}">
-                <ma14:wrappingTextBoxFlag xmlns:ma14="http://schemas.microsoft.com/office/mac/drawingml/2011/main" xmlns="" val="1"/>
+                <ma14:wrappingTextBoxFlag xmlns:ma14="http://schemas.microsoft.com/office/mac/drawingml/2011/main" val="1"/>
               </a:ext>
             </a:extLst>
           </p:spPr>
@@ -4903,30 +4825,6 @@
           </a:p>
         </p:txBody>
       </p:sp>
-      <p:pic>
-        <p:nvPicPr>
-          <p:cNvPr id="13" name="Picture 12"/>
-          <p:cNvPicPr>
-            <a:picLocks noChangeAspect="1"/>
-          </p:cNvPicPr>
-          <p:nvPr/>
-        </p:nvPicPr>
-        <p:blipFill>
-          <a:blip r:embed="rId11"/>
-          <a:stretch>
-            <a:fillRect/>
-          </a:stretch>
-        </p:blipFill>
-        <p:spPr>
-          <a:xfrm>
-            <a:off x="2118177" y="17410189"/>
-            <a:ext cx="11056446" cy="3889907"/>
-          </a:xfrm>
-          <a:prstGeom prst="rect">
-            <a:avLst/>
-          </a:prstGeom>
-        </p:spPr>
-      </p:pic>
       <p:sp>
         <p:nvSpPr>
           <p:cNvPr id="57" name="TextBox 56"/>
@@ -4975,32 +4873,19 @@
                 <a:ea typeface="Helvetica Neue" charset="0"/>
                 <a:cs typeface="Helvetica Neue" charset="0"/>
               </a:rPr>
-              <a:t>an coexist and be incrementally </a:t>
-            </a:r>
+              <a:t>an coexist and be incrementally deployed  </a:t>
+            </a:r>
+          </a:p>
+          <a:p>
+            <a:pPr algn="ctr"/>
             <a:r>
               <a:rPr lang="en-US" sz="4400" b="1" i="1" dirty="0" smtClean="0">
                 <a:latin typeface="Helvetica Neue" charset="0"/>
                 <a:ea typeface="Helvetica Neue" charset="0"/>
                 <a:cs typeface="Helvetica Neue" charset="0"/>
               </a:rPr>
-              <a:t>deployed  </a:t>
-            </a:r>
-          </a:p>
-          <a:p>
-            <a:pPr algn="ctr"/>
-            <a:r>
-              <a:rPr lang="en-US" sz="4400" b="1" i="1" dirty="0" smtClean="0">
-                <a:latin typeface="Helvetica Neue" charset="0"/>
-                <a:ea typeface="Helvetica Neue" charset="0"/>
-                <a:cs typeface="Helvetica Neue" charset="0"/>
-              </a:rPr>
               <a:t>in today’s Internet</a:t>
             </a:r>
-            <a:endParaRPr lang="en-US" sz="4400" b="1" i="1" dirty="0" smtClean="0">
-              <a:latin typeface="Helvetica Neue" charset="0"/>
-              <a:ea typeface="Helvetica Neue" charset="0"/>
-              <a:cs typeface="Helvetica Neue" charset="0"/>
-            </a:endParaRPr>
           </a:p>
         </p:txBody>
       </p:sp>
@@ -5051,6 +4936,152 @@
           </a:p>
         </p:txBody>
       </p:sp>
+      <p:sp>
+        <p:nvSpPr>
+          <p:cNvPr id="50" name="Shape 168"/>
+          <p:cNvSpPr/>
+          <p:nvPr/>
+        </p:nvSpPr>
+        <p:spPr>
+          <a:xfrm>
+            <a:off x="3523684" y="22253951"/>
+            <a:ext cx="2967159" cy="1087477"/>
+          </a:xfrm>
+          <a:prstGeom prst="rect">
+            <a:avLst/>
+          </a:prstGeom>
+          <a:ln w="12700">
+            <a:miter lim="400000"/>
+          </a:ln>
+          <a:extLst>
+            <a:ext uri="{C572A759-6A51-4108-AA02-DFA0A04FC94B}">
+              <ma14:wrappingTextBoxFlag xmlns:ma14="http://schemas.microsoft.com/office/mac/drawingml/2011/main" val="1"/>
+            </a:ext>
+          </a:extLst>
+        </p:spPr>
+        <p:txBody>
+          <a:bodyPr wrap="none" lIns="50800" tIns="50800" rIns="50800" bIns="50800" anchor="ctr">
+            <a:spAutoFit/>
+          </a:bodyPr>
+          <a:lstStyle/>
+          <a:p>
+            <a:pPr algn="ctr"/>
+            <a:r>
+              <a:rPr lang="en-US" sz="3200" i="1" dirty="0" smtClean="0">
+                <a:latin typeface="Helvetica Neue"/>
+                <a:cs typeface="Arial" panose="020B0604020202020204" pitchFamily="34" charset="0"/>
+              </a:rPr>
+              <a:t>The end-to-end</a:t>
+            </a:r>
+          </a:p>
+          <a:p>
+            <a:pPr algn="ctr"/>
+            <a:r>
+              <a:rPr lang="en-US" sz="3200" i="1" dirty="0" smtClean="0">
+                <a:latin typeface="Helvetica Neue"/>
+                <a:cs typeface="Arial" panose="020B0604020202020204" pitchFamily="34" charset="0"/>
+              </a:rPr>
+              <a:t>ideal</a:t>
+            </a:r>
+            <a:endParaRPr sz="3200" i="1" dirty="0">
+              <a:latin typeface="Helvetica Neue"/>
+              <a:cs typeface="Arial" panose="020B0604020202020204" pitchFamily="34" charset="0"/>
+            </a:endParaRPr>
+          </a:p>
+        </p:txBody>
+      </p:sp>
+      <p:sp>
+        <p:nvSpPr>
+          <p:cNvPr id="51" name="Shape 168"/>
+          <p:cNvSpPr/>
+          <p:nvPr/>
+        </p:nvSpPr>
+        <p:spPr>
+          <a:xfrm>
+            <a:off x="7835125" y="22252844"/>
+            <a:ext cx="4069447" cy="1087477"/>
+          </a:xfrm>
+          <a:prstGeom prst="rect">
+            <a:avLst/>
+          </a:prstGeom>
+          <a:ln w="12700">
+            <a:miter lim="400000"/>
+          </a:ln>
+          <a:extLst>
+            <a:ext uri="{C572A759-6A51-4108-AA02-DFA0A04FC94B}">
+              <ma14:wrappingTextBoxFlag xmlns:ma14="http://schemas.microsoft.com/office/mac/drawingml/2011/main" val="1"/>
+            </a:ext>
+          </a:extLst>
+        </p:spPr>
+        <p:txBody>
+          <a:bodyPr wrap="none" lIns="50800" tIns="50800" rIns="50800" bIns="50800" anchor="ctr">
+            <a:spAutoFit/>
+          </a:bodyPr>
+          <a:lstStyle/>
+          <a:p>
+            <a:pPr algn="ctr"/>
+            <a:r>
+              <a:rPr lang="en-US" sz="3200" i="1" dirty="0" smtClean="0">
+                <a:latin typeface="Helvetica Neue"/>
+                <a:cs typeface="Arial" panose="020B0604020202020204" pitchFamily="34" charset="0"/>
+              </a:rPr>
+              <a:t>Today’s </a:t>
+            </a:r>
+            <a:r>
+              <a:rPr lang="en-US" sz="3200" i="1" dirty="0" err="1" smtClean="0">
+                <a:latin typeface="Helvetica Neue"/>
+                <a:cs typeface="Arial" panose="020B0604020202020204" pitchFamily="34" charset="0"/>
+              </a:rPr>
+              <a:t>middleboxed</a:t>
+            </a:r>
+            <a:r>
+              <a:rPr lang="en-US" sz="3200" i="1" dirty="0" smtClean="0">
+                <a:latin typeface="Helvetica Neue"/>
+                <a:cs typeface="Arial" panose="020B0604020202020204" pitchFamily="34" charset="0"/>
+              </a:rPr>
+              <a:t> </a:t>
+            </a:r>
+          </a:p>
+          <a:p>
+            <a:pPr algn="ctr"/>
+            <a:r>
+              <a:rPr lang="en-US" sz="3200" i="1" dirty="0" smtClean="0">
+                <a:latin typeface="Helvetica Neue"/>
+                <a:cs typeface="Arial" panose="020B0604020202020204" pitchFamily="34" charset="0"/>
+              </a:rPr>
+              <a:t>reality</a:t>
+            </a:r>
+            <a:endParaRPr sz="3200" i="1" dirty="0">
+              <a:latin typeface="Helvetica Neue"/>
+              <a:cs typeface="Arial" panose="020B0604020202020204" pitchFamily="34" charset="0"/>
+            </a:endParaRPr>
+          </a:p>
+        </p:txBody>
+      </p:sp>
+      <p:pic>
+        <p:nvPicPr>
+          <p:cNvPr id="7" name="Picture 6"/>
+          <p:cNvPicPr>
+            <a:picLocks noChangeAspect="1"/>
+          </p:cNvPicPr>
+          <p:nvPr/>
+        </p:nvPicPr>
+        <p:blipFill>
+          <a:blip r:embed="rId11"/>
+          <a:stretch>
+            <a:fillRect/>
+          </a:stretch>
+        </p:blipFill>
+        <p:spPr>
+          <a:xfrm>
+            <a:off x="2780923" y="17469365"/>
+            <a:ext cx="8737600" cy="4864100"/>
+          </a:xfrm>
+          <a:prstGeom prst="rect">
+            <a:avLst/>
+          </a:prstGeom>
+        </p:spPr>
+      </p:pic>
     </p:spTree>
     <p:extLst>
       <p:ext uri="{BB962C8B-B14F-4D97-AF65-F5344CB8AC3E}">

</xml_diff>

<commit_message>
spacing in measurement box
</commit_message>
<xml_diff>
--- a/NetFutures/mami-poster.pptx
+++ b/NetFutures/mami-poster.pptx
@@ -4,6 +4,9 @@
   <p:sldMasterIdLst>
     <p:sldMasterId id="2147483660" r:id="rId1"/>
   </p:sldMasterIdLst>
+  <p:notesMasterIdLst>
+    <p:notesMasterId r:id="rId3"/>
+  </p:notesMasterIdLst>
   <p:sldIdLst>
     <p:sldId id="256" r:id="rId2"/>
   </p:sldIdLst>
@@ -121,6 +124,440 @@
     </p:ext>
   </p:extLst>
 </p:presentation>
+</file>
+
+<file path=ppt/notesMasters/notesMaster1.xml><?xml version="1.0" encoding="utf-8"?>
+<p:notesMaster xmlns:a="http://schemas.openxmlformats.org/drawingml/2006/main" xmlns:r="http://schemas.openxmlformats.org/officeDocument/2006/relationships" xmlns:p="http://schemas.openxmlformats.org/presentationml/2006/main">
+  <p:cSld>
+    <p:bg>
+      <p:bgRef idx="1001">
+        <a:schemeClr val="bg1"/>
+      </p:bgRef>
+    </p:bg>
+    <p:spTree>
+      <p:nvGrpSpPr>
+        <p:cNvPr id="1" name=""/>
+        <p:cNvGrpSpPr/>
+        <p:nvPr/>
+      </p:nvGrpSpPr>
+      <p:grpSpPr>
+        <a:xfrm>
+          <a:off x="0" y="0"/>
+          <a:ext cx="0" cy="0"/>
+          <a:chOff x="0" y="0"/>
+          <a:chExt cx="0" cy="0"/>
+        </a:xfrm>
+      </p:grpSpPr>
+      <p:sp>
+        <p:nvSpPr>
+          <p:cNvPr id="2" name="Kopfzeilenplatzhalter 1"/>
+          <p:cNvSpPr>
+            <a:spLocks noGrp="1"/>
+          </p:cNvSpPr>
+          <p:nvPr>
+            <p:ph type="hdr" sz="quarter"/>
+          </p:nvPr>
+        </p:nvSpPr>
+        <p:spPr>
+          <a:xfrm>
+            <a:off x="0" y="0"/>
+            <a:ext cx="2971800" cy="458788"/>
+          </a:xfrm>
+          <a:prstGeom prst="rect">
+            <a:avLst/>
+          </a:prstGeom>
+        </p:spPr>
+        <p:txBody>
+          <a:bodyPr vert="horz" lIns="91440" tIns="45720" rIns="91440" bIns="45720" rtlCol="0"/>
+          <a:lstStyle>
+            <a:lvl1pPr algn="l">
+              <a:defRPr sz="1200"/>
+            </a:lvl1pPr>
+          </a:lstStyle>
+          <a:p>
+            <a:endParaRPr lang="en-US"/>
+          </a:p>
+        </p:txBody>
+      </p:sp>
+      <p:sp>
+        <p:nvSpPr>
+          <p:cNvPr id="3" name="Datumsplatzhalter 2"/>
+          <p:cNvSpPr>
+            <a:spLocks noGrp="1"/>
+          </p:cNvSpPr>
+          <p:nvPr>
+            <p:ph type="dt" idx="1"/>
+          </p:nvPr>
+        </p:nvSpPr>
+        <p:spPr>
+          <a:xfrm>
+            <a:off x="3884613" y="0"/>
+            <a:ext cx="2971800" cy="458788"/>
+          </a:xfrm>
+          <a:prstGeom prst="rect">
+            <a:avLst/>
+          </a:prstGeom>
+        </p:spPr>
+        <p:txBody>
+          <a:bodyPr vert="horz" lIns="91440" tIns="45720" rIns="91440" bIns="45720" rtlCol="0"/>
+          <a:lstStyle>
+            <a:lvl1pPr algn="r">
+              <a:defRPr sz="1200"/>
+            </a:lvl1pPr>
+          </a:lstStyle>
+          <a:p>
+            <a:fld id="{6A630308-AEC0-4BCC-A096-F71A42DEB330}" type="datetimeFigureOut">
+              <a:rPr lang="en-US" smtClean="0"/>
+              <a:t>4/15/2016</a:t>
+            </a:fld>
+            <a:endParaRPr lang="en-US"/>
+          </a:p>
+        </p:txBody>
+      </p:sp>
+      <p:sp>
+        <p:nvSpPr>
+          <p:cNvPr id="4" name="Folienbildplatzhalter 3"/>
+          <p:cNvSpPr>
+            <a:spLocks noGrp="1" noRot="1" noChangeAspect="1"/>
+          </p:cNvSpPr>
+          <p:nvPr>
+            <p:ph type="sldImg" idx="2"/>
+          </p:nvPr>
+        </p:nvSpPr>
+        <p:spPr>
+          <a:xfrm>
+            <a:off x="2338388" y="1143000"/>
+            <a:ext cx="2181225" cy="3086100"/>
+          </a:xfrm>
+          <a:prstGeom prst="rect">
+            <a:avLst/>
+          </a:prstGeom>
+          <a:noFill/>
+          <a:ln w="12700">
+            <a:solidFill>
+              <a:prstClr val="black"/>
+            </a:solidFill>
+          </a:ln>
+        </p:spPr>
+        <p:txBody>
+          <a:bodyPr vert="horz" lIns="91440" tIns="45720" rIns="91440" bIns="45720" rtlCol="0" anchor="ctr"/>
+          <a:lstStyle/>
+          <a:p>
+            <a:endParaRPr lang="en-US"/>
+          </a:p>
+        </p:txBody>
+      </p:sp>
+      <p:sp>
+        <p:nvSpPr>
+          <p:cNvPr id="5" name="Notizenplatzhalter 4"/>
+          <p:cNvSpPr>
+            <a:spLocks noGrp="1"/>
+          </p:cNvSpPr>
+          <p:nvPr>
+            <p:ph type="body" sz="quarter" idx="3"/>
+          </p:nvPr>
+        </p:nvSpPr>
+        <p:spPr>
+          <a:xfrm>
+            <a:off x="685800" y="4400550"/>
+            <a:ext cx="5486400" cy="3600450"/>
+          </a:xfrm>
+          <a:prstGeom prst="rect">
+            <a:avLst/>
+          </a:prstGeom>
+        </p:spPr>
+        <p:txBody>
+          <a:bodyPr vert="horz" lIns="91440" tIns="45720" rIns="91440" bIns="45720" rtlCol="0"/>
+          <a:lstStyle/>
+          <a:p>
+            <a:pPr lvl="0"/>
+            <a:r>
+              <a:rPr lang="de-DE" smtClean="0"/>
+              <a:t>Textmasterformat bearbeiten</a:t>
+            </a:r>
+          </a:p>
+          <a:p>
+            <a:pPr lvl="1"/>
+            <a:r>
+              <a:rPr lang="de-DE" smtClean="0"/>
+              <a:t>Zweite Ebene</a:t>
+            </a:r>
+          </a:p>
+          <a:p>
+            <a:pPr lvl="2"/>
+            <a:r>
+              <a:rPr lang="de-DE" smtClean="0"/>
+              <a:t>Dritte Ebene</a:t>
+            </a:r>
+          </a:p>
+          <a:p>
+            <a:pPr lvl="3"/>
+            <a:r>
+              <a:rPr lang="de-DE" smtClean="0"/>
+              <a:t>Vierte Ebene</a:t>
+            </a:r>
+          </a:p>
+          <a:p>
+            <a:pPr lvl="4"/>
+            <a:r>
+              <a:rPr lang="de-DE" smtClean="0"/>
+              <a:t>Fünfte Ebene</a:t>
+            </a:r>
+            <a:endParaRPr lang="en-US"/>
+          </a:p>
+        </p:txBody>
+      </p:sp>
+      <p:sp>
+        <p:nvSpPr>
+          <p:cNvPr id="6" name="Fußzeilenplatzhalter 5"/>
+          <p:cNvSpPr>
+            <a:spLocks noGrp="1"/>
+          </p:cNvSpPr>
+          <p:nvPr>
+            <p:ph type="ftr" sz="quarter" idx="4"/>
+          </p:nvPr>
+        </p:nvSpPr>
+        <p:spPr>
+          <a:xfrm>
+            <a:off x="0" y="8685213"/>
+            <a:ext cx="2971800" cy="458787"/>
+          </a:xfrm>
+          <a:prstGeom prst="rect">
+            <a:avLst/>
+          </a:prstGeom>
+        </p:spPr>
+        <p:txBody>
+          <a:bodyPr vert="horz" lIns="91440" tIns="45720" rIns="91440" bIns="45720" rtlCol="0" anchor="b"/>
+          <a:lstStyle>
+            <a:lvl1pPr algn="l">
+              <a:defRPr sz="1200"/>
+            </a:lvl1pPr>
+          </a:lstStyle>
+          <a:p>
+            <a:endParaRPr lang="en-US"/>
+          </a:p>
+        </p:txBody>
+      </p:sp>
+      <p:sp>
+        <p:nvSpPr>
+          <p:cNvPr id="7" name="Foliennummernplatzhalter 6"/>
+          <p:cNvSpPr>
+            <a:spLocks noGrp="1"/>
+          </p:cNvSpPr>
+          <p:nvPr>
+            <p:ph type="sldNum" sz="quarter" idx="5"/>
+          </p:nvPr>
+        </p:nvSpPr>
+        <p:spPr>
+          <a:xfrm>
+            <a:off x="3884613" y="8685213"/>
+            <a:ext cx="2971800" cy="458787"/>
+          </a:xfrm>
+          <a:prstGeom prst="rect">
+            <a:avLst/>
+          </a:prstGeom>
+        </p:spPr>
+        <p:txBody>
+          <a:bodyPr vert="horz" lIns="91440" tIns="45720" rIns="91440" bIns="45720" rtlCol="0" anchor="b"/>
+          <a:lstStyle>
+            <a:lvl1pPr algn="r">
+              <a:defRPr sz="1200"/>
+            </a:lvl1pPr>
+          </a:lstStyle>
+          <a:p>
+            <a:fld id="{70B86797-88A1-4A01-A1A9-B507BC84FFE3}" type="slidenum">
+              <a:rPr lang="en-US" smtClean="0"/>
+              <a:t>‹Nr.›</a:t>
+            </a:fld>
+            <a:endParaRPr lang="en-US"/>
+          </a:p>
+        </p:txBody>
+      </p:sp>
+    </p:spTree>
+    <p:extLst>
+      <p:ext uri="{BB962C8B-B14F-4D97-AF65-F5344CB8AC3E}">
+        <p14:creationId xmlns:p14="http://schemas.microsoft.com/office/powerpoint/2010/main" val="3227921762"/>
+      </p:ext>
+    </p:extLst>
+  </p:cSld>
+  <p:clrMap bg1="lt1" tx1="dk1" bg2="lt2" tx2="dk2" accent1="accent1" accent2="accent2" accent3="accent3" accent4="accent4" accent5="accent5" accent6="accent6" hlink="hlink" folHlink="folHlink"/>
+  <p:notesStyle>
+    <a:lvl1pPr marL="0" algn="l" defTabSz="914400" rtl="0" eaLnBrk="1" latinLnBrk="0" hangingPunct="1">
+      <a:defRPr sz="1200" kern="1200">
+        <a:solidFill>
+          <a:schemeClr val="tx1"/>
+        </a:solidFill>
+        <a:latin typeface="+mn-lt"/>
+        <a:ea typeface="+mn-ea"/>
+        <a:cs typeface="+mn-cs"/>
+      </a:defRPr>
+    </a:lvl1pPr>
+    <a:lvl2pPr marL="457200" algn="l" defTabSz="914400" rtl="0" eaLnBrk="1" latinLnBrk="0" hangingPunct="1">
+      <a:defRPr sz="1200" kern="1200">
+        <a:solidFill>
+          <a:schemeClr val="tx1"/>
+        </a:solidFill>
+        <a:latin typeface="+mn-lt"/>
+        <a:ea typeface="+mn-ea"/>
+        <a:cs typeface="+mn-cs"/>
+      </a:defRPr>
+    </a:lvl2pPr>
+    <a:lvl3pPr marL="914400" algn="l" defTabSz="914400" rtl="0" eaLnBrk="1" latinLnBrk="0" hangingPunct="1">
+      <a:defRPr sz="1200" kern="1200">
+        <a:solidFill>
+          <a:schemeClr val="tx1"/>
+        </a:solidFill>
+        <a:latin typeface="+mn-lt"/>
+        <a:ea typeface="+mn-ea"/>
+        <a:cs typeface="+mn-cs"/>
+      </a:defRPr>
+    </a:lvl3pPr>
+    <a:lvl4pPr marL="1371600" algn="l" defTabSz="914400" rtl="0" eaLnBrk="1" latinLnBrk="0" hangingPunct="1">
+      <a:defRPr sz="1200" kern="1200">
+        <a:solidFill>
+          <a:schemeClr val="tx1"/>
+        </a:solidFill>
+        <a:latin typeface="+mn-lt"/>
+        <a:ea typeface="+mn-ea"/>
+        <a:cs typeface="+mn-cs"/>
+      </a:defRPr>
+    </a:lvl4pPr>
+    <a:lvl5pPr marL="1828800" algn="l" defTabSz="914400" rtl="0" eaLnBrk="1" latinLnBrk="0" hangingPunct="1">
+      <a:defRPr sz="1200" kern="1200">
+        <a:solidFill>
+          <a:schemeClr val="tx1"/>
+        </a:solidFill>
+        <a:latin typeface="+mn-lt"/>
+        <a:ea typeface="+mn-ea"/>
+        <a:cs typeface="+mn-cs"/>
+      </a:defRPr>
+    </a:lvl5pPr>
+    <a:lvl6pPr marL="2286000" algn="l" defTabSz="914400" rtl="0" eaLnBrk="1" latinLnBrk="0" hangingPunct="1">
+      <a:defRPr sz="1200" kern="1200">
+        <a:solidFill>
+          <a:schemeClr val="tx1"/>
+        </a:solidFill>
+        <a:latin typeface="+mn-lt"/>
+        <a:ea typeface="+mn-ea"/>
+        <a:cs typeface="+mn-cs"/>
+      </a:defRPr>
+    </a:lvl6pPr>
+    <a:lvl7pPr marL="2743200" algn="l" defTabSz="914400" rtl="0" eaLnBrk="1" latinLnBrk="0" hangingPunct="1">
+      <a:defRPr sz="1200" kern="1200">
+        <a:solidFill>
+          <a:schemeClr val="tx1"/>
+        </a:solidFill>
+        <a:latin typeface="+mn-lt"/>
+        <a:ea typeface="+mn-ea"/>
+        <a:cs typeface="+mn-cs"/>
+      </a:defRPr>
+    </a:lvl7pPr>
+    <a:lvl8pPr marL="3200400" algn="l" defTabSz="914400" rtl="0" eaLnBrk="1" latinLnBrk="0" hangingPunct="1">
+      <a:defRPr sz="1200" kern="1200">
+        <a:solidFill>
+          <a:schemeClr val="tx1"/>
+        </a:solidFill>
+        <a:latin typeface="+mn-lt"/>
+        <a:ea typeface="+mn-ea"/>
+        <a:cs typeface="+mn-cs"/>
+      </a:defRPr>
+    </a:lvl8pPr>
+    <a:lvl9pPr marL="3657600" algn="l" defTabSz="914400" rtl="0" eaLnBrk="1" latinLnBrk="0" hangingPunct="1">
+      <a:defRPr sz="1200" kern="1200">
+        <a:solidFill>
+          <a:schemeClr val="tx1"/>
+        </a:solidFill>
+        <a:latin typeface="+mn-lt"/>
+        <a:ea typeface="+mn-ea"/>
+        <a:cs typeface="+mn-cs"/>
+      </a:defRPr>
+    </a:lvl9pPr>
+  </p:notesStyle>
+</p:notesMaster>
+</file>
+
+<file path=ppt/notesSlides/notesSlide1.xml><?xml version="1.0" encoding="utf-8"?>
+<p:notes xmlns:a="http://schemas.openxmlformats.org/drawingml/2006/main" xmlns:r="http://schemas.openxmlformats.org/officeDocument/2006/relationships" xmlns:p="http://schemas.openxmlformats.org/presentationml/2006/main">
+  <p:cSld>
+    <p:spTree>
+      <p:nvGrpSpPr>
+        <p:cNvPr id="1" name=""/>
+        <p:cNvGrpSpPr/>
+        <p:nvPr/>
+      </p:nvGrpSpPr>
+      <p:grpSpPr>
+        <a:xfrm>
+          <a:off x="0" y="0"/>
+          <a:ext cx="0" cy="0"/>
+          <a:chOff x="0" y="0"/>
+          <a:chExt cx="0" cy="0"/>
+        </a:xfrm>
+      </p:grpSpPr>
+      <p:sp>
+        <p:nvSpPr>
+          <p:cNvPr id="2" name="Folienbildplatzhalter 1"/>
+          <p:cNvSpPr>
+            <a:spLocks noGrp="1" noRot="1" noChangeAspect="1"/>
+          </p:cNvSpPr>
+          <p:nvPr>
+            <p:ph type="sldImg"/>
+          </p:nvPr>
+        </p:nvSpPr>
+        <p:spPr/>
+      </p:sp>
+      <p:sp>
+        <p:nvSpPr>
+          <p:cNvPr id="3" name="Notizenplatzhalter 2"/>
+          <p:cNvSpPr>
+            <a:spLocks noGrp="1"/>
+          </p:cNvSpPr>
+          <p:nvPr>
+            <p:ph type="body" idx="1"/>
+          </p:nvPr>
+        </p:nvSpPr>
+        <p:spPr/>
+        <p:txBody>
+          <a:bodyPr/>
+          <a:lstStyle/>
+          <a:p>
+            <a:endParaRPr lang="en-US" dirty="0"/>
+          </a:p>
+        </p:txBody>
+      </p:sp>
+      <p:sp>
+        <p:nvSpPr>
+          <p:cNvPr id="4" name="Foliennummernplatzhalter 3"/>
+          <p:cNvSpPr>
+            <a:spLocks noGrp="1"/>
+          </p:cNvSpPr>
+          <p:nvPr>
+            <p:ph type="sldNum" sz="quarter" idx="10"/>
+          </p:nvPr>
+        </p:nvSpPr>
+        <p:spPr/>
+        <p:txBody>
+          <a:bodyPr/>
+          <a:lstStyle/>
+          <a:p>
+            <a:fld id="{70B86797-88A1-4A01-A1A9-B507BC84FFE3}" type="slidenum">
+              <a:rPr lang="en-US" smtClean="0"/>
+              <a:t>1</a:t>
+            </a:fld>
+            <a:endParaRPr lang="en-US"/>
+          </a:p>
+        </p:txBody>
+      </p:sp>
+    </p:spTree>
+    <p:extLst>
+      <p:ext uri="{BB962C8B-B14F-4D97-AF65-F5344CB8AC3E}">
+        <p14:creationId xmlns:p14="http://schemas.microsoft.com/office/powerpoint/2010/main" val="2207467958"/>
+      </p:ext>
+    </p:extLst>
+  </p:cSld>
+  <p:clrMapOvr>
+    <a:masterClrMapping/>
+  </p:clrMapOvr>
+</p:notes>
 </file>
 
 <file path=ppt/slideLayouts/slideLayout1.xml><?xml version="1.0" encoding="utf-8"?>
@@ -1330,7 +1767,7 @@
           </a:ln>
           <a:extLst>
             <a:ext uri="{C572A759-6A51-4108-AA02-DFA0A04FC94B}">
-              <ma14:wrappingTextBoxFlag xmlns:ma14="http://schemas.microsoft.com/office/mac/drawingml/2011/main" val="1"/>
+              <ma14:wrappingTextBoxFlag xmlns:ma14="http://schemas.microsoft.com/office/mac/drawingml/2011/main" xmlns="" val="1"/>
             </a:ext>
           </a:extLst>
         </p:spPr>
@@ -1381,7 +1818,7 @@
           </a:ln>
           <a:extLst>
             <a:ext uri="{C572A759-6A51-4108-AA02-DFA0A04FC94B}">
-              <ma14:wrappingTextBoxFlag xmlns:ma14="http://schemas.microsoft.com/office/mac/drawingml/2011/main" val="1"/>
+              <ma14:wrappingTextBoxFlag xmlns:ma14="http://schemas.microsoft.com/office/mac/drawingml/2011/main" xmlns="" val="1"/>
             </a:ext>
           </a:extLst>
         </p:spPr>
@@ -1435,7 +1872,7 @@
           </a:ln>
           <a:extLst>
             <a:ext uri="{C572A759-6A51-4108-AA02-DFA0A04FC94B}">
-              <ma14:wrappingTextBoxFlag xmlns:ma14="http://schemas.microsoft.com/office/mac/drawingml/2011/main" val="1"/>
+              <ma14:wrappingTextBoxFlag xmlns:ma14="http://schemas.microsoft.com/office/mac/drawingml/2011/main" xmlns="" val="1"/>
             </a:ext>
           </a:extLst>
         </p:spPr>
@@ -1486,7 +1923,7 @@
           </a:ln>
           <a:extLst>
             <a:ext uri="{C572A759-6A51-4108-AA02-DFA0A04FC94B}">
-              <ma14:wrappingTextBoxFlag xmlns:ma14="http://schemas.microsoft.com/office/mac/drawingml/2011/main" val="1"/>
+              <ma14:wrappingTextBoxFlag xmlns:ma14="http://schemas.microsoft.com/office/mac/drawingml/2011/main" xmlns="" val="1"/>
             </a:ext>
           </a:extLst>
         </p:spPr>
@@ -1526,7 +1963,7 @@
           <p:nvPr/>
         </p:nvPicPr>
         <p:blipFill>
-          <a:blip r:embed="rId2">
+          <a:blip r:embed="rId4">
             <a:extLst/>
           </a:blip>
           <a:stretch>
@@ -1565,7 +2002,7 @@
           </a:ln>
           <a:extLst>
             <a:ext uri="{C572A759-6A51-4108-AA02-DFA0A04FC94B}">
-              <ma14:wrappingTextBoxFlag xmlns:ma14="http://schemas.microsoft.com/office/mac/drawingml/2011/main" val="1"/>
+              <ma14:wrappingTextBoxFlag xmlns:ma14="http://schemas.microsoft.com/office/mac/drawingml/2011/main" xmlns="" val="1"/>
             </a:ext>
           </a:extLst>
         </p:spPr>
@@ -1604,7 +2041,7 @@
           <p:nvPr/>
         </p:nvPicPr>
         <p:blipFill>
-          <a:blip r:embed="rId3">
+          <a:blip r:embed="rId5">
             <a:extLst/>
           </a:blip>
           <a:stretch>
@@ -1643,7 +2080,7 @@
           </a:ln>
           <a:extLst>
             <a:ext uri="{C572A759-6A51-4108-AA02-DFA0A04FC94B}">
-              <ma14:wrappingTextBoxFlag xmlns:ma14="http://schemas.microsoft.com/office/mac/drawingml/2011/main" val="1"/>
+              <ma14:wrappingTextBoxFlag xmlns:ma14="http://schemas.microsoft.com/office/mac/drawingml/2011/main" xmlns="" val="1"/>
             </a:ext>
           </a:extLst>
         </p:spPr>
@@ -1682,7 +2119,7 @@
           <p:nvPr/>
         </p:nvPicPr>
         <p:blipFill>
-          <a:blip r:embed="rId4">
+          <a:blip r:embed="rId6">
             <a:extLst/>
           </a:blip>
           <a:stretch>
@@ -1757,7 +2194,7 @@
           <p:nvPr/>
         </p:nvPicPr>
         <p:blipFill>
-          <a:blip r:embed="rId2">
+          <a:blip r:embed="rId4">
             <a:extLst/>
           </a:blip>
           <a:stretch>
@@ -1832,7 +2269,7 @@
           <p:nvPr/>
         </p:nvPicPr>
         <p:blipFill>
-          <a:blip r:embed="rId4">
+          <a:blip r:embed="rId6">
             <a:extLst/>
           </a:blip>
           <a:stretch>
@@ -1907,7 +2344,7 @@
           <p:nvPr/>
         </p:nvPicPr>
         <p:blipFill>
-          <a:blip r:embed="rId3">
+          <a:blip r:embed="rId5">
             <a:extLst/>
           </a:blip>
           <a:stretch>
@@ -1938,7 +2375,7 @@
         <p:spPr>
           <a:xfrm>
             <a:off x="986400" y="15100369"/>
-            <a:ext cx="13320000" cy="20708942"/>
+            <a:ext cx="13320000" cy="21280412"/>
           </a:xfrm>
           <a:prstGeom prst="rect">
             <a:avLst/>
@@ -2112,6 +2549,9 @@
           </a:lstStyle>
           <a:p>
             <a:pPr marL="0" indent="0" defTabSz="971550">
+              <a:lnSpc>
+                <a:spcPct val="100000"/>
+              </a:lnSpc>
               <a:spcBef>
                 <a:spcPts val="500"/>
               </a:spcBef>
@@ -2129,6 +2569,9 @@
           </a:p>
           <a:p>
             <a:pPr marL="652462" lvl="1" indent="-381000" defTabSz="971550">
+              <a:lnSpc>
+                <a:spcPct val="100000"/>
+              </a:lnSpc>
               <a:spcBef>
                 <a:spcPts val="500"/>
               </a:spcBef>
@@ -2144,6 +2587,9 @@
           </a:p>
           <a:p>
             <a:pPr marL="652462" lvl="1" indent="-381000" defTabSz="971550">
+              <a:lnSpc>
+                <a:spcPct val="100000"/>
+              </a:lnSpc>
               <a:spcBef>
                 <a:spcPts val="500"/>
               </a:spcBef>
@@ -2176,6 +2622,9 @@
           </a:p>
           <a:p>
             <a:pPr marL="0" indent="0" defTabSz="971550">
+              <a:lnSpc>
+                <a:spcPct val="100000"/>
+              </a:lnSpc>
               <a:spcBef>
                 <a:spcPts val="500"/>
               </a:spcBef>
@@ -2190,6 +2639,9 @@
           </a:p>
           <a:p>
             <a:pPr marL="0" indent="0" defTabSz="971550">
+              <a:lnSpc>
+                <a:spcPct val="100000"/>
+              </a:lnSpc>
               <a:spcBef>
                 <a:spcPts val="500"/>
               </a:spcBef>
@@ -2204,6 +2656,9 @@
           </a:p>
           <a:p>
             <a:pPr marL="0" indent="0" defTabSz="971550">
+              <a:lnSpc>
+                <a:spcPct val="100000"/>
+              </a:lnSpc>
               <a:spcBef>
                 <a:spcPts val="500"/>
               </a:spcBef>
@@ -2218,6 +2673,9 @@
           </a:p>
           <a:p>
             <a:pPr marL="0" indent="0" defTabSz="971550">
+              <a:lnSpc>
+                <a:spcPct val="100000"/>
+              </a:lnSpc>
               <a:spcBef>
                 <a:spcPts val="500"/>
               </a:spcBef>
@@ -2232,6 +2690,9 @@
           </a:p>
           <a:p>
             <a:pPr marL="0" indent="0" defTabSz="971550">
+              <a:lnSpc>
+                <a:spcPct val="100000"/>
+              </a:lnSpc>
               <a:spcBef>
                 <a:spcPts val="500"/>
               </a:spcBef>
@@ -2246,6 +2707,9 @@
           </a:p>
           <a:p>
             <a:pPr marL="0" indent="0" defTabSz="971550">
+              <a:lnSpc>
+                <a:spcPct val="100000"/>
+              </a:lnSpc>
               <a:spcBef>
                 <a:spcPts val="500"/>
               </a:spcBef>
@@ -2260,6 +2724,9 @@
           </a:p>
           <a:p>
             <a:pPr marL="0" indent="0" defTabSz="971550">
+              <a:lnSpc>
+                <a:spcPct val="100000"/>
+              </a:lnSpc>
               <a:spcBef>
                 <a:spcPts val="500"/>
               </a:spcBef>
@@ -2274,6 +2741,43 @@
           </a:p>
           <a:p>
             <a:pPr marL="0" indent="0" defTabSz="971550">
+              <a:lnSpc>
+                <a:spcPct val="100000"/>
+              </a:lnSpc>
+              <a:spcBef>
+                <a:spcPts val="500"/>
+              </a:spcBef>
+              <a:buSzPct val="100000"/>
+              <a:buNone/>
+              <a:defRPr sz="2550"/>
+            </a:pPr>
+            <a:endParaRPr lang="de-DE" sz="3600" b="1" dirty="0" smtClean="0">
+              <a:latin typeface="Helvetica Neue"/>
+              <a:cs typeface="Helvetica" panose="020B0604020202020204" pitchFamily="34" charset="0"/>
+            </a:endParaRPr>
+          </a:p>
+          <a:p>
+            <a:pPr marL="0" indent="0" defTabSz="971550">
+              <a:lnSpc>
+                <a:spcPct val="100000"/>
+              </a:lnSpc>
+              <a:spcBef>
+                <a:spcPts val="500"/>
+              </a:spcBef>
+              <a:buSzPct val="100000"/>
+              <a:buNone/>
+              <a:defRPr sz="2550"/>
+            </a:pPr>
+            <a:endParaRPr lang="en-US" sz="3600" b="1" dirty="0">
+              <a:latin typeface="Helvetica Neue"/>
+              <a:cs typeface="Helvetica" panose="020B0604020202020204" pitchFamily="34" charset="0"/>
+            </a:endParaRPr>
+          </a:p>
+          <a:p>
+            <a:pPr marL="0" indent="0" defTabSz="971550">
+              <a:lnSpc>
+                <a:spcPct val="100000"/>
+              </a:lnSpc>
               <a:spcBef>
                 <a:spcPts val="500"/>
               </a:spcBef>
@@ -2288,6 +2792,9 @@
           </a:p>
           <a:p>
             <a:pPr marL="0" indent="0" defTabSz="971550">
+              <a:lnSpc>
+                <a:spcPct val="100000"/>
+              </a:lnSpc>
               <a:spcBef>
                 <a:spcPts val="500"/>
               </a:spcBef>
@@ -2295,62 +2802,6 @@
               <a:buNone/>
               <a:defRPr sz="2550"/>
             </a:pPr>
-            <a:endParaRPr lang="en-US" sz="3600" b="1" dirty="0" smtClean="0">
-              <a:latin typeface="Helvetica Neue"/>
-              <a:cs typeface="Helvetica" panose="020B0604020202020204" pitchFamily="34" charset="0"/>
-            </a:endParaRPr>
-          </a:p>
-          <a:p>
-            <a:pPr marL="0" indent="0" defTabSz="971550">
-              <a:spcBef>
-                <a:spcPts val="500"/>
-              </a:spcBef>
-              <a:buSzPct val="100000"/>
-              <a:buNone/>
-              <a:defRPr sz="2550"/>
-            </a:pPr>
-            <a:endParaRPr lang="de-DE" sz="3600" b="1" dirty="0" smtClean="0">
-              <a:latin typeface="Helvetica Neue"/>
-              <a:cs typeface="Helvetica" panose="020B0604020202020204" pitchFamily="34" charset="0"/>
-            </a:endParaRPr>
-          </a:p>
-          <a:p>
-            <a:pPr marL="0" indent="0" defTabSz="971550">
-              <a:spcBef>
-                <a:spcPts val="500"/>
-              </a:spcBef>
-              <a:buSzPct val="100000"/>
-              <a:buNone/>
-              <a:defRPr sz="2550"/>
-            </a:pPr>
-            <a:endParaRPr lang="en-US" sz="3600" b="1" dirty="0">
-              <a:latin typeface="Helvetica Neue"/>
-              <a:cs typeface="Helvetica" panose="020B0604020202020204" pitchFamily="34" charset="0"/>
-            </a:endParaRPr>
-          </a:p>
-          <a:p>
-            <a:pPr marL="0" indent="0" defTabSz="971550">
-              <a:spcBef>
-                <a:spcPts val="500"/>
-              </a:spcBef>
-              <a:buSzPct val="100000"/>
-              <a:buNone/>
-              <a:defRPr sz="2550"/>
-            </a:pPr>
-            <a:endParaRPr lang="en-US" sz="2400" b="1" dirty="0" smtClean="0">
-              <a:latin typeface="Helvetica Neue"/>
-              <a:cs typeface="Helvetica" panose="020B0604020202020204" pitchFamily="34" charset="0"/>
-            </a:endParaRPr>
-          </a:p>
-          <a:p>
-            <a:pPr marL="0" indent="0" defTabSz="971550">
-              <a:spcBef>
-                <a:spcPts val="500"/>
-              </a:spcBef>
-              <a:buSzPct val="100000"/>
-              <a:buNone/>
-              <a:defRPr sz="2550"/>
-            </a:pPr>
             <a:r>
               <a:rPr lang="en-US" sz="3600" b="1" dirty="0" smtClean="0">
                 <a:latin typeface="Helvetica Neue"/>
@@ -2361,6 +2812,9 @@
           </a:p>
           <a:p>
             <a:pPr marL="0" indent="0" defTabSz="971550">
+              <a:lnSpc>
+                <a:spcPct val="100000"/>
+              </a:lnSpc>
               <a:spcBef>
                 <a:spcPts val="500"/>
               </a:spcBef>
@@ -2394,13 +2848,16 @@
                 </a:uFill>
                 <a:latin typeface="Helvetica Neue"/>
                 <a:cs typeface="Helvetica" panose="020B0604020202020204" pitchFamily="34" charset="0"/>
-                <a:hlinkClick r:id="rId5"/>
+                <a:hlinkClick r:id="rId7"/>
               </a:rPr>
               <a:t>https://github.com/mami-project/</a:t>
             </a:r>
           </a:p>
           <a:p>
             <a:pPr marL="652462" lvl="1" indent="-381000" defTabSz="971550">
+              <a:lnSpc>
+                <a:spcPct val="100000"/>
+              </a:lnSpc>
               <a:spcBef>
                 <a:spcPts val="500"/>
               </a:spcBef>
@@ -2423,6 +2880,9 @@
           </a:p>
           <a:p>
             <a:pPr marL="652462" lvl="1" indent="-381000" defTabSz="971550">
+              <a:lnSpc>
+                <a:spcPct val="100000"/>
+              </a:lnSpc>
               <a:spcBef>
                 <a:spcPts val="500"/>
               </a:spcBef>
@@ -2445,6 +2905,9 @@
           </a:p>
           <a:p>
             <a:pPr marL="652462" lvl="1" indent="-381000" defTabSz="971550">
+              <a:lnSpc>
+                <a:spcPct val="100000"/>
+              </a:lnSpc>
               <a:spcBef>
                 <a:spcPts val="500"/>
               </a:spcBef>
@@ -2467,6 +2930,9 @@
           </a:p>
           <a:p>
             <a:pPr marL="652462" lvl="1" indent="-381000" defTabSz="971550">
+              <a:lnSpc>
+                <a:spcPct val="100000"/>
+              </a:lnSpc>
               <a:spcBef>
                 <a:spcPts val="500"/>
               </a:spcBef>
@@ -2479,6 +2945,9 @@
           </a:p>
           <a:p>
             <a:pPr marL="0" indent="0" defTabSz="971550">
+              <a:lnSpc>
+                <a:spcPct val="100000"/>
+              </a:lnSpc>
               <a:spcBef>
                 <a:spcPts val="500"/>
               </a:spcBef>
@@ -2496,6 +2965,9 @@
           </a:p>
           <a:p>
             <a:pPr marL="728662" lvl="1" indent="-457200" defTabSz="971550">
+              <a:lnSpc>
+                <a:spcPct val="100000"/>
+              </a:lnSpc>
               <a:spcBef>
                 <a:spcPts val="500"/>
               </a:spcBef>
@@ -2513,6 +2985,9 @@
           </a:p>
           <a:p>
             <a:pPr marL="728662" lvl="1" indent="-457200" defTabSz="971550">
+              <a:lnSpc>
+                <a:spcPct val="100000"/>
+              </a:lnSpc>
               <a:spcBef>
                 <a:spcPts val="500"/>
               </a:spcBef>
@@ -2565,6 +3040,9 @@
           </a:p>
           <a:p>
             <a:pPr marL="977900" lvl="1" indent="0" defTabSz="971550">
+              <a:lnSpc>
+                <a:spcPct val="100000"/>
+              </a:lnSpc>
               <a:spcBef>
                 <a:spcPts val="500"/>
               </a:spcBef>
@@ -2588,6 +3066,9 @@
           </a:p>
           <a:p>
             <a:pPr marL="728662" lvl="1" indent="-457200" defTabSz="971550">
+              <a:lnSpc>
+                <a:spcPct val="100000"/>
+              </a:lnSpc>
               <a:spcBef>
                 <a:spcPts val="500"/>
               </a:spcBef>
@@ -2602,6 +3083,9 @@
           </a:p>
           <a:p>
             <a:pPr marL="728662" lvl="1" indent="-457200" defTabSz="971550">
+              <a:lnSpc>
+                <a:spcPct val="100000"/>
+              </a:lnSpc>
               <a:spcBef>
                 <a:spcPts val="500"/>
               </a:spcBef>
@@ -2616,6 +3100,9 @@
           </a:p>
           <a:p>
             <a:pPr marL="728662" lvl="1" indent="-457200" defTabSz="971550">
+              <a:lnSpc>
+                <a:spcPct val="100000"/>
+              </a:lnSpc>
               <a:spcBef>
                 <a:spcPts val="500"/>
               </a:spcBef>
@@ -2630,6 +3117,9 @@
           </a:p>
           <a:p>
             <a:pPr marL="728662" lvl="1" indent="-457200" defTabSz="971550">
+              <a:lnSpc>
+                <a:spcPct val="100000"/>
+              </a:lnSpc>
               <a:spcBef>
                 <a:spcPts val="500"/>
               </a:spcBef>
@@ -2644,6 +3134,9 @@
           </a:p>
           <a:p>
             <a:pPr marL="728662" lvl="1" indent="-457200" defTabSz="971550">
+              <a:lnSpc>
+                <a:spcPct val="100000"/>
+              </a:lnSpc>
               <a:spcBef>
                 <a:spcPts val="500"/>
               </a:spcBef>
@@ -2657,34 +3150,10 @@
             </a:endParaRPr>
           </a:p>
           <a:p>
-            <a:pPr marL="728662" lvl="1" indent="-457200" defTabSz="971550">
-              <a:spcBef>
-                <a:spcPts val="500"/>
-              </a:spcBef>
-              <a:buFont typeface="Arial" charset="0"/>
-              <a:buChar char="•"/>
-              <a:defRPr sz="2550"/>
-            </a:pPr>
-            <a:endParaRPr lang="de-DE" sz="3200" dirty="0">
-              <a:latin typeface="Helvetica Neue"/>
-              <a:cs typeface="Helvetica" panose="020B0604020202020204" pitchFamily="34" charset="0"/>
-            </a:endParaRPr>
-          </a:p>
-          <a:p>
             <a:pPr marL="271462" lvl="1" indent="0" defTabSz="971550">
-              <a:spcBef>
-                <a:spcPts val="500"/>
-              </a:spcBef>
-              <a:buNone/>
-              <a:defRPr sz="2550"/>
-            </a:pPr>
-            <a:endParaRPr lang="de-DE" sz="3200" dirty="0" smtClean="0">
-              <a:latin typeface="Helvetica Neue"/>
-              <a:cs typeface="Helvetica" panose="020B0604020202020204" pitchFamily="34" charset="0"/>
-            </a:endParaRPr>
-          </a:p>
-          <a:p>
-            <a:pPr marL="271462" lvl="1" indent="0" defTabSz="971550">
+              <a:lnSpc>
+                <a:spcPct val="100000"/>
+              </a:lnSpc>
               <a:spcBef>
                 <a:spcPts val="500"/>
               </a:spcBef>
@@ -2698,6 +3167,9 @@
           </a:p>
           <a:p>
             <a:pPr marL="728662" lvl="1" indent="-457200" defTabSz="971550">
+              <a:lnSpc>
+                <a:spcPct val="100000"/>
+              </a:lnSpc>
               <a:spcBef>
                 <a:spcPts val="500"/>
               </a:spcBef>
@@ -2743,6 +3215,9 @@
           </a:p>
           <a:p>
             <a:pPr marL="1260475" lvl="1" indent="-441325" defTabSz="971550">
+              <a:lnSpc>
+                <a:spcPct val="100000"/>
+              </a:lnSpc>
               <a:spcBef>
                 <a:spcPts val="500"/>
               </a:spcBef>
@@ -2767,6 +3242,9 @@
           </a:p>
           <a:p>
             <a:pPr marL="1260475" lvl="1" indent="-441325" defTabSz="971550">
+              <a:lnSpc>
+                <a:spcPct val="100000"/>
+              </a:lnSpc>
               <a:spcBef>
                 <a:spcPts val="500"/>
               </a:spcBef>
@@ -2791,6 +3269,9 @@
           </a:p>
           <a:p>
             <a:pPr marL="1260475" lvl="1" indent="-441325" defTabSz="971550">
+              <a:lnSpc>
+                <a:spcPct val="100000"/>
+              </a:lnSpc>
               <a:spcBef>
                 <a:spcPts val="500"/>
               </a:spcBef>
@@ -2830,6 +3311,9 @@
           </a:p>
           <a:p>
             <a:pPr marL="1260475" lvl="1" indent="-441325" defTabSz="971550">
+              <a:lnSpc>
+                <a:spcPct val="100000"/>
+              </a:lnSpc>
               <a:spcBef>
                 <a:spcPts val="500"/>
               </a:spcBef>
@@ -3288,7 +3772,7 @@
             <p:nvPr/>
           </p:nvPicPr>
           <p:blipFill>
-            <a:blip r:embed="rId6">
+            <a:blip r:embed="rId8">
               <a:extLst/>
             </a:blip>
             <a:stretch>
@@ -3317,7 +3801,7 @@
             <p:nvPr/>
           </p:nvPicPr>
           <p:blipFill>
-            <a:blip r:embed="rId7">
+            <a:blip r:embed="rId9">
               <a:extLst/>
             </a:blip>
             <a:stretch>
@@ -3346,7 +3830,7 @@
             <p:nvPr/>
           </p:nvPicPr>
           <p:blipFill>
-            <a:blip r:embed="rId8">
+            <a:blip r:embed="rId10">
               <a:extLst/>
             </a:blip>
             <a:stretch>
@@ -3375,7 +3859,7 @@
             <p:nvPr/>
           </p:nvPicPr>
           <p:blipFill>
-            <a:blip r:embed="rId9">
+            <a:blip r:embed="rId11">
               <a:extLst/>
             </a:blip>
             <a:stretch>
@@ -3404,7 +3888,7 @@
             <p:nvPr/>
           </p:nvPicPr>
           <p:blipFill>
-            <a:blip r:embed="rId10">
+            <a:blip r:embed="rId12">
               <a:extLst/>
             </a:blip>
             <a:stretch>
@@ -3452,7 +3936,7 @@
           </a:effectLst>
           <a:extLst>
             <a:ext uri="{C572A759-6A51-4108-AA02-DFA0A04FC94B}">
-              <ma14:wrappingTextBoxFlag xmlns:ma14="http://schemas.microsoft.com/office/mac/drawingml/2011/main" val="1"/>
+              <ma14:wrappingTextBoxFlag xmlns:ma14="http://schemas.microsoft.com/office/mac/drawingml/2011/main" xmlns="" val="1"/>
             </a:ext>
           </a:extLst>
         </p:spPr>
@@ -3741,8 +4225,8 @@
         </p:nvGrpSpPr>
         <p:grpSpPr>
           <a:xfrm>
-            <a:off x="1773264" y="30183290"/>
-            <a:ext cx="11746272" cy="3000836"/>
+            <a:off x="2077653" y="30290687"/>
+            <a:ext cx="11137494" cy="2845311"/>
             <a:chOff x="0" y="0"/>
             <a:chExt cx="9900001" cy="2462598"/>
           </a:xfrm>
@@ -3801,7 +4285,7 @@
             </a:effectLst>
             <a:extLst>
               <a:ext uri="{C572A759-6A51-4108-AA02-DFA0A04FC94B}">
-                <ma14:wrappingTextBoxFlag xmlns:ma14="http://schemas.microsoft.com/office/mac/drawingml/2011/main" val="1"/>
+                <ma14:wrappingTextBoxFlag xmlns:ma14="http://schemas.microsoft.com/office/mac/drawingml/2011/main" xmlns="" val="1"/>
               </a:ext>
             </a:extLst>
           </p:spPr>
@@ -3892,7 +4376,7 @@
             </a:effectLst>
             <a:extLst>
               <a:ext uri="{C572A759-6A51-4108-AA02-DFA0A04FC94B}">
-                <ma14:wrappingTextBoxFlag xmlns:ma14="http://schemas.microsoft.com/office/mac/drawingml/2011/main" val="1"/>
+                <ma14:wrappingTextBoxFlag xmlns:ma14="http://schemas.microsoft.com/office/mac/drawingml/2011/main" xmlns="" val="1"/>
               </a:ext>
             </a:extLst>
           </p:spPr>
@@ -3966,7 +4450,7 @@
             </a:effectLst>
             <a:extLst>
               <a:ext uri="{C572A759-6A51-4108-AA02-DFA0A04FC94B}">
-                <ma14:wrappingTextBoxFlag xmlns:ma14="http://schemas.microsoft.com/office/mac/drawingml/2011/main" val="1"/>
+                <ma14:wrappingTextBoxFlag xmlns:ma14="http://schemas.microsoft.com/office/mac/drawingml/2011/main" xmlns="" val="1"/>
               </a:ext>
             </a:extLst>
           </p:spPr>
@@ -4047,7 +4531,7 @@
             </a:effectLst>
             <a:extLst>
               <a:ext uri="{C572A759-6A51-4108-AA02-DFA0A04FC94B}">
-                <ma14:wrappingTextBoxFlag xmlns:ma14="http://schemas.microsoft.com/office/mac/drawingml/2011/main" val="1"/>
+                <ma14:wrappingTextBoxFlag xmlns:ma14="http://schemas.microsoft.com/office/mac/drawingml/2011/main" xmlns="" val="1"/>
               </a:ext>
             </a:extLst>
           </p:spPr>
@@ -4121,7 +4605,7 @@
             </a:effectLst>
             <a:extLst>
               <a:ext uri="{C572A759-6A51-4108-AA02-DFA0A04FC94B}">
-                <ma14:wrappingTextBoxFlag xmlns:ma14="http://schemas.microsoft.com/office/mac/drawingml/2011/main" val="1"/>
+                <ma14:wrappingTextBoxFlag xmlns:ma14="http://schemas.microsoft.com/office/mac/drawingml/2011/main" xmlns="" val="1"/>
               </a:ext>
             </a:extLst>
           </p:spPr>
@@ -4186,7 +4670,7 @@
             </a:effectLst>
             <a:extLst>
               <a:ext uri="{C572A759-6A51-4108-AA02-DFA0A04FC94B}">
-                <ma14:wrappingTextBoxFlag xmlns:ma14="http://schemas.microsoft.com/office/mac/drawingml/2011/main" val="1"/>
+                <ma14:wrappingTextBoxFlag xmlns:ma14="http://schemas.microsoft.com/office/mac/drawingml/2011/main" xmlns="" val="1"/>
               </a:ext>
             </a:extLst>
           </p:spPr>
@@ -4334,7 +4818,7 @@
             </a:effectLst>
             <a:extLst>
               <a:ext uri="{C572A759-6A51-4108-AA02-DFA0A04FC94B}">
-                <ma14:wrappingTextBoxFlag xmlns:ma14="http://schemas.microsoft.com/office/mac/drawingml/2011/main" val="1"/>
+                <ma14:wrappingTextBoxFlag xmlns:ma14="http://schemas.microsoft.com/office/mac/drawingml/2011/main" xmlns="" val="1"/>
               </a:ext>
             </a:extLst>
           </p:spPr>
@@ -4509,7 +4993,7 @@
             </a:effectLst>
             <a:extLst>
               <a:ext uri="{C572A759-6A51-4108-AA02-DFA0A04FC94B}">
-                <ma14:wrappingTextBoxFlag xmlns:ma14="http://schemas.microsoft.com/office/mac/drawingml/2011/main" val="1"/>
+                <ma14:wrappingTextBoxFlag xmlns:ma14="http://schemas.microsoft.com/office/mac/drawingml/2011/main" xmlns="" val="1"/>
               </a:ext>
             </a:extLst>
           </p:spPr>
@@ -4936,152 +5420,177 @@
           </a:p>
         </p:txBody>
       </p:sp>
-      <p:sp>
-        <p:nvSpPr>
-          <p:cNvPr id="50" name="Shape 168"/>
-          <p:cNvSpPr/>
+      <p:grpSp>
+        <p:nvGrpSpPr>
+          <p:cNvPr id="135" name="Gruppieren 134"/>
+          <p:cNvGrpSpPr/>
           <p:nvPr/>
-        </p:nvSpPr>
-        <p:spPr>
+        </p:nvGrpSpPr>
+        <p:grpSpPr>
           <a:xfrm>
-            <a:off x="3523684" y="22253951"/>
-            <a:ext cx="2967159" cy="1087477"/>
+            <a:off x="3277600" y="17496401"/>
+            <a:ext cx="8737600" cy="5705356"/>
+            <a:chOff x="3277600" y="17433339"/>
+            <a:chExt cx="8737600" cy="5705356"/>
           </a:xfrm>
-          <a:prstGeom prst="rect">
-            <a:avLst/>
-          </a:prstGeom>
-          <a:ln w="12700">
-            <a:miter lim="400000"/>
-          </a:ln>
-          <a:extLst>
-            <a:ext uri="{C572A759-6A51-4108-AA02-DFA0A04FC94B}">
-              <ma14:wrappingTextBoxFlag xmlns:ma14="http://schemas.microsoft.com/office/mac/drawingml/2011/main" val="1"/>
-            </a:ext>
-          </a:extLst>
-        </p:spPr>
-        <p:txBody>
-          <a:bodyPr wrap="none" lIns="50800" tIns="50800" rIns="50800" bIns="50800" anchor="ctr">
-            <a:spAutoFit/>
-          </a:bodyPr>
-          <a:lstStyle/>
-          <a:p>
-            <a:pPr algn="ctr"/>
-            <a:r>
-              <a:rPr lang="en-US" sz="3200" i="1" dirty="0" smtClean="0">
+        </p:grpSpPr>
+        <p:sp>
+          <p:nvSpPr>
+            <p:cNvPr id="50" name="Shape 168"/>
+            <p:cNvSpPr/>
+            <p:nvPr/>
+          </p:nvSpPr>
+          <p:spPr>
+            <a:xfrm>
+              <a:off x="4303449" y="22284214"/>
+              <a:ext cx="2208938" cy="841256"/>
+            </a:xfrm>
+            <a:prstGeom prst="rect">
+              <a:avLst/>
+            </a:prstGeom>
+            <a:ln w="12700">
+              <a:miter lim="400000"/>
+            </a:ln>
+            <a:extLst>
+              <a:ext uri="{C572A759-6A51-4108-AA02-DFA0A04FC94B}">
+                <ma14:wrappingTextBoxFlag xmlns:ma14="http://schemas.microsoft.com/office/mac/drawingml/2011/main" xmlns="" val="1"/>
+              </a:ext>
+            </a:extLst>
+          </p:spPr>
+          <p:txBody>
+            <a:bodyPr wrap="none" lIns="50800" tIns="50800" rIns="50800" bIns="50800" anchor="ctr">
+              <a:spAutoFit/>
+            </a:bodyPr>
+            <a:lstStyle/>
+            <a:p>
+              <a:pPr algn="ctr"/>
+              <a:r>
+                <a:rPr lang="en-US" sz="2400" i="1" dirty="0" smtClean="0">
+                  <a:latin typeface="Helvetica Neue"/>
+                  <a:cs typeface="Arial" panose="020B0604020202020204" pitchFamily="34" charset="0"/>
+                </a:rPr>
+                <a:t>The end-to-end</a:t>
+              </a:r>
+            </a:p>
+            <a:p>
+              <a:pPr algn="ctr"/>
+              <a:r>
+                <a:rPr lang="en-US" sz="2400" i="1" dirty="0" smtClean="0">
+                  <a:latin typeface="Helvetica Neue"/>
+                  <a:cs typeface="Arial" panose="020B0604020202020204" pitchFamily="34" charset="0"/>
+                </a:rPr>
+                <a:t>ideal</a:t>
+              </a:r>
+              <a:endParaRPr sz="2400" i="1" dirty="0">
                 <a:latin typeface="Helvetica Neue"/>
                 <a:cs typeface="Arial" panose="020B0604020202020204" pitchFamily="34" charset="0"/>
-              </a:rPr>
-              <a:t>The end-to-end</a:t>
-            </a:r>
-          </a:p>
-          <a:p>
-            <a:pPr algn="ctr"/>
-            <a:r>
-              <a:rPr lang="en-US" sz="3200" i="1" dirty="0" smtClean="0">
+              </a:endParaRPr>
+            </a:p>
+          </p:txBody>
+        </p:sp>
+        <p:sp>
+          <p:nvSpPr>
+            <p:cNvPr id="51" name="Shape 168"/>
+            <p:cNvSpPr/>
+            <p:nvPr/>
+          </p:nvSpPr>
+          <p:spPr>
+            <a:xfrm>
+              <a:off x="8414540" y="22297439"/>
+              <a:ext cx="3066352" cy="841256"/>
+            </a:xfrm>
+            <a:prstGeom prst="rect">
+              <a:avLst/>
+            </a:prstGeom>
+            <a:ln w="12700">
+              <a:miter lim="400000"/>
+            </a:ln>
+            <a:extLst>
+              <a:ext uri="{C572A759-6A51-4108-AA02-DFA0A04FC94B}">
+                <ma14:wrappingTextBoxFlag xmlns:ma14="http://schemas.microsoft.com/office/mac/drawingml/2011/main" xmlns="" val="1"/>
+              </a:ext>
+            </a:extLst>
+          </p:spPr>
+          <p:txBody>
+            <a:bodyPr wrap="none" lIns="50800" tIns="50800" rIns="50800" bIns="50800" anchor="ctr">
+              <a:spAutoFit/>
+            </a:bodyPr>
+            <a:lstStyle/>
+            <a:p>
+              <a:pPr algn="ctr"/>
+              <a:r>
+                <a:rPr lang="en-US" sz="2400" i="1" dirty="0" smtClean="0">
+                  <a:latin typeface="Helvetica Neue"/>
+                  <a:cs typeface="Arial" panose="020B0604020202020204" pitchFamily="34" charset="0"/>
+                </a:rPr>
+                <a:t>Today’s </a:t>
+              </a:r>
+              <a:r>
+                <a:rPr lang="en-US" sz="2400" i="1" dirty="0" err="1" smtClean="0">
+                  <a:latin typeface="Helvetica Neue"/>
+                  <a:cs typeface="Arial" panose="020B0604020202020204" pitchFamily="34" charset="0"/>
+                </a:rPr>
+                <a:t>middleboxed</a:t>
+              </a:r>
+              <a:r>
+                <a:rPr lang="en-US" sz="2400" i="1" dirty="0" smtClean="0">
+                  <a:latin typeface="Helvetica Neue"/>
+                  <a:cs typeface="Arial" panose="020B0604020202020204" pitchFamily="34" charset="0"/>
+                </a:rPr>
+                <a:t> </a:t>
+              </a:r>
+              <a:r>
+                <a:rPr lang="en-US" sz="2400" i="1" dirty="0" smtClean="0">
+                  <a:latin typeface="Helvetica Neue"/>
+                  <a:cs typeface="Arial" panose="020B0604020202020204" pitchFamily="34" charset="0"/>
+                </a:rPr>
+                <a:t/>
+              </a:r>
+              <a:br>
+                <a:rPr lang="en-US" sz="2400" i="1" dirty="0" smtClean="0">
+                  <a:latin typeface="Helvetica Neue"/>
+                  <a:cs typeface="Arial" panose="020B0604020202020204" pitchFamily="34" charset="0"/>
+                </a:rPr>
+              </a:br>
+              <a:r>
+                <a:rPr lang="en-US" sz="2400" i="1" dirty="0" smtClean="0">
+                  <a:latin typeface="Helvetica Neue"/>
+                  <a:cs typeface="Arial" panose="020B0604020202020204" pitchFamily="34" charset="0"/>
+                </a:rPr>
+                <a:t>reality</a:t>
+              </a:r>
+              <a:endParaRPr sz="2400" i="1" dirty="0">
                 <a:latin typeface="Helvetica Neue"/>
                 <a:cs typeface="Arial" panose="020B0604020202020204" pitchFamily="34" charset="0"/>
-              </a:rPr>
-              <a:t>ideal</a:t>
-            </a:r>
-            <a:endParaRPr sz="3200" i="1" dirty="0">
-              <a:latin typeface="Helvetica Neue"/>
-              <a:cs typeface="Arial" panose="020B0604020202020204" pitchFamily="34" charset="0"/>
-            </a:endParaRPr>
-          </a:p>
-        </p:txBody>
-      </p:sp>
-      <p:sp>
-        <p:nvSpPr>
-          <p:cNvPr id="51" name="Shape 168"/>
-          <p:cNvSpPr/>
-          <p:nvPr/>
-        </p:nvSpPr>
-        <p:spPr>
-          <a:xfrm>
-            <a:off x="7835125" y="22252844"/>
-            <a:ext cx="4069447" cy="1087477"/>
-          </a:xfrm>
-          <a:prstGeom prst="rect">
-            <a:avLst/>
-          </a:prstGeom>
-          <a:ln w="12700">
-            <a:miter lim="400000"/>
-          </a:ln>
-          <a:extLst>
-            <a:ext uri="{C572A759-6A51-4108-AA02-DFA0A04FC94B}">
-              <ma14:wrappingTextBoxFlag xmlns:ma14="http://schemas.microsoft.com/office/mac/drawingml/2011/main" val="1"/>
-            </a:ext>
-          </a:extLst>
-        </p:spPr>
-        <p:txBody>
-          <a:bodyPr wrap="none" lIns="50800" tIns="50800" rIns="50800" bIns="50800" anchor="ctr">
-            <a:spAutoFit/>
-          </a:bodyPr>
-          <a:lstStyle/>
-          <a:p>
-            <a:pPr algn="ctr"/>
-            <a:r>
-              <a:rPr lang="en-US" sz="3200" i="1" dirty="0" smtClean="0">
-                <a:latin typeface="Helvetica Neue"/>
-                <a:cs typeface="Arial" panose="020B0604020202020204" pitchFamily="34" charset="0"/>
-              </a:rPr>
-              <a:t>Today’s </a:t>
-            </a:r>
-            <a:r>
-              <a:rPr lang="en-US" sz="3200" i="1" dirty="0" err="1" smtClean="0">
-                <a:latin typeface="Helvetica Neue"/>
-                <a:cs typeface="Arial" panose="020B0604020202020204" pitchFamily="34" charset="0"/>
-              </a:rPr>
-              <a:t>middleboxed</a:t>
-            </a:r>
-            <a:r>
-              <a:rPr lang="en-US" sz="3200" i="1" dirty="0" smtClean="0">
-                <a:latin typeface="Helvetica Neue"/>
-                <a:cs typeface="Arial" panose="020B0604020202020204" pitchFamily="34" charset="0"/>
-              </a:rPr>
-              <a:t> </a:t>
-            </a:r>
-          </a:p>
-          <a:p>
-            <a:pPr algn="ctr"/>
-            <a:r>
-              <a:rPr lang="en-US" sz="3200" i="1" dirty="0" smtClean="0">
-                <a:latin typeface="Helvetica Neue"/>
-                <a:cs typeface="Arial" panose="020B0604020202020204" pitchFamily="34" charset="0"/>
-              </a:rPr>
-              <a:t>reality</a:t>
-            </a:r>
-            <a:endParaRPr sz="3200" i="1" dirty="0">
-              <a:latin typeface="Helvetica Neue"/>
-              <a:cs typeface="Arial" panose="020B0604020202020204" pitchFamily="34" charset="0"/>
-            </a:endParaRPr>
-          </a:p>
-        </p:txBody>
-      </p:sp>
-      <p:pic>
-        <p:nvPicPr>
-          <p:cNvPr id="7" name="Picture 6"/>
-          <p:cNvPicPr>
-            <a:picLocks noChangeAspect="1"/>
-          </p:cNvPicPr>
-          <p:nvPr/>
-        </p:nvPicPr>
-        <p:blipFill>
-          <a:blip r:embed="rId11"/>
-          <a:stretch>
-            <a:fillRect/>
-          </a:stretch>
-        </p:blipFill>
-        <p:spPr>
-          <a:xfrm>
-            <a:off x="2780923" y="17469365"/>
-            <a:ext cx="8737600" cy="4864100"/>
-          </a:xfrm>
-          <a:prstGeom prst="rect">
-            <a:avLst/>
-          </a:prstGeom>
-        </p:spPr>
-      </p:pic>
+              </a:endParaRPr>
+            </a:p>
+          </p:txBody>
+        </p:sp>
+        <p:pic>
+          <p:nvPicPr>
+            <p:cNvPr id="7" name="Picture 6"/>
+            <p:cNvPicPr>
+              <a:picLocks noChangeAspect="1"/>
+            </p:cNvPicPr>
+            <p:nvPr/>
+          </p:nvPicPr>
+          <p:blipFill>
+            <a:blip r:embed="rId13"/>
+            <a:stretch>
+              <a:fillRect/>
+            </a:stretch>
+          </p:blipFill>
+          <p:spPr>
+            <a:xfrm>
+              <a:off x="3277600" y="17433339"/>
+              <a:ext cx="8737600" cy="4864100"/>
+            </a:xfrm>
+            <a:prstGeom prst="rect">
+              <a:avLst/>
+            </a:prstGeom>
+          </p:spPr>
+        </p:pic>
+      </p:grpSp>
     </p:spTree>
     <p:extLst>
       <p:ext uri="{BB962C8B-B14F-4D97-AF65-F5344CB8AC3E}">
@@ -5361,4 +5870,265 @@
     </a:ext>
   </a:extLst>
 </a:theme>
+</file>
+
+<file path=ppt/theme/theme2.xml><?xml version="1.0" encoding="utf-8"?>
+<a:theme xmlns:a="http://schemas.openxmlformats.org/drawingml/2006/main" name="Larissa">
+  <a:themeElements>
+    <a:clrScheme name="Larissa">
+      <a:dk1>
+        <a:sysClr val="windowText" lastClr="000000"/>
+      </a:dk1>
+      <a:lt1>
+        <a:sysClr val="window" lastClr="FFFFFF"/>
+      </a:lt1>
+      <a:dk2>
+        <a:srgbClr val="44546A"/>
+      </a:dk2>
+      <a:lt2>
+        <a:srgbClr val="E7E6E6"/>
+      </a:lt2>
+      <a:accent1>
+        <a:srgbClr val="5B9BD5"/>
+      </a:accent1>
+      <a:accent2>
+        <a:srgbClr val="ED7D31"/>
+      </a:accent2>
+      <a:accent3>
+        <a:srgbClr val="A5A5A5"/>
+      </a:accent3>
+      <a:accent4>
+        <a:srgbClr val="FFC000"/>
+      </a:accent4>
+      <a:accent5>
+        <a:srgbClr val="4472C4"/>
+      </a:accent5>
+      <a:accent6>
+        <a:srgbClr val="70AD47"/>
+      </a:accent6>
+      <a:hlink>
+        <a:srgbClr val="0563C1"/>
+      </a:hlink>
+      <a:folHlink>
+        <a:srgbClr val="954F72"/>
+      </a:folHlink>
+    </a:clrScheme>
+    <a:fontScheme name="Larissa">
+      <a:majorFont>
+        <a:latin typeface="Calibri Light" panose="020F0302020204030204"/>
+        <a:ea typeface=""/>
+        <a:cs typeface=""/>
+        <a:font script="Jpan" typeface="ＭＳ Ｐゴシック"/>
+        <a:font script="Hang" typeface="맑은 고딕"/>
+        <a:font script="Hans" typeface="宋体"/>
+        <a:font script="Hant" typeface="新細明體"/>
+        <a:font script="Arab" typeface="Times New Roman"/>
+        <a:font script="Hebr" typeface="Times New Roman"/>
+        <a:font script="Thai" typeface="Angsana New"/>
+        <a:font script="Ethi" typeface="Nyala"/>
+        <a:font script="Beng" typeface="Vrinda"/>
+        <a:font script="Gujr" typeface="Shruti"/>
+        <a:font script="Khmr" typeface="MoolBoran"/>
+        <a:font script="Knda" typeface="Tunga"/>
+        <a:font script="Guru" typeface="Raavi"/>
+        <a:font script="Cans" typeface="Euphemia"/>
+        <a:font script="Cher" typeface="Plantagenet Cherokee"/>
+        <a:font script="Yiii" typeface="Microsoft Yi Baiti"/>
+        <a:font script="Tibt" typeface="Microsoft Himalaya"/>
+        <a:font script="Thaa" typeface="MV Boli"/>
+        <a:font script="Deva" typeface="Mangal"/>
+        <a:font script="Telu" typeface="Gautami"/>
+        <a:font script="Taml" typeface="Latha"/>
+        <a:font script="Syrc" typeface="Estrangelo Edessa"/>
+        <a:font script="Orya" typeface="Kalinga"/>
+        <a:font script="Mlym" typeface="Kartika"/>
+        <a:font script="Laoo" typeface="DokChampa"/>
+        <a:font script="Sinh" typeface="Iskoola Pota"/>
+        <a:font script="Mong" typeface="Mongolian Baiti"/>
+        <a:font script="Viet" typeface="Times New Roman"/>
+        <a:font script="Uigh" typeface="Microsoft Uighur"/>
+        <a:font script="Geor" typeface="Sylfaen"/>
+      </a:majorFont>
+      <a:minorFont>
+        <a:latin typeface="Calibri" panose="020F0502020204030204"/>
+        <a:ea typeface=""/>
+        <a:cs typeface=""/>
+        <a:font script="Jpan" typeface="ＭＳ Ｐゴシック"/>
+        <a:font script="Hang" typeface="맑은 고딕"/>
+        <a:font script="Hans" typeface="宋体"/>
+        <a:font script="Hant" typeface="新細明體"/>
+        <a:font script="Arab" typeface="Arial"/>
+        <a:font script="Hebr" typeface="Arial"/>
+        <a:font script="Thai" typeface="Cordia New"/>
+        <a:font script="Ethi" typeface="Nyala"/>
+        <a:font script="Beng" typeface="Vrinda"/>
+        <a:font script="Gujr" typeface="Shruti"/>
+        <a:font script="Khmr" typeface="DaunPenh"/>
+        <a:font script="Knda" typeface="Tunga"/>
+        <a:font script="Guru" typeface="Raavi"/>
+        <a:font script="Cans" typeface="Euphemia"/>
+        <a:font script="Cher" typeface="Plantagenet Cherokee"/>
+        <a:font script="Yiii" typeface="Microsoft Yi Baiti"/>
+        <a:font script="Tibt" typeface="Microsoft Himalaya"/>
+        <a:font script="Thaa" typeface="MV Boli"/>
+        <a:font script="Deva" typeface="Mangal"/>
+        <a:font script="Telu" typeface="Gautami"/>
+        <a:font script="Taml" typeface="Latha"/>
+        <a:font script="Syrc" typeface="Estrangelo Edessa"/>
+        <a:font script="Orya" typeface="Kalinga"/>
+        <a:font script="Mlym" typeface="Kartika"/>
+        <a:font script="Laoo" typeface="DokChampa"/>
+        <a:font script="Sinh" typeface="Iskoola Pota"/>
+        <a:font script="Mong" typeface="Mongolian Baiti"/>
+        <a:font script="Viet" typeface="Arial"/>
+        <a:font script="Uigh" typeface="Microsoft Uighur"/>
+        <a:font script="Geor" typeface="Sylfaen"/>
+      </a:minorFont>
+    </a:fontScheme>
+    <a:fmtScheme name="Larissa">
+      <a:fillStyleLst>
+        <a:solidFill>
+          <a:schemeClr val="phClr"/>
+        </a:solidFill>
+        <a:gradFill rotWithShape="1">
+          <a:gsLst>
+            <a:gs pos="0">
+              <a:schemeClr val="phClr">
+                <a:lumMod val="110000"/>
+                <a:satMod val="105000"/>
+                <a:tint val="67000"/>
+              </a:schemeClr>
+            </a:gs>
+            <a:gs pos="50000">
+              <a:schemeClr val="phClr">
+                <a:lumMod val="105000"/>
+                <a:satMod val="103000"/>
+                <a:tint val="73000"/>
+              </a:schemeClr>
+            </a:gs>
+            <a:gs pos="100000">
+              <a:schemeClr val="phClr">
+                <a:lumMod val="105000"/>
+                <a:satMod val="109000"/>
+                <a:tint val="81000"/>
+              </a:schemeClr>
+            </a:gs>
+          </a:gsLst>
+          <a:lin ang="5400000" scaled="0"/>
+        </a:gradFill>
+        <a:gradFill rotWithShape="1">
+          <a:gsLst>
+            <a:gs pos="0">
+              <a:schemeClr val="phClr">
+                <a:satMod val="103000"/>
+                <a:lumMod val="102000"/>
+                <a:tint val="94000"/>
+              </a:schemeClr>
+            </a:gs>
+            <a:gs pos="50000">
+              <a:schemeClr val="phClr">
+                <a:satMod val="110000"/>
+                <a:lumMod val="100000"/>
+                <a:shade val="100000"/>
+              </a:schemeClr>
+            </a:gs>
+            <a:gs pos="100000">
+              <a:schemeClr val="phClr">
+                <a:lumMod val="99000"/>
+                <a:satMod val="120000"/>
+                <a:shade val="78000"/>
+              </a:schemeClr>
+            </a:gs>
+          </a:gsLst>
+          <a:lin ang="5400000" scaled="0"/>
+        </a:gradFill>
+      </a:fillStyleLst>
+      <a:lnStyleLst>
+        <a:ln w="6350" cap="flat" cmpd="sng" algn="ctr">
+          <a:solidFill>
+            <a:schemeClr val="phClr"/>
+          </a:solidFill>
+          <a:prstDash val="solid"/>
+          <a:miter lim="800000"/>
+        </a:ln>
+        <a:ln w="12700" cap="flat" cmpd="sng" algn="ctr">
+          <a:solidFill>
+            <a:schemeClr val="phClr"/>
+          </a:solidFill>
+          <a:prstDash val="solid"/>
+          <a:miter lim="800000"/>
+        </a:ln>
+        <a:ln w="19050" cap="flat" cmpd="sng" algn="ctr">
+          <a:solidFill>
+            <a:schemeClr val="phClr"/>
+          </a:solidFill>
+          <a:prstDash val="solid"/>
+          <a:miter lim="800000"/>
+        </a:ln>
+      </a:lnStyleLst>
+      <a:effectStyleLst>
+        <a:effectStyle>
+          <a:effectLst/>
+        </a:effectStyle>
+        <a:effectStyle>
+          <a:effectLst/>
+        </a:effectStyle>
+        <a:effectStyle>
+          <a:effectLst>
+            <a:outerShdw blurRad="57150" dist="19050" dir="5400000" algn="ctr" rotWithShape="0">
+              <a:srgbClr val="000000">
+                <a:alpha val="63000"/>
+              </a:srgbClr>
+            </a:outerShdw>
+          </a:effectLst>
+        </a:effectStyle>
+      </a:effectStyleLst>
+      <a:bgFillStyleLst>
+        <a:solidFill>
+          <a:schemeClr val="phClr"/>
+        </a:solidFill>
+        <a:solidFill>
+          <a:schemeClr val="phClr">
+            <a:tint val="95000"/>
+            <a:satMod val="170000"/>
+          </a:schemeClr>
+        </a:solidFill>
+        <a:gradFill rotWithShape="1">
+          <a:gsLst>
+            <a:gs pos="0">
+              <a:schemeClr val="phClr">
+                <a:tint val="93000"/>
+                <a:satMod val="150000"/>
+                <a:shade val="98000"/>
+                <a:lumMod val="102000"/>
+              </a:schemeClr>
+            </a:gs>
+            <a:gs pos="50000">
+              <a:schemeClr val="phClr">
+                <a:tint val="98000"/>
+                <a:satMod val="130000"/>
+                <a:shade val="90000"/>
+                <a:lumMod val="103000"/>
+              </a:schemeClr>
+            </a:gs>
+            <a:gs pos="100000">
+              <a:schemeClr val="phClr">
+                <a:shade val="63000"/>
+                <a:satMod val="120000"/>
+              </a:schemeClr>
+            </a:gs>
+          </a:gsLst>
+          <a:lin ang="5400000" scaled="0"/>
+        </a:gradFill>
+      </a:bgFillStyleLst>
+    </a:fmtScheme>
+  </a:themeElements>
+  <a:objectDefaults/>
+  <a:extraClrSchemeLst/>
+  <a:extLst>
+    <a:ext uri="{05A4C25C-085E-4340-85A3-A5531E510DB2}">
+      <thm15:themeFamily xmlns:thm15="http://schemas.microsoft.com/office/thememl/2012/main" name="Office Theme" id="{62F939B6-93AF-4DB8-9C6B-D6C7DFDC589F}" vid="{4A3C46E8-61CC-4603-A589-7422A47A8E4A}"/>
+    </a:ext>
+  </a:extLst>
+</a:theme>
 </file>
</xml_diff>